<commit_message>
Create default slide theme
</commit_message>
<xml_diff>
--- a/presentation/Go_NoGo_Presentation.pptx
+++ b/presentation/Go_NoGo_Presentation.pptx
@@ -1,14 +1,39 @@
 
 <file path=ppt/presentation.xml><?xml version="1.0" encoding="utf-8"?>
-<p:presentation xmlns:a="http://schemas.openxmlformats.org/drawingml/2006/main" xmlns:r="http://schemas.openxmlformats.org/officeDocument/2006/relationships" xmlns:p="http://schemas.openxmlformats.org/presentationml/2006/main" saveSubsetFonts="1">
+<p:presentation xmlns:a="http://schemas.openxmlformats.org/drawingml/2006/main" xmlns:r="http://schemas.openxmlformats.org/officeDocument/2006/relationships" xmlns:p="http://schemas.openxmlformats.org/presentationml/2006/main" showSpecialPlsOnTitleSld="0" embedTrueTypeFonts="1">
   <p:sldMasterIdLst>
     <p:sldMasterId id="2147483648" r:id="rId1"/>
   </p:sldMasterIdLst>
+  <p:notesMasterIdLst>
+    <p:notesMasterId r:id="rId4"/>
+  </p:notesMasterIdLst>
   <p:sldIdLst>
     <p:sldId id="256" r:id="rId2"/>
+    <p:sldId id="257" r:id="rId3"/>
   </p:sldIdLst>
   <p:sldSz cx="12192000" cy="6858000"/>
   <p:notesSz cx="6858000" cy="9144000"/>
+  <p:embeddedFontLst>
+    <p:embeddedFont>
+      <p:font typeface="Calibri" panose="020F0502020204030204" pitchFamily="34" charset="0"/>
+      <p:regular r:id="rId5"/>
+      <p:bold r:id="rId6"/>
+      <p:italic r:id="rId7"/>
+      <p:boldItalic r:id="rId8"/>
+    </p:embeddedFont>
+    <p:embeddedFont>
+      <p:font typeface="Lato" panose="020F0502020204030203" pitchFamily="34" charset="0"/>
+      <p:regular r:id="rId9"/>
+      <p:bold r:id="rId10"/>
+      <p:italic r:id="rId11"/>
+      <p:boldItalic r:id="rId12"/>
+    </p:embeddedFont>
+    <p:embeddedFont>
+      <p:font typeface="Oswald" panose="00000500000000000000" pitchFamily="2" charset="0"/>
+      <p:regular r:id="rId13"/>
+      <p:bold r:id="rId14"/>
+    </p:embeddedFont>
+  </p:embeddedFontLst>
   <p:defaultTextStyle>
     <a:defPPr>
       <a:defRPr lang="en-US"/>
@@ -104,7 +129,373 @@
       </a:defRPr>
     </a:lvl9pPr>
   </p:defaultTextStyle>
+  <p:extLst>
+    <p:ext uri="{EFAFB233-063F-42B5-8137-9DF3F51BA10A}">
+      <p15:sldGuideLst xmlns:p15="http://schemas.microsoft.com/office/powerpoint/2012/main">
+        <p15:guide id="1" orient="horz" pos="2160" userDrawn="1">
+          <p15:clr>
+            <a:srgbClr val="A4A3A4"/>
+          </p15:clr>
+        </p15:guide>
+        <p15:guide id="2" pos="3840" userDrawn="1">
+          <p15:clr>
+            <a:srgbClr val="A4A3A4"/>
+          </p15:clr>
+        </p15:guide>
+      </p15:sldGuideLst>
+    </p:ext>
+  </p:extLst>
 </p:presentation>
+</file>
+
+<file path=ppt/notesMasters/notesMaster1.xml><?xml version="1.0" encoding="utf-8"?>
+<p:notesMaster xmlns:a="http://schemas.openxmlformats.org/drawingml/2006/main" xmlns:r="http://schemas.openxmlformats.org/officeDocument/2006/relationships" xmlns:p="http://schemas.openxmlformats.org/presentationml/2006/main">
+  <p:cSld>
+    <p:bg>
+      <p:bgRef idx="1001">
+        <a:schemeClr val="bg1"/>
+      </p:bgRef>
+    </p:bg>
+    <p:spTree>
+      <p:nvGrpSpPr>
+        <p:cNvPr id="1" name=""/>
+        <p:cNvGrpSpPr/>
+        <p:nvPr/>
+      </p:nvGrpSpPr>
+      <p:grpSpPr>
+        <a:xfrm>
+          <a:off x="0" y="0"/>
+          <a:ext cx="0" cy="0"/>
+          <a:chOff x="0" y="0"/>
+          <a:chExt cx="0" cy="0"/>
+        </a:xfrm>
+      </p:grpSpPr>
+      <p:sp>
+        <p:nvSpPr>
+          <p:cNvPr id="2" name="Header Placeholder 1"/>
+          <p:cNvSpPr>
+            <a:spLocks noGrp="1"/>
+          </p:cNvSpPr>
+          <p:nvPr>
+            <p:ph type="hdr" sz="quarter"/>
+          </p:nvPr>
+        </p:nvSpPr>
+        <p:spPr>
+          <a:xfrm>
+            <a:off x="0" y="0"/>
+            <a:ext cx="2971800" cy="458788"/>
+          </a:xfrm>
+          <a:prstGeom prst="rect">
+            <a:avLst/>
+          </a:prstGeom>
+        </p:spPr>
+        <p:txBody>
+          <a:bodyPr vert="horz" lIns="91440" tIns="45720" rIns="91440" bIns="45720" rtlCol="0"/>
+          <a:lstStyle>
+            <a:lvl1pPr algn="l">
+              <a:defRPr sz="1200"/>
+            </a:lvl1pPr>
+          </a:lstStyle>
+          <a:p>
+            <a:endParaRPr lang="en-GB"/>
+          </a:p>
+        </p:txBody>
+      </p:sp>
+      <p:sp>
+        <p:nvSpPr>
+          <p:cNvPr id="3" name="Date Placeholder 2"/>
+          <p:cNvSpPr>
+            <a:spLocks noGrp="1"/>
+          </p:cNvSpPr>
+          <p:nvPr>
+            <p:ph type="dt" idx="1"/>
+          </p:nvPr>
+        </p:nvSpPr>
+        <p:spPr>
+          <a:xfrm>
+            <a:off x="3884613" y="0"/>
+            <a:ext cx="2971800" cy="458788"/>
+          </a:xfrm>
+          <a:prstGeom prst="rect">
+            <a:avLst/>
+          </a:prstGeom>
+        </p:spPr>
+        <p:txBody>
+          <a:bodyPr vert="horz" lIns="91440" tIns="45720" rIns="91440" bIns="45720" rtlCol="0"/>
+          <a:lstStyle>
+            <a:lvl1pPr algn="r">
+              <a:defRPr sz="1200"/>
+            </a:lvl1pPr>
+          </a:lstStyle>
+          <a:p>
+            <a:fld id="{BFC1BEC5-FFAF-42E5-BAB7-4E2B346222C0}" type="datetimeFigureOut">
+              <a:rPr lang="en-GB" smtClean="0"/>
+              <a:t>18/11/2018</a:t>
+            </a:fld>
+            <a:endParaRPr lang="en-GB"/>
+          </a:p>
+        </p:txBody>
+      </p:sp>
+      <p:sp>
+        <p:nvSpPr>
+          <p:cNvPr id="4" name="Slide Image Placeholder 3"/>
+          <p:cNvSpPr>
+            <a:spLocks noGrp="1" noRot="1" noChangeAspect="1"/>
+          </p:cNvSpPr>
+          <p:nvPr>
+            <p:ph type="sldImg" idx="2"/>
+          </p:nvPr>
+        </p:nvSpPr>
+        <p:spPr>
+          <a:xfrm>
+            <a:off x="685800" y="1143000"/>
+            <a:ext cx="5486400" cy="3086100"/>
+          </a:xfrm>
+          <a:prstGeom prst="rect">
+            <a:avLst/>
+          </a:prstGeom>
+          <a:noFill/>
+          <a:ln w="12700">
+            <a:solidFill>
+              <a:prstClr val="black"/>
+            </a:solidFill>
+          </a:ln>
+        </p:spPr>
+        <p:txBody>
+          <a:bodyPr vert="horz" lIns="91440" tIns="45720" rIns="91440" bIns="45720" rtlCol="0" anchor="ctr"/>
+          <a:lstStyle/>
+          <a:p>
+            <a:endParaRPr lang="en-GB"/>
+          </a:p>
+        </p:txBody>
+      </p:sp>
+      <p:sp>
+        <p:nvSpPr>
+          <p:cNvPr id="5" name="Notes Placeholder 4"/>
+          <p:cNvSpPr>
+            <a:spLocks noGrp="1"/>
+          </p:cNvSpPr>
+          <p:nvPr>
+            <p:ph type="body" sz="quarter" idx="3"/>
+          </p:nvPr>
+        </p:nvSpPr>
+        <p:spPr>
+          <a:xfrm>
+            <a:off x="685800" y="4400550"/>
+            <a:ext cx="5486400" cy="3600450"/>
+          </a:xfrm>
+          <a:prstGeom prst="rect">
+            <a:avLst/>
+          </a:prstGeom>
+        </p:spPr>
+        <p:txBody>
+          <a:bodyPr vert="horz" lIns="91440" tIns="45720" rIns="91440" bIns="45720" rtlCol="0"/>
+          <a:lstStyle/>
+          <a:p>
+            <a:pPr lvl="0"/>
+            <a:r>
+              <a:rPr lang="en-US"/>
+              <a:t>Edit Master text styles</a:t>
+            </a:r>
+          </a:p>
+          <a:p>
+            <a:pPr lvl="1"/>
+            <a:r>
+              <a:rPr lang="en-US"/>
+              <a:t>Second level</a:t>
+            </a:r>
+          </a:p>
+          <a:p>
+            <a:pPr lvl="2"/>
+            <a:r>
+              <a:rPr lang="en-US"/>
+              <a:t>Third level</a:t>
+            </a:r>
+          </a:p>
+          <a:p>
+            <a:pPr lvl="3"/>
+            <a:r>
+              <a:rPr lang="en-US"/>
+              <a:t>Fourth level</a:t>
+            </a:r>
+          </a:p>
+          <a:p>
+            <a:pPr lvl="4"/>
+            <a:r>
+              <a:rPr lang="en-US"/>
+              <a:t>Fifth level</a:t>
+            </a:r>
+            <a:endParaRPr lang="en-GB"/>
+          </a:p>
+        </p:txBody>
+      </p:sp>
+      <p:sp>
+        <p:nvSpPr>
+          <p:cNvPr id="6" name="Footer Placeholder 5"/>
+          <p:cNvSpPr>
+            <a:spLocks noGrp="1"/>
+          </p:cNvSpPr>
+          <p:nvPr>
+            <p:ph type="ftr" sz="quarter" idx="4"/>
+          </p:nvPr>
+        </p:nvSpPr>
+        <p:spPr>
+          <a:xfrm>
+            <a:off x="0" y="8685213"/>
+            <a:ext cx="2971800" cy="458787"/>
+          </a:xfrm>
+          <a:prstGeom prst="rect">
+            <a:avLst/>
+          </a:prstGeom>
+        </p:spPr>
+        <p:txBody>
+          <a:bodyPr vert="horz" lIns="91440" tIns="45720" rIns="91440" bIns="45720" rtlCol="0" anchor="b"/>
+          <a:lstStyle>
+            <a:lvl1pPr algn="l">
+              <a:defRPr sz="1200"/>
+            </a:lvl1pPr>
+          </a:lstStyle>
+          <a:p>
+            <a:endParaRPr lang="en-GB"/>
+          </a:p>
+        </p:txBody>
+      </p:sp>
+      <p:sp>
+        <p:nvSpPr>
+          <p:cNvPr id="7" name="Slide Number Placeholder 6"/>
+          <p:cNvSpPr>
+            <a:spLocks noGrp="1"/>
+          </p:cNvSpPr>
+          <p:nvPr>
+            <p:ph type="sldNum" sz="quarter" idx="5"/>
+          </p:nvPr>
+        </p:nvSpPr>
+        <p:spPr>
+          <a:xfrm>
+            <a:off x="3884613" y="8685213"/>
+            <a:ext cx="2971800" cy="458787"/>
+          </a:xfrm>
+          <a:prstGeom prst="rect">
+            <a:avLst/>
+          </a:prstGeom>
+        </p:spPr>
+        <p:txBody>
+          <a:bodyPr vert="horz" lIns="91440" tIns="45720" rIns="91440" bIns="45720" rtlCol="0" anchor="b"/>
+          <a:lstStyle>
+            <a:lvl1pPr algn="r">
+              <a:defRPr sz="1200"/>
+            </a:lvl1pPr>
+          </a:lstStyle>
+          <a:p>
+            <a:fld id="{D3CA361A-3E66-4405-9017-EE409FE1A5A5}" type="slidenum">
+              <a:rPr lang="en-GB" smtClean="0"/>
+              <a:t>‹#›</a:t>
+            </a:fld>
+            <a:endParaRPr lang="en-GB"/>
+          </a:p>
+        </p:txBody>
+      </p:sp>
+    </p:spTree>
+    <p:extLst>
+      <p:ext uri="{BB962C8B-B14F-4D97-AF65-F5344CB8AC3E}">
+        <p14:creationId xmlns:p14="http://schemas.microsoft.com/office/powerpoint/2010/main" val="746443704"/>
+      </p:ext>
+    </p:extLst>
+  </p:cSld>
+  <p:clrMap bg1="lt1" tx1="dk1" bg2="lt2" tx2="dk2" accent1="accent1" accent2="accent2" accent3="accent3" accent4="accent4" accent5="accent5" accent6="accent6" hlink="hlink" folHlink="folHlink"/>
+  <p:notesStyle>
+    <a:lvl1pPr marL="0" algn="l" defTabSz="914400" rtl="0" eaLnBrk="1" latinLnBrk="0" hangingPunct="1">
+      <a:defRPr sz="1200" kern="1200">
+        <a:solidFill>
+          <a:schemeClr val="tx1"/>
+        </a:solidFill>
+        <a:latin typeface="+mn-lt"/>
+        <a:ea typeface="+mn-ea"/>
+        <a:cs typeface="+mn-cs"/>
+      </a:defRPr>
+    </a:lvl1pPr>
+    <a:lvl2pPr marL="457200" algn="l" defTabSz="914400" rtl="0" eaLnBrk="1" latinLnBrk="0" hangingPunct="1">
+      <a:defRPr sz="1200" kern="1200">
+        <a:solidFill>
+          <a:schemeClr val="tx1"/>
+        </a:solidFill>
+        <a:latin typeface="+mn-lt"/>
+        <a:ea typeface="+mn-ea"/>
+        <a:cs typeface="+mn-cs"/>
+      </a:defRPr>
+    </a:lvl2pPr>
+    <a:lvl3pPr marL="914400" algn="l" defTabSz="914400" rtl="0" eaLnBrk="1" latinLnBrk="0" hangingPunct="1">
+      <a:defRPr sz="1200" kern="1200">
+        <a:solidFill>
+          <a:schemeClr val="tx1"/>
+        </a:solidFill>
+        <a:latin typeface="+mn-lt"/>
+        <a:ea typeface="+mn-ea"/>
+        <a:cs typeface="+mn-cs"/>
+      </a:defRPr>
+    </a:lvl3pPr>
+    <a:lvl4pPr marL="1371600" algn="l" defTabSz="914400" rtl="0" eaLnBrk="1" latinLnBrk="0" hangingPunct="1">
+      <a:defRPr sz="1200" kern="1200">
+        <a:solidFill>
+          <a:schemeClr val="tx1"/>
+        </a:solidFill>
+        <a:latin typeface="+mn-lt"/>
+        <a:ea typeface="+mn-ea"/>
+        <a:cs typeface="+mn-cs"/>
+      </a:defRPr>
+    </a:lvl4pPr>
+    <a:lvl5pPr marL="1828800" algn="l" defTabSz="914400" rtl="0" eaLnBrk="1" latinLnBrk="0" hangingPunct="1">
+      <a:defRPr sz="1200" kern="1200">
+        <a:solidFill>
+          <a:schemeClr val="tx1"/>
+        </a:solidFill>
+        <a:latin typeface="+mn-lt"/>
+        <a:ea typeface="+mn-ea"/>
+        <a:cs typeface="+mn-cs"/>
+      </a:defRPr>
+    </a:lvl5pPr>
+    <a:lvl6pPr marL="2286000" algn="l" defTabSz="914400" rtl="0" eaLnBrk="1" latinLnBrk="0" hangingPunct="1">
+      <a:defRPr sz="1200" kern="1200">
+        <a:solidFill>
+          <a:schemeClr val="tx1"/>
+        </a:solidFill>
+        <a:latin typeface="+mn-lt"/>
+        <a:ea typeface="+mn-ea"/>
+        <a:cs typeface="+mn-cs"/>
+      </a:defRPr>
+    </a:lvl6pPr>
+    <a:lvl7pPr marL="2743200" algn="l" defTabSz="914400" rtl="0" eaLnBrk="1" latinLnBrk="0" hangingPunct="1">
+      <a:defRPr sz="1200" kern="1200">
+        <a:solidFill>
+          <a:schemeClr val="tx1"/>
+        </a:solidFill>
+        <a:latin typeface="+mn-lt"/>
+        <a:ea typeface="+mn-ea"/>
+        <a:cs typeface="+mn-cs"/>
+      </a:defRPr>
+    </a:lvl7pPr>
+    <a:lvl8pPr marL="3200400" algn="l" defTabSz="914400" rtl="0" eaLnBrk="1" latinLnBrk="0" hangingPunct="1">
+      <a:defRPr sz="1200" kern="1200">
+        <a:solidFill>
+          <a:schemeClr val="tx1"/>
+        </a:solidFill>
+        <a:latin typeface="+mn-lt"/>
+        <a:ea typeface="+mn-ea"/>
+        <a:cs typeface="+mn-cs"/>
+      </a:defRPr>
+    </a:lvl8pPr>
+    <a:lvl9pPr marL="3657600" algn="l" defTabSz="914400" rtl="0" eaLnBrk="1" latinLnBrk="0" hangingPunct="1">
+      <a:defRPr sz="1200" kern="1200">
+        <a:solidFill>
+          <a:schemeClr val="tx1"/>
+        </a:solidFill>
+        <a:latin typeface="+mn-lt"/>
+        <a:ea typeface="+mn-ea"/>
+        <a:cs typeface="+mn-cs"/>
+      </a:defRPr>
+    </a:lvl9pPr>
+  </p:notesStyle>
+</p:notesMaster>
 </file>
 
 <file path=ppt/slideLayouts/slideLayout1.xml><?xml version="1.0" encoding="utf-8"?>
@@ -254,11 +645,11 @@
           <a:bodyPr/>
           <a:lstStyle/>
           <a:p>
-            <a:fld id="{8FF85188-F5D4-4233-89A7-0500E7DFEE92}" type="datetimeFigureOut">
-              <a:rPr lang="en-GB" smtClean="0"/>
-              <a:t>18/11/2018</a:t>
-            </a:fld>
-            <a:endParaRPr lang="en-GB"/>
+            <a:r>
+              <a:rPr lang="en-GB"/>
+              <a:t>23/11/2018</a:t>
+            </a:r>
+            <a:endParaRPr lang="en-GB" dirty="0"/>
           </a:p>
         </p:txBody>
       </p:sp>
@@ -283,7 +674,10 @@
           <a:bodyPr/>
           <a:lstStyle/>
           <a:p>
-            <a:endParaRPr lang="en-GB"/>
+            <a:r>
+              <a:rPr lang="en-GB" dirty="0"/>
+              <a:t>Matteo Pompili – First Year Proposal</a:t>
+            </a:r>
           </a:p>
         </p:txBody>
       </p:sp>
@@ -312,7 +706,7 @@
               <a:rPr lang="en-GB" smtClean="0"/>
               <a:t>‹#›</a:t>
             </a:fld>
-            <a:endParaRPr lang="en-GB"/>
+            <a:endParaRPr lang="en-GB" dirty="0"/>
           </a:p>
         </p:txBody>
       </p:sp>
@@ -454,11 +848,10 @@
           <a:bodyPr/>
           <a:lstStyle/>
           <a:p>
-            <a:fld id="{8FF85188-F5D4-4233-89A7-0500E7DFEE92}" type="datetimeFigureOut">
-              <a:rPr lang="en-GB" smtClean="0"/>
-              <a:t>18/11/2018</a:t>
-            </a:fld>
-            <a:endParaRPr lang="en-GB"/>
+            <a:r>
+              <a:rPr lang="en-GB"/>
+              <a:t>23/11/2018</a:t>
+            </a:r>
           </a:p>
         </p:txBody>
       </p:sp>
@@ -483,7 +876,10 @@
           <a:bodyPr/>
           <a:lstStyle/>
           <a:p>
-            <a:endParaRPr lang="en-GB"/>
+            <a:r>
+              <a:rPr lang="en-GB"/>
+              <a:t>Matteo Pompili – First Year Proposal</a:t>
+            </a:r>
           </a:p>
         </p:txBody>
       </p:sp>
@@ -664,11 +1060,10 @@
           <a:bodyPr/>
           <a:lstStyle/>
           <a:p>
-            <a:fld id="{8FF85188-F5D4-4233-89A7-0500E7DFEE92}" type="datetimeFigureOut">
-              <a:rPr lang="en-GB" smtClean="0"/>
-              <a:t>18/11/2018</a:t>
-            </a:fld>
-            <a:endParaRPr lang="en-GB"/>
+            <a:r>
+              <a:rPr lang="en-GB"/>
+              <a:t>23/11/2018</a:t>
+            </a:r>
           </a:p>
         </p:txBody>
       </p:sp>
@@ -693,7 +1088,10 @@
           <a:bodyPr/>
           <a:lstStyle/>
           <a:p>
-            <a:endParaRPr lang="en-GB"/>
+            <a:r>
+              <a:rPr lang="en-GB"/>
+              <a:t>Matteo Pompili – First Year Proposal</a:t>
+            </a:r>
           </a:p>
         </p:txBody>
       </p:sp>
@@ -758,6 +1156,60 @@
       </p:grpSpPr>
       <p:sp>
         <p:nvSpPr>
+          <p:cNvPr id="7" name="Rectangle 6">
+            <a:extLst>
+              <a:ext uri="{FF2B5EF4-FFF2-40B4-BE49-F238E27FC236}">
+                <a16:creationId xmlns:a16="http://schemas.microsoft.com/office/drawing/2014/main" id="{E57106A6-23B3-47DB-9211-0358820FBF36}"/>
+              </a:ext>
+            </a:extLst>
+          </p:cNvPr>
+          <p:cNvSpPr/>
+          <p:nvPr userDrawn="1"/>
+        </p:nvSpPr>
+        <p:spPr>
+          <a:xfrm>
+            <a:off x="-428625" y="-219075"/>
+            <a:ext cx="13344525" cy="1971675"/>
+          </a:xfrm>
+          <a:prstGeom prst="rect">
+            <a:avLst/>
+          </a:prstGeom>
+          <a:solidFill>
+            <a:srgbClr val="009FDA"/>
+          </a:solidFill>
+          <a:ln w="19050">
+            <a:solidFill>
+              <a:srgbClr val="0077A3"/>
+            </a:solidFill>
+          </a:ln>
+        </p:spPr>
+        <p:style>
+          <a:lnRef idx="2">
+            <a:schemeClr val="accent1">
+              <a:shade val="50000"/>
+            </a:schemeClr>
+          </a:lnRef>
+          <a:fillRef idx="1">
+            <a:schemeClr val="accent1"/>
+          </a:fillRef>
+          <a:effectRef idx="0">
+            <a:schemeClr val="accent1"/>
+          </a:effectRef>
+          <a:fontRef idx="minor">
+            <a:schemeClr val="lt1"/>
+          </a:fontRef>
+        </p:style>
+        <p:txBody>
+          <a:bodyPr rtlCol="0" anchor="ctr"/>
+          <a:lstStyle/>
+          <a:p>
+            <a:pPr algn="ctr"/>
+            <a:endParaRPr lang="en-GB" sz="1200" dirty="0"/>
+          </a:p>
+        </p:txBody>
+      </p:sp>
+      <p:sp>
+        <p:nvSpPr>
           <p:cNvPr id="2" name="Title 1">
             <a:extLst>
               <a:ext uri="{FF2B5EF4-FFF2-40B4-BE49-F238E27FC236}">
@@ -775,13 +1227,28 @@
         <p:spPr/>
         <p:txBody>
           <a:bodyPr/>
-          <a:lstStyle/>
-          <a:p>
-            <a:r>
-              <a:rPr lang="en-US"/>
+          <a:lstStyle>
+            <a:lvl1pPr>
+              <a:defRPr>
+                <a:solidFill>
+                  <a:schemeClr val="bg1"/>
+                </a:solidFill>
+                <a:effectLst>
+                  <a:outerShdw dist="25400" dir="5400000" algn="t" rotWithShape="0">
+                    <a:prstClr val="black">
+                      <a:alpha val="25000"/>
+                    </a:prstClr>
+                  </a:outerShdw>
+                </a:effectLst>
+              </a:defRPr>
+            </a:lvl1pPr>
+          </a:lstStyle>
+          <a:p>
+            <a:r>
+              <a:rPr lang="en-US" dirty="0"/>
               <a:t>Click to edit Master title style</a:t>
             </a:r>
-            <a:endParaRPr lang="en-GB"/>
+            <a:endParaRPr lang="en-GB" dirty="0"/>
           </a:p>
         </p:txBody>
       </p:sp>
@@ -808,38 +1275,38 @@
           <a:p>
             <a:pPr lvl="0"/>
             <a:r>
-              <a:rPr lang="en-US"/>
+              <a:rPr lang="en-US" dirty="0"/>
               <a:t>Edit Master text styles</a:t>
             </a:r>
           </a:p>
           <a:p>
             <a:pPr lvl="1"/>
             <a:r>
-              <a:rPr lang="en-US"/>
+              <a:rPr lang="en-US" dirty="0"/>
               <a:t>Second level</a:t>
             </a:r>
           </a:p>
           <a:p>
             <a:pPr lvl="2"/>
             <a:r>
-              <a:rPr lang="en-US"/>
+              <a:rPr lang="en-US" dirty="0"/>
               <a:t>Third level</a:t>
             </a:r>
           </a:p>
           <a:p>
             <a:pPr lvl="3"/>
             <a:r>
-              <a:rPr lang="en-US"/>
+              <a:rPr lang="en-US" dirty="0"/>
               <a:t>Fourth level</a:t>
             </a:r>
           </a:p>
           <a:p>
             <a:pPr lvl="4"/>
             <a:r>
-              <a:rPr lang="en-US"/>
+              <a:rPr lang="en-US" dirty="0"/>
               <a:t>Fifth level</a:t>
             </a:r>
-            <a:endParaRPr lang="en-GB"/>
+            <a:endParaRPr lang="en-GB" dirty="0"/>
           </a:p>
         </p:txBody>
       </p:sp>
@@ -864,11 +1331,10 @@
           <a:bodyPr/>
           <a:lstStyle/>
           <a:p>
-            <a:fld id="{8FF85188-F5D4-4233-89A7-0500E7DFEE92}" type="datetimeFigureOut">
-              <a:rPr lang="en-GB" smtClean="0"/>
-              <a:t>18/11/2018</a:t>
-            </a:fld>
-            <a:endParaRPr lang="en-GB"/>
+            <a:r>
+              <a:rPr lang="en-GB"/>
+              <a:t>23/11/2018</a:t>
+            </a:r>
           </a:p>
         </p:txBody>
       </p:sp>
@@ -893,7 +1359,10 @@
           <a:bodyPr/>
           <a:lstStyle/>
           <a:p>
-            <a:endParaRPr lang="en-GB"/>
+            <a:r>
+              <a:rPr lang="en-GB"/>
+              <a:t>Matteo Pompili – First Year Proposal</a:t>
+            </a:r>
           </a:p>
         </p:txBody>
       </p:sp>
@@ -1140,11 +1609,10 @@
           <a:bodyPr/>
           <a:lstStyle/>
           <a:p>
-            <a:fld id="{8FF85188-F5D4-4233-89A7-0500E7DFEE92}" type="datetimeFigureOut">
-              <a:rPr lang="en-GB" smtClean="0"/>
-              <a:t>18/11/2018</a:t>
-            </a:fld>
-            <a:endParaRPr lang="en-GB"/>
+            <a:r>
+              <a:rPr lang="en-GB"/>
+              <a:t>23/11/2018</a:t>
+            </a:r>
           </a:p>
         </p:txBody>
       </p:sp>
@@ -1169,7 +1637,10 @@
           <a:bodyPr/>
           <a:lstStyle/>
           <a:p>
-            <a:endParaRPr lang="en-GB"/>
+            <a:r>
+              <a:rPr lang="en-GB"/>
+              <a:t>Matteo Pompili – First Year Proposal</a:t>
+            </a:r>
           </a:p>
         </p:txBody>
       </p:sp>
@@ -1408,11 +1879,10 @@
           <a:bodyPr/>
           <a:lstStyle/>
           <a:p>
-            <a:fld id="{8FF85188-F5D4-4233-89A7-0500E7DFEE92}" type="datetimeFigureOut">
-              <a:rPr lang="en-GB" smtClean="0"/>
-              <a:t>18/11/2018</a:t>
-            </a:fld>
-            <a:endParaRPr lang="en-GB"/>
+            <a:r>
+              <a:rPr lang="en-GB"/>
+              <a:t>23/11/2018</a:t>
+            </a:r>
           </a:p>
         </p:txBody>
       </p:sp>
@@ -1437,7 +1907,10 @@
           <a:bodyPr/>
           <a:lstStyle/>
           <a:p>
-            <a:endParaRPr lang="en-GB"/>
+            <a:r>
+              <a:rPr lang="en-GB"/>
+              <a:t>Matteo Pompili – First Year Proposal</a:t>
+            </a:r>
           </a:p>
         </p:txBody>
       </p:sp>
@@ -1823,11 +2296,10 @@
           <a:bodyPr/>
           <a:lstStyle/>
           <a:p>
-            <a:fld id="{8FF85188-F5D4-4233-89A7-0500E7DFEE92}" type="datetimeFigureOut">
-              <a:rPr lang="en-GB" smtClean="0"/>
-              <a:t>18/11/2018</a:t>
-            </a:fld>
-            <a:endParaRPr lang="en-GB"/>
+            <a:r>
+              <a:rPr lang="en-GB"/>
+              <a:t>23/11/2018</a:t>
+            </a:r>
           </a:p>
         </p:txBody>
       </p:sp>
@@ -1852,7 +2324,10 @@
           <a:bodyPr/>
           <a:lstStyle/>
           <a:p>
-            <a:endParaRPr lang="en-GB"/>
+            <a:r>
+              <a:rPr lang="en-GB"/>
+              <a:t>Matteo Pompili – First Year Proposal</a:t>
+            </a:r>
           </a:p>
         </p:txBody>
       </p:sp>
@@ -1965,11 +2440,10 @@
           <a:bodyPr/>
           <a:lstStyle/>
           <a:p>
-            <a:fld id="{8FF85188-F5D4-4233-89A7-0500E7DFEE92}" type="datetimeFigureOut">
-              <a:rPr lang="en-GB" smtClean="0"/>
-              <a:t>18/11/2018</a:t>
-            </a:fld>
-            <a:endParaRPr lang="en-GB"/>
+            <a:r>
+              <a:rPr lang="en-GB"/>
+              <a:t>23/11/2018</a:t>
+            </a:r>
           </a:p>
         </p:txBody>
       </p:sp>
@@ -1994,7 +2468,10 @@
           <a:bodyPr/>
           <a:lstStyle/>
           <a:p>
-            <a:endParaRPr lang="en-GB"/>
+            <a:r>
+              <a:rPr lang="en-GB"/>
+              <a:t>Matteo Pompili – First Year Proposal</a:t>
+            </a:r>
           </a:p>
         </p:txBody>
       </p:sp>
@@ -2078,11 +2555,10 @@
           <a:bodyPr/>
           <a:lstStyle/>
           <a:p>
-            <a:fld id="{8FF85188-F5D4-4233-89A7-0500E7DFEE92}" type="datetimeFigureOut">
-              <a:rPr lang="en-GB" smtClean="0"/>
-              <a:t>18/11/2018</a:t>
-            </a:fld>
-            <a:endParaRPr lang="en-GB"/>
+            <a:r>
+              <a:rPr lang="en-GB"/>
+              <a:t>23/11/2018</a:t>
+            </a:r>
           </a:p>
         </p:txBody>
       </p:sp>
@@ -2107,7 +2583,10 @@
           <a:bodyPr/>
           <a:lstStyle/>
           <a:p>
-            <a:endParaRPr lang="en-GB"/>
+            <a:r>
+              <a:rPr lang="en-GB"/>
+              <a:t>Matteo Pompili – First Year Proposal</a:t>
+            </a:r>
           </a:p>
         </p:txBody>
       </p:sp>
@@ -2391,11 +2870,10 @@
           <a:bodyPr/>
           <a:lstStyle/>
           <a:p>
-            <a:fld id="{8FF85188-F5D4-4233-89A7-0500E7DFEE92}" type="datetimeFigureOut">
-              <a:rPr lang="en-GB" smtClean="0"/>
-              <a:t>18/11/2018</a:t>
-            </a:fld>
-            <a:endParaRPr lang="en-GB"/>
+            <a:r>
+              <a:rPr lang="en-GB"/>
+              <a:t>23/11/2018</a:t>
+            </a:r>
           </a:p>
         </p:txBody>
       </p:sp>
@@ -2420,7 +2898,10 @@
           <a:bodyPr/>
           <a:lstStyle/>
           <a:p>
-            <a:endParaRPr lang="en-GB"/>
+            <a:r>
+              <a:rPr lang="en-GB"/>
+              <a:t>Matteo Pompili – First Year Proposal</a:t>
+            </a:r>
           </a:p>
         </p:txBody>
       </p:sp>
@@ -2680,11 +3161,10 @@
           <a:bodyPr/>
           <a:lstStyle/>
           <a:p>
-            <a:fld id="{8FF85188-F5D4-4233-89A7-0500E7DFEE92}" type="datetimeFigureOut">
-              <a:rPr lang="en-GB" smtClean="0"/>
-              <a:t>18/11/2018</a:t>
-            </a:fld>
-            <a:endParaRPr lang="en-GB"/>
+            <a:r>
+              <a:rPr lang="en-GB"/>
+              <a:t>23/11/2018</a:t>
+            </a:r>
           </a:p>
         </p:txBody>
       </p:sp>
@@ -2709,7 +3189,10 @@
           <a:bodyPr/>
           <a:lstStyle/>
           <a:p>
-            <a:endParaRPr lang="en-GB"/>
+            <a:r>
+              <a:rPr lang="en-GB"/>
+              <a:t>Matteo Pompili – First Year Proposal</a:t>
+            </a:r>
           </a:p>
         </p:txBody>
       </p:sp>
@@ -2923,11 +3406,10 @@
             </a:lvl1pPr>
           </a:lstStyle>
           <a:p>
-            <a:fld id="{8FF85188-F5D4-4233-89A7-0500E7DFEE92}" type="datetimeFigureOut">
-              <a:rPr lang="en-GB" smtClean="0"/>
-              <a:t>18/11/2018</a:t>
-            </a:fld>
-            <a:endParaRPr lang="en-GB"/>
+            <a:r>
+              <a:rPr lang="en-GB"/>
+              <a:t>23/11/2018</a:t>
+            </a:r>
           </a:p>
         </p:txBody>
       </p:sp>
@@ -2970,7 +3452,10 @@
             </a:lvl1pPr>
           </a:lstStyle>
           <a:p>
-            <a:endParaRPr lang="en-GB"/>
+            <a:r>
+              <a:rPr lang="en-GB"/>
+              <a:t>Matteo Pompili – First Year Proposal</a:t>
+            </a:r>
           </a:p>
         </p:txBody>
       </p:sp>
@@ -3042,6 +3527,7 @@
     <p:sldLayoutId id="2147483658" r:id="rId10"/>
     <p:sldLayoutId id="2147483659" r:id="rId11"/>
   </p:sldLayoutIdLst>
+  <p:hf hdr="0"/>
   <p:txStyles>
     <p:titleStyle>
       <a:lvl1pPr algn="l" defTabSz="914400" rtl="0" eaLnBrk="1" latinLnBrk="0" hangingPunct="1">
@@ -3344,6 +3830,60 @@
       </p:grpSpPr>
       <p:sp>
         <p:nvSpPr>
+          <p:cNvPr id="16" name="Rectangle 15">
+            <a:extLst>
+              <a:ext uri="{FF2B5EF4-FFF2-40B4-BE49-F238E27FC236}">
+                <a16:creationId xmlns:a16="http://schemas.microsoft.com/office/drawing/2014/main" id="{72109EA0-FF7F-420C-895F-53C89A5736DF}"/>
+              </a:ext>
+            </a:extLst>
+          </p:cNvPr>
+          <p:cNvSpPr/>
+          <p:nvPr/>
+        </p:nvSpPr>
+        <p:spPr>
+          <a:xfrm>
+            <a:off x="-204537" y="-64168"/>
+            <a:ext cx="12601074" cy="3574131"/>
+          </a:xfrm>
+          <a:prstGeom prst="rect">
+            <a:avLst/>
+          </a:prstGeom>
+          <a:solidFill>
+            <a:srgbClr val="009FDA"/>
+          </a:solidFill>
+          <a:ln w="19050">
+            <a:solidFill>
+              <a:srgbClr val="0077A3"/>
+            </a:solidFill>
+          </a:ln>
+        </p:spPr>
+        <p:style>
+          <a:lnRef idx="2">
+            <a:schemeClr val="accent1">
+              <a:shade val="50000"/>
+            </a:schemeClr>
+          </a:lnRef>
+          <a:fillRef idx="1">
+            <a:schemeClr val="accent1"/>
+          </a:fillRef>
+          <a:effectRef idx="0">
+            <a:schemeClr val="accent1"/>
+          </a:effectRef>
+          <a:fontRef idx="minor">
+            <a:schemeClr val="lt1"/>
+          </a:fontRef>
+        </p:style>
+        <p:txBody>
+          <a:bodyPr rtlCol="0" anchor="ctr"/>
+          <a:lstStyle/>
+          <a:p>
+            <a:pPr algn="ctr"/>
+            <a:endParaRPr lang="en-GB" dirty="0"/>
+          </a:p>
+        </p:txBody>
+      </p:sp>
+      <p:sp>
+        <p:nvSpPr>
           <p:cNvPr id="2" name="Title 1">
             <a:extLst>
               <a:ext uri="{FF2B5EF4-FFF2-40B4-BE49-F238E27FC236}">
@@ -3358,40 +3898,334 @@
             <p:ph type="ctrTitle"/>
           </p:nvPr>
         </p:nvSpPr>
+        <p:spPr>
+          <a:effectLst/>
+        </p:spPr>
+        <p:txBody>
+          <a:bodyPr/>
+          <a:lstStyle/>
+          <a:p>
+            <a:r>
+              <a:rPr lang="en-GB" dirty="0">
+                <a:solidFill>
+                  <a:schemeClr val="bg1"/>
+                </a:solidFill>
+                <a:effectLst>
+                  <a:outerShdw dist="25400" dir="5400000" algn="t" rotWithShape="0">
+                    <a:prstClr val="black">
+                      <a:alpha val="25000"/>
+                    </a:prstClr>
+                  </a:outerShdw>
+                </a:effectLst>
+              </a:rPr>
+              <a:t>A Multi-Node Quantum Network</a:t>
+            </a:r>
+            <a:br>
+              <a:rPr lang="en-GB" dirty="0">
+                <a:solidFill>
+                  <a:schemeClr val="bg1"/>
+                </a:solidFill>
+                <a:effectLst>
+                  <a:outerShdw dist="25400" dir="5400000" algn="t" rotWithShape="0">
+                    <a:prstClr val="black">
+                      <a:alpha val="25000"/>
+                    </a:prstClr>
+                  </a:outerShdw>
+                </a:effectLst>
+              </a:rPr>
+            </a:br>
+            <a:r>
+              <a:rPr lang="en-GB" dirty="0">
+                <a:solidFill>
+                  <a:schemeClr val="bg1"/>
+                </a:solidFill>
+                <a:effectLst>
+                  <a:outerShdw dist="25400" dir="5400000" algn="t" rotWithShape="0">
+                    <a:prstClr val="black">
+                      <a:alpha val="25000"/>
+                    </a:prstClr>
+                  </a:outerShdw>
+                </a:effectLst>
+              </a:rPr>
+              <a:t>with Defects in Diamond</a:t>
+            </a:r>
+            <a:endParaRPr lang="en-GB" dirty="0">
+              <a:solidFill>
+                <a:schemeClr val="bg1"/>
+              </a:solidFill>
+              <a:effectLst>
+                <a:outerShdw dist="25400" dir="5400000" algn="t" rotWithShape="0">
+                  <a:prstClr val="black">
+                    <a:alpha val="25000"/>
+                  </a:prstClr>
+                </a:outerShdw>
+              </a:effectLst>
+              <a:latin typeface="Oswald" panose="00000500000000000000" pitchFamily="2" charset="0"/>
+            </a:endParaRPr>
+          </a:p>
+        </p:txBody>
+      </p:sp>
+      <p:sp>
+        <p:nvSpPr>
+          <p:cNvPr id="3" name="Subtitle 2">
+            <a:extLst>
+              <a:ext uri="{FF2B5EF4-FFF2-40B4-BE49-F238E27FC236}">
+                <a16:creationId xmlns:a16="http://schemas.microsoft.com/office/drawing/2014/main" id="{35D181C8-0C2C-42A9-936F-3500987B9342}"/>
+              </a:ext>
+            </a:extLst>
+          </p:cNvPr>
+          <p:cNvSpPr>
+            <a:spLocks noGrp="1"/>
+          </p:cNvSpPr>
+          <p:nvPr>
+            <p:ph type="subTitle" idx="1"/>
+          </p:nvPr>
+        </p:nvSpPr>
         <p:spPr/>
         <p:txBody>
-          <a:bodyPr/>
-          <a:lstStyle/>
-          <a:p>
-            <a:endParaRPr lang="en-GB"/>
-          </a:p>
-        </p:txBody>
-      </p:sp>
-      <p:sp>
-        <p:nvSpPr>
-          <p:cNvPr id="3" name="Subtitle 2">
-            <a:extLst>
-              <a:ext uri="{FF2B5EF4-FFF2-40B4-BE49-F238E27FC236}">
-                <a16:creationId xmlns:a16="http://schemas.microsoft.com/office/drawing/2014/main" id="{35D181C8-0C2C-42A9-936F-3500987B9342}"/>
-              </a:ext>
-            </a:extLst>
-          </p:cNvPr>
-          <p:cNvSpPr>
-            <a:spLocks noGrp="1"/>
-          </p:cNvSpPr>
-          <p:nvPr>
-            <p:ph type="subTitle" idx="1"/>
-          </p:nvPr>
-        </p:nvSpPr>
-        <p:spPr/>
-        <p:txBody>
-          <a:bodyPr/>
-          <a:lstStyle/>
-          <a:p>
-            <a:endParaRPr lang="en-GB"/>
-          </a:p>
-        </p:txBody>
-      </p:sp>
+          <a:bodyPr>
+            <a:normAutofit/>
+          </a:bodyPr>
+          <a:lstStyle/>
+          <a:p>
+            <a:endParaRPr lang="en-GB" dirty="0">
+              <a:latin typeface="Lato" panose="020F0502020204030203" pitchFamily="34" charset="0"/>
+            </a:endParaRPr>
+          </a:p>
+          <a:p>
+            <a:r>
+              <a:rPr lang="en-GB" dirty="0">
+                <a:latin typeface="Lato" panose="020F0502020204030203" pitchFamily="34" charset="0"/>
+              </a:rPr>
+              <a:t>Ph.D. </a:t>
+            </a:r>
+            <a:r>
+              <a:rPr lang="en-GB">
+                <a:latin typeface="Lato" panose="020F0502020204030203" pitchFamily="34" charset="0"/>
+              </a:rPr>
+              <a:t>Proposal -</a:t>
+            </a:r>
+            <a:r>
+              <a:rPr lang="en-GB" dirty="0">
+                <a:latin typeface="Lato" panose="020F0502020204030203" pitchFamily="34" charset="0"/>
+              </a:rPr>
+              <a:t> </a:t>
+            </a:r>
+            <a:r>
+              <a:rPr lang="en-GB">
+                <a:latin typeface="Lato" panose="020F0502020204030203" pitchFamily="34" charset="0"/>
+              </a:rPr>
+              <a:t>Matteo </a:t>
+            </a:r>
+            <a:r>
+              <a:rPr lang="en-GB" dirty="0">
+                <a:latin typeface="Lato" panose="020F0502020204030203" pitchFamily="34" charset="0"/>
+              </a:rPr>
+              <a:t>Pompili</a:t>
+            </a:r>
+          </a:p>
+        </p:txBody>
+      </p:sp>
+      <p:grpSp>
+        <p:nvGrpSpPr>
+          <p:cNvPr id="15" name="Group 14">
+            <a:extLst>
+              <a:ext uri="{FF2B5EF4-FFF2-40B4-BE49-F238E27FC236}">
+                <a16:creationId xmlns:a16="http://schemas.microsoft.com/office/drawing/2014/main" id="{0BE8A880-C286-46FA-A3AC-8ED3D9E87618}"/>
+              </a:ext>
+            </a:extLst>
+          </p:cNvPr>
+          <p:cNvGrpSpPr/>
+          <p:nvPr/>
+        </p:nvGrpSpPr>
+        <p:grpSpPr>
+          <a:xfrm>
+            <a:off x="639515" y="5686960"/>
+            <a:ext cx="10912971" cy="693135"/>
+            <a:chOff x="431165" y="5686960"/>
+            <a:chExt cx="10912971" cy="693135"/>
+          </a:xfrm>
+        </p:grpSpPr>
+        <p:pic>
+          <p:nvPicPr>
+            <p:cNvPr id="5" name="Picture 4">
+              <a:extLst>
+                <a:ext uri="{FF2B5EF4-FFF2-40B4-BE49-F238E27FC236}">
+                  <a16:creationId xmlns:a16="http://schemas.microsoft.com/office/drawing/2014/main" id="{0E0E5A43-E242-4115-88B9-EF3B27D0740E}"/>
+                </a:ext>
+              </a:extLst>
+            </p:cNvPr>
+            <p:cNvPicPr>
+              <a:picLocks noChangeAspect="1"/>
+            </p:cNvPicPr>
+            <p:nvPr/>
+          </p:nvPicPr>
+          <p:blipFill>
+            <a:blip r:embed="rId2">
+              <a:extLst>
+                <a:ext uri="{28A0092B-C50C-407E-A947-70E740481C1C}">
+                  <a14:useLocalDpi xmlns:a14="http://schemas.microsoft.com/office/drawing/2010/main" val="0"/>
+                </a:ext>
+              </a:extLst>
+            </a:blip>
+            <a:stretch>
+              <a:fillRect/>
+            </a:stretch>
+          </p:blipFill>
+          <p:spPr>
+            <a:xfrm>
+              <a:off x="9037452" y="5701294"/>
+              <a:ext cx="2306684" cy="664466"/>
+            </a:xfrm>
+            <a:prstGeom prst="rect">
+              <a:avLst/>
+            </a:prstGeom>
+          </p:spPr>
+        </p:pic>
+        <p:pic>
+          <p:nvPicPr>
+            <p:cNvPr id="7" name="Picture 6">
+              <a:extLst>
+                <a:ext uri="{FF2B5EF4-FFF2-40B4-BE49-F238E27FC236}">
+                  <a16:creationId xmlns:a16="http://schemas.microsoft.com/office/drawing/2014/main" id="{0EF72CCE-1F82-46BC-B54C-29FE528BCF32}"/>
+                </a:ext>
+              </a:extLst>
+            </p:cNvPr>
+            <p:cNvPicPr>
+              <a:picLocks noChangeAspect="1"/>
+            </p:cNvPicPr>
+            <p:nvPr/>
+          </p:nvPicPr>
+          <p:blipFill>
+            <a:blip r:embed="rId3">
+              <a:extLst>
+                <a:ext uri="{28A0092B-C50C-407E-A947-70E740481C1C}">
+                  <a14:useLocalDpi xmlns:a14="http://schemas.microsoft.com/office/drawing/2010/main" val="0"/>
+                </a:ext>
+              </a:extLst>
+            </a:blip>
+            <a:stretch>
+              <a:fillRect/>
+            </a:stretch>
+          </p:blipFill>
+          <p:spPr>
+            <a:xfrm>
+              <a:off x="3015402" y="5696783"/>
+              <a:ext cx="653168" cy="673488"/>
+            </a:xfrm>
+            <a:prstGeom prst="rect">
+              <a:avLst/>
+            </a:prstGeom>
+          </p:spPr>
+        </p:pic>
+        <p:pic>
+          <p:nvPicPr>
+            <p:cNvPr id="9" name="Picture 8">
+              <a:extLst>
+                <a:ext uri="{FF2B5EF4-FFF2-40B4-BE49-F238E27FC236}">
+                  <a16:creationId xmlns:a16="http://schemas.microsoft.com/office/drawing/2014/main" id="{87802FB3-4E1A-4B84-98FB-EC7177DB3FB5}"/>
+                </a:ext>
+              </a:extLst>
+            </p:cNvPr>
+            <p:cNvPicPr>
+              <a:picLocks noChangeAspect="1"/>
+            </p:cNvPicPr>
+            <p:nvPr/>
+          </p:nvPicPr>
+          <p:blipFill>
+            <a:blip r:embed="rId4">
+              <a:extLst>
+                <a:ext uri="{28A0092B-C50C-407E-A947-70E740481C1C}">
+                  <a14:useLocalDpi xmlns:a14="http://schemas.microsoft.com/office/drawing/2010/main" val="0"/>
+                </a:ext>
+              </a:extLst>
+            </a:blip>
+            <a:stretch>
+              <a:fillRect/>
+            </a:stretch>
+          </p:blipFill>
+          <p:spPr>
+            <a:xfrm>
+              <a:off x="431165" y="5701294"/>
+              <a:ext cx="1702185" cy="664467"/>
+            </a:xfrm>
+            <a:prstGeom prst="rect">
+              <a:avLst/>
+            </a:prstGeom>
+          </p:spPr>
+        </p:pic>
+        <p:pic>
+          <p:nvPicPr>
+            <p:cNvPr id="11" name="Picture 10">
+              <a:extLst>
+                <a:ext uri="{FF2B5EF4-FFF2-40B4-BE49-F238E27FC236}">
+                  <a16:creationId xmlns:a16="http://schemas.microsoft.com/office/drawing/2014/main" id="{71F22C2D-7FB2-4357-B985-0BEDD60104DB}"/>
+                </a:ext>
+              </a:extLst>
+            </p:cNvPr>
+            <p:cNvPicPr>
+              <a:picLocks noChangeAspect="1"/>
+            </p:cNvPicPr>
+            <p:nvPr/>
+          </p:nvPicPr>
+          <p:blipFill>
+            <a:blip r:embed="rId5">
+              <a:extLst>
+                <a:ext uri="{28A0092B-C50C-407E-A947-70E740481C1C}">
+                  <a14:useLocalDpi xmlns:a14="http://schemas.microsoft.com/office/drawing/2010/main" val="0"/>
+                </a:ext>
+              </a:extLst>
+            </a:blip>
+            <a:stretch>
+              <a:fillRect/>
+            </a:stretch>
+          </p:blipFill>
+          <p:spPr>
+            <a:xfrm>
+              <a:off x="4550622" y="5686960"/>
+              <a:ext cx="1662572" cy="693135"/>
+            </a:xfrm>
+            <a:prstGeom prst="rect">
+              <a:avLst/>
+            </a:prstGeom>
+          </p:spPr>
+        </p:pic>
+        <p:pic>
+          <p:nvPicPr>
+            <p:cNvPr id="13" name="Picture 12">
+              <a:extLst>
+                <a:ext uri="{FF2B5EF4-FFF2-40B4-BE49-F238E27FC236}">
+                  <a16:creationId xmlns:a16="http://schemas.microsoft.com/office/drawing/2014/main" id="{960B8296-6273-41E4-B9CE-7C48B45DF117}"/>
+                </a:ext>
+              </a:extLst>
+            </p:cNvPr>
+            <p:cNvPicPr>
+              <a:picLocks noChangeAspect="1"/>
+            </p:cNvPicPr>
+            <p:nvPr/>
+          </p:nvPicPr>
+          <p:blipFill rotWithShape="1">
+            <a:blip r:embed="rId6">
+              <a:extLst>
+                <a:ext uri="{28A0092B-C50C-407E-A947-70E740481C1C}">
+                  <a14:useLocalDpi xmlns:a14="http://schemas.microsoft.com/office/drawing/2010/main" val="0"/>
+                </a:ext>
+              </a:extLst>
+            </a:blip>
+            <a:srcRect r="66607"/>
+            <a:stretch/>
+          </p:blipFill>
+          <p:spPr>
+            <a:xfrm>
+              <a:off x="7095246" y="5696784"/>
+              <a:ext cx="1060156" cy="673487"/>
+            </a:xfrm>
+            <a:prstGeom prst="rect">
+              <a:avLst/>
+            </a:prstGeom>
+          </p:spPr>
+        </p:pic>
+      </p:grpSp>
     </p:spTree>
     <p:extLst>
       <p:ext uri="{BB962C8B-B14F-4D97-AF65-F5344CB8AC3E}">
@@ -3405,7 +4239,373 @@
 </p:sld>
 </file>
 
+<file path=ppt/slides/slide2.xml><?xml version="1.0" encoding="utf-8"?>
+<p:sld xmlns:a="http://schemas.openxmlformats.org/drawingml/2006/main" xmlns:r="http://schemas.openxmlformats.org/officeDocument/2006/relationships" xmlns:p="http://schemas.openxmlformats.org/presentationml/2006/main">
+  <p:cSld>
+    <p:spTree>
+      <p:nvGrpSpPr>
+        <p:cNvPr id="1" name=""/>
+        <p:cNvGrpSpPr/>
+        <p:nvPr/>
+      </p:nvGrpSpPr>
+      <p:grpSpPr>
+        <a:xfrm>
+          <a:off x="0" y="0"/>
+          <a:ext cx="0" cy="0"/>
+          <a:chOff x="0" y="0"/>
+          <a:chExt cx="0" cy="0"/>
+        </a:xfrm>
+      </p:grpSpPr>
+      <p:sp>
+        <p:nvSpPr>
+          <p:cNvPr id="2" name="Title 1">
+            <a:extLst>
+              <a:ext uri="{FF2B5EF4-FFF2-40B4-BE49-F238E27FC236}">
+                <a16:creationId xmlns:a16="http://schemas.microsoft.com/office/drawing/2014/main" id="{79D1F416-776B-4843-A8FF-3500C39CDFA4}"/>
+              </a:ext>
+            </a:extLst>
+          </p:cNvPr>
+          <p:cNvSpPr>
+            <a:spLocks noGrp="1"/>
+          </p:cNvSpPr>
+          <p:nvPr>
+            <p:ph type="title"/>
+          </p:nvPr>
+        </p:nvSpPr>
+        <p:spPr/>
+        <p:txBody>
+          <a:bodyPr/>
+          <a:lstStyle/>
+          <a:p>
+            <a:endParaRPr lang="en-GB"/>
+          </a:p>
+        </p:txBody>
+      </p:sp>
+      <p:sp>
+        <p:nvSpPr>
+          <p:cNvPr id="3" name="Content Placeholder 2">
+            <a:extLst>
+              <a:ext uri="{FF2B5EF4-FFF2-40B4-BE49-F238E27FC236}">
+                <a16:creationId xmlns:a16="http://schemas.microsoft.com/office/drawing/2014/main" id="{BF561162-7D88-4D0D-8A94-05B2FF4E139A}"/>
+              </a:ext>
+            </a:extLst>
+          </p:cNvPr>
+          <p:cNvSpPr>
+            <a:spLocks noGrp="1"/>
+          </p:cNvSpPr>
+          <p:nvPr>
+            <p:ph idx="1"/>
+          </p:nvPr>
+        </p:nvSpPr>
+        <p:spPr/>
+        <p:txBody>
+          <a:bodyPr/>
+          <a:lstStyle/>
+          <a:p>
+            <a:endParaRPr lang="en-GB"/>
+          </a:p>
+        </p:txBody>
+      </p:sp>
+      <p:sp>
+        <p:nvSpPr>
+          <p:cNvPr id="4" name="Date Placeholder 3">
+            <a:extLst>
+              <a:ext uri="{FF2B5EF4-FFF2-40B4-BE49-F238E27FC236}">
+                <a16:creationId xmlns:a16="http://schemas.microsoft.com/office/drawing/2014/main" id="{C7E009AB-8BD0-4162-9EA8-028C2565EC4B}"/>
+              </a:ext>
+            </a:extLst>
+          </p:cNvPr>
+          <p:cNvSpPr>
+            <a:spLocks noGrp="1"/>
+          </p:cNvSpPr>
+          <p:nvPr>
+            <p:ph type="dt" sz="half" idx="10"/>
+          </p:nvPr>
+        </p:nvSpPr>
+        <p:spPr/>
+        <p:txBody>
+          <a:bodyPr/>
+          <a:lstStyle/>
+          <a:p>
+            <a:r>
+              <a:rPr lang="en-GB"/>
+              <a:t>23/11/2018</a:t>
+            </a:r>
+          </a:p>
+        </p:txBody>
+      </p:sp>
+      <p:sp>
+        <p:nvSpPr>
+          <p:cNvPr id="5" name="Footer Placeholder 4">
+            <a:extLst>
+              <a:ext uri="{FF2B5EF4-FFF2-40B4-BE49-F238E27FC236}">
+                <a16:creationId xmlns:a16="http://schemas.microsoft.com/office/drawing/2014/main" id="{2F3D8614-BEA7-4D46-B44F-F2D694B883D0}"/>
+              </a:ext>
+            </a:extLst>
+          </p:cNvPr>
+          <p:cNvSpPr>
+            <a:spLocks noGrp="1"/>
+          </p:cNvSpPr>
+          <p:nvPr>
+            <p:ph type="ftr" sz="quarter" idx="11"/>
+          </p:nvPr>
+        </p:nvSpPr>
+        <p:spPr/>
+        <p:txBody>
+          <a:bodyPr/>
+          <a:lstStyle/>
+          <a:p>
+            <a:r>
+              <a:rPr lang="en-GB" dirty="0"/>
+              <a:t>Matteo Pompili – First Year Proposal</a:t>
+            </a:r>
+          </a:p>
+        </p:txBody>
+      </p:sp>
+      <p:sp>
+        <p:nvSpPr>
+          <p:cNvPr id="6" name="Slide Number Placeholder 5">
+            <a:extLst>
+              <a:ext uri="{FF2B5EF4-FFF2-40B4-BE49-F238E27FC236}">
+                <a16:creationId xmlns:a16="http://schemas.microsoft.com/office/drawing/2014/main" id="{3C590C63-308D-4F05-8939-630D888B01FB}"/>
+              </a:ext>
+            </a:extLst>
+          </p:cNvPr>
+          <p:cNvSpPr>
+            <a:spLocks noGrp="1"/>
+          </p:cNvSpPr>
+          <p:nvPr>
+            <p:ph type="sldNum" sz="quarter" idx="12"/>
+          </p:nvPr>
+        </p:nvSpPr>
+        <p:spPr/>
+        <p:txBody>
+          <a:bodyPr/>
+          <a:lstStyle/>
+          <a:p>
+            <a:fld id="{C65EB005-FA87-4171-8C7C-FBB2804DF50E}" type="slidenum">
+              <a:rPr lang="en-GB" smtClean="0"/>
+              <a:t>2</a:t>
+            </a:fld>
+            <a:endParaRPr lang="en-GB"/>
+          </a:p>
+        </p:txBody>
+      </p:sp>
+    </p:spTree>
+    <p:extLst>
+      <p:ext uri="{BB962C8B-B14F-4D97-AF65-F5344CB8AC3E}">
+        <p14:creationId xmlns:p14="http://schemas.microsoft.com/office/powerpoint/2010/main" val="385159449"/>
+      </p:ext>
+    </p:extLst>
+  </p:cSld>
+  <p:clrMapOvr>
+    <a:masterClrMapping/>
+  </p:clrMapOvr>
+</p:sld>
+</file>
+
 <file path=ppt/theme/theme1.xml><?xml version="1.0" encoding="utf-8"?>
+<a:theme xmlns:a="http://schemas.openxmlformats.org/drawingml/2006/main" name="Office Theme">
+  <a:themeElements>
+    <a:clrScheme name="Office">
+      <a:dk1>
+        <a:sysClr val="windowText" lastClr="000000"/>
+      </a:dk1>
+      <a:lt1>
+        <a:sysClr val="window" lastClr="FFFFFF"/>
+      </a:lt1>
+      <a:dk2>
+        <a:srgbClr val="44546A"/>
+      </a:dk2>
+      <a:lt2>
+        <a:srgbClr val="E7E6E6"/>
+      </a:lt2>
+      <a:accent1>
+        <a:srgbClr val="4472C4"/>
+      </a:accent1>
+      <a:accent2>
+        <a:srgbClr val="ED7D31"/>
+      </a:accent2>
+      <a:accent3>
+        <a:srgbClr val="A5A5A5"/>
+      </a:accent3>
+      <a:accent4>
+        <a:srgbClr val="FFC000"/>
+      </a:accent4>
+      <a:accent5>
+        <a:srgbClr val="5B9BD5"/>
+      </a:accent5>
+      <a:accent6>
+        <a:srgbClr val="70AD47"/>
+      </a:accent6>
+      <a:hlink>
+        <a:srgbClr val="0563C1"/>
+      </a:hlink>
+      <a:folHlink>
+        <a:srgbClr val="954F72"/>
+      </a:folHlink>
+    </a:clrScheme>
+    <a:fontScheme name="Oswald Lato">
+      <a:majorFont>
+        <a:latin typeface="Oswald"/>
+        <a:ea typeface=""/>
+        <a:cs typeface=""/>
+      </a:majorFont>
+      <a:minorFont>
+        <a:latin typeface="Lato"/>
+        <a:ea typeface=""/>
+        <a:cs typeface=""/>
+      </a:minorFont>
+    </a:fontScheme>
+    <a:fmtScheme name="Office">
+      <a:fillStyleLst>
+        <a:solidFill>
+          <a:schemeClr val="phClr"/>
+        </a:solidFill>
+        <a:gradFill rotWithShape="1">
+          <a:gsLst>
+            <a:gs pos="0">
+              <a:schemeClr val="phClr">
+                <a:lumMod val="110000"/>
+                <a:satMod val="105000"/>
+                <a:tint val="67000"/>
+              </a:schemeClr>
+            </a:gs>
+            <a:gs pos="50000">
+              <a:schemeClr val="phClr">
+                <a:lumMod val="105000"/>
+                <a:satMod val="103000"/>
+                <a:tint val="73000"/>
+              </a:schemeClr>
+            </a:gs>
+            <a:gs pos="100000">
+              <a:schemeClr val="phClr">
+                <a:lumMod val="105000"/>
+                <a:satMod val="109000"/>
+                <a:tint val="81000"/>
+              </a:schemeClr>
+            </a:gs>
+          </a:gsLst>
+          <a:lin ang="5400000" scaled="0"/>
+        </a:gradFill>
+        <a:gradFill rotWithShape="1">
+          <a:gsLst>
+            <a:gs pos="0">
+              <a:schemeClr val="phClr">
+                <a:satMod val="103000"/>
+                <a:lumMod val="102000"/>
+                <a:tint val="94000"/>
+              </a:schemeClr>
+            </a:gs>
+            <a:gs pos="50000">
+              <a:schemeClr val="phClr">
+                <a:satMod val="110000"/>
+                <a:lumMod val="100000"/>
+                <a:shade val="100000"/>
+              </a:schemeClr>
+            </a:gs>
+            <a:gs pos="100000">
+              <a:schemeClr val="phClr">
+                <a:lumMod val="99000"/>
+                <a:satMod val="120000"/>
+                <a:shade val="78000"/>
+              </a:schemeClr>
+            </a:gs>
+          </a:gsLst>
+          <a:lin ang="5400000" scaled="0"/>
+        </a:gradFill>
+      </a:fillStyleLst>
+      <a:lnStyleLst>
+        <a:ln w="6350" cap="flat" cmpd="sng" algn="ctr">
+          <a:solidFill>
+            <a:schemeClr val="phClr"/>
+          </a:solidFill>
+          <a:prstDash val="solid"/>
+          <a:miter lim="800000"/>
+        </a:ln>
+        <a:ln w="12700" cap="flat" cmpd="sng" algn="ctr">
+          <a:solidFill>
+            <a:schemeClr val="phClr"/>
+          </a:solidFill>
+          <a:prstDash val="solid"/>
+          <a:miter lim="800000"/>
+        </a:ln>
+        <a:ln w="19050" cap="flat" cmpd="sng" algn="ctr">
+          <a:solidFill>
+            <a:schemeClr val="phClr"/>
+          </a:solidFill>
+          <a:prstDash val="solid"/>
+          <a:miter lim="800000"/>
+        </a:ln>
+      </a:lnStyleLst>
+      <a:effectStyleLst>
+        <a:effectStyle>
+          <a:effectLst/>
+        </a:effectStyle>
+        <a:effectStyle>
+          <a:effectLst/>
+        </a:effectStyle>
+        <a:effectStyle>
+          <a:effectLst>
+            <a:outerShdw blurRad="57150" dist="19050" dir="5400000" algn="ctr" rotWithShape="0">
+              <a:srgbClr val="000000">
+                <a:alpha val="63000"/>
+              </a:srgbClr>
+            </a:outerShdw>
+          </a:effectLst>
+        </a:effectStyle>
+      </a:effectStyleLst>
+      <a:bgFillStyleLst>
+        <a:solidFill>
+          <a:schemeClr val="phClr"/>
+        </a:solidFill>
+        <a:solidFill>
+          <a:schemeClr val="phClr">
+            <a:tint val="95000"/>
+            <a:satMod val="170000"/>
+          </a:schemeClr>
+        </a:solidFill>
+        <a:gradFill rotWithShape="1">
+          <a:gsLst>
+            <a:gs pos="0">
+              <a:schemeClr val="phClr">
+                <a:tint val="93000"/>
+                <a:satMod val="150000"/>
+                <a:shade val="98000"/>
+                <a:lumMod val="102000"/>
+              </a:schemeClr>
+            </a:gs>
+            <a:gs pos="50000">
+              <a:schemeClr val="phClr">
+                <a:tint val="98000"/>
+                <a:satMod val="130000"/>
+                <a:shade val="90000"/>
+                <a:lumMod val="103000"/>
+              </a:schemeClr>
+            </a:gs>
+            <a:gs pos="100000">
+              <a:schemeClr val="phClr">
+                <a:shade val="63000"/>
+                <a:satMod val="120000"/>
+              </a:schemeClr>
+            </a:gs>
+          </a:gsLst>
+          <a:lin ang="5400000" scaled="0"/>
+        </a:gradFill>
+      </a:bgFillStyleLst>
+    </a:fmtScheme>
+  </a:themeElements>
+  <a:objectDefaults/>
+  <a:extraClrSchemeLst/>
+  <a:extLst>
+    <a:ext uri="{05A4C25C-085E-4340-85A3-A5531E510DB2}">
+      <thm15:themeFamily xmlns:thm15="http://schemas.microsoft.com/office/thememl/2012/main" name="Office Theme" id="{62F939B6-93AF-4DB8-9C6B-D6C7DFDC589F}" vid="{4A3C46E8-61CC-4603-A589-7422A47A8E4A}"/>
+    </a:ext>
+  </a:extLst>
+</a:theme>
+</file>
+
+<file path=ppt/theme/theme2.xml><?xml version="1.0" encoding="utf-8"?>
 <a:theme xmlns:a="http://schemas.openxmlformats.org/drawingml/2006/main" name="Office Theme">
   <a:themeElements>
     <a:clrScheme name="Office">

</xml_diff>

<commit_message>
Progress on intro slides
</commit_message>
<xml_diff>
--- a/presentation/Go_NoGo_Presentation.pptx
+++ b/presentation/Go_NoGo_Presentation.pptx
@@ -5,41 +5,50 @@
     <p:sldMasterId id="2147483648" r:id="rId1"/>
   </p:sldMasterIdLst>
   <p:notesMasterIdLst>
-    <p:notesMasterId r:id="rId12"/>
+    <p:notesMasterId r:id="rId14"/>
   </p:notesMasterIdLst>
   <p:sldIdLst>
     <p:sldId id="256" r:id="rId2"/>
     <p:sldId id="259" r:id="rId3"/>
-    <p:sldId id="260" r:id="rId4"/>
-    <p:sldId id="257" r:id="rId5"/>
-    <p:sldId id="258" r:id="rId6"/>
-    <p:sldId id="262" r:id="rId7"/>
-    <p:sldId id="263" r:id="rId8"/>
-    <p:sldId id="264" r:id="rId9"/>
-    <p:sldId id="261" r:id="rId10"/>
-    <p:sldId id="265" r:id="rId11"/>
+    <p:sldId id="266" r:id="rId4"/>
+    <p:sldId id="267" r:id="rId5"/>
+    <p:sldId id="260" r:id="rId6"/>
+    <p:sldId id="257" r:id="rId7"/>
+    <p:sldId id="258" r:id="rId8"/>
+    <p:sldId id="262" r:id="rId9"/>
+    <p:sldId id="263" r:id="rId10"/>
+    <p:sldId id="264" r:id="rId11"/>
+    <p:sldId id="261" r:id="rId12"/>
+    <p:sldId id="265" r:id="rId13"/>
   </p:sldIdLst>
   <p:sldSz cx="12192000" cy="6858000"/>
   <p:notesSz cx="6858000" cy="9144000"/>
   <p:embeddedFontLst>
     <p:embeddedFont>
-      <p:font typeface="Calibri" panose="020F0502020204030204" pitchFamily="34" charset="0"/>
-      <p:regular r:id="rId13"/>
-      <p:bold r:id="rId14"/>
-      <p:italic r:id="rId15"/>
-      <p:boldItalic r:id="rId16"/>
+      <p:font typeface="Lato" panose="020B0604020202020204" charset="0"/>
+      <p:regular r:id="rId15"/>
+      <p:bold r:id="rId16"/>
+      <p:italic r:id="rId17"/>
+      <p:boldItalic r:id="rId18"/>
     </p:embeddedFont>
     <p:embeddedFont>
-      <p:font typeface="Lato" panose="020F0502020204030203" pitchFamily="34" charset="0"/>
-      <p:regular r:id="rId17"/>
-      <p:bold r:id="rId18"/>
-      <p:italic r:id="rId19"/>
-      <p:boldItalic r:id="rId20"/>
+      <p:font typeface="Oswald" panose="020B0604020202020204" charset="0"/>
+      <p:regular r:id="rId19"/>
+      <p:bold r:id="rId20"/>
     </p:embeddedFont>
     <p:embeddedFont>
-      <p:font typeface="Oswald" panose="00000500000000000000" pitchFamily="2" charset="0"/>
+      <p:font typeface="Constantia" panose="02030602050306030303" pitchFamily="18" charset="0"/>
       <p:regular r:id="rId21"/>
       <p:bold r:id="rId22"/>
+      <p:italic r:id="rId23"/>
+      <p:boldItalic r:id="rId24"/>
+    </p:embeddedFont>
+    <p:embeddedFont>
+      <p:font typeface="Calibri" panose="020F0502020204030204" pitchFamily="34" charset="0"/>
+      <p:regular r:id="rId25"/>
+      <p:bold r:id="rId26"/>
+      <p:italic r:id="rId27"/>
+      <p:boldItalic r:id="rId28"/>
     </p:embeddedFont>
   </p:embeddedFontLst>
   <p:defaultTextStyle>
@@ -139,7 +148,7 @@
   </p:defaultTextStyle>
   <p:extLst>
     <p:ext uri="{EFAFB233-063F-42B5-8137-9DF3F51BA10A}">
-      <p15:sldGuideLst xmlns:p15="http://schemas.microsoft.com/office/powerpoint/2012/main">
+      <p15:sldGuideLst xmlns:p15="http://schemas.microsoft.com/office/powerpoint/2012/main" xmlns="">
         <p15:guide id="1" orient="horz" pos="2160" userDrawn="1">
           <p15:clr>
             <a:srgbClr val="A4A3A4"/>
@@ -238,7 +247,7 @@
           <a:p>
             <a:fld id="{BFC1BEC5-FFAF-42E5-BAB7-4E2B346222C0}" type="datetimeFigureOut">
               <a:rPr lang="en-GB" smtClean="0"/>
-              <a:t>18/11/2018</a:t>
+              <a:t>19/11/2018</a:t>
             </a:fld>
             <a:endParaRPr lang="en-GB"/>
           </a:p>
@@ -528,7 +537,7 @@
           <p:cNvPr id="2" name="Title 1">
             <a:extLst>
               <a:ext uri="{FF2B5EF4-FFF2-40B4-BE49-F238E27FC236}">
-                <a16:creationId xmlns:a16="http://schemas.microsoft.com/office/drawing/2014/main" id="{7FC652B6-92F5-4C10-8093-51494F86F337}"/>
+                <a16:creationId xmlns:a16="http://schemas.microsoft.com/office/drawing/2014/main" xmlns="" id="{7FC652B6-92F5-4C10-8093-51494F86F337}"/>
               </a:ext>
             </a:extLst>
           </p:cNvPr>
@@ -566,7 +575,7 @@
           <p:cNvPr id="3" name="Subtitle 2">
             <a:extLst>
               <a:ext uri="{FF2B5EF4-FFF2-40B4-BE49-F238E27FC236}">
-                <a16:creationId xmlns:a16="http://schemas.microsoft.com/office/drawing/2014/main" id="{A796802E-79E5-4DB2-B96C-B2B0297975E4}"/>
+                <a16:creationId xmlns:a16="http://schemas.microsoft.com/office/drawing/2014/main" xmlns="" id="{A796802E-79E5-4DB2-B96C-B2B0297975E4}"/>
               </a:ext>
             </a:extLst>
           </p:cNvPr>
@@ -637,7 +646,7 @@
           <p:cNvPr id="4" name="Date Placeholder 3">
             <a:extLst>
               <a:ext uri="{FF2B5EF4-FFF2-40B4-BE49-F238E27FC236}">
-                <a16:creationId xmlns:a16="http://schemas.microsoft.com/office/drawing/2014/main" id="{E8649BE6-A035-4DD6-B9A1-17D4FC0CD4EA}"/>
+                <a16:creationId xmlns:a16="http://schemas.microsoft.com/office/drawing/2014/main" xmlns="" id="{E8649BE6-A035-4DD6-B9A1-17D4FC0CD4EA}"/>
               </a:ext>
             </a:extLst>
           </p:cNvPr>
@@ -666,7 +675,7 @@
           <p:cNvPr id="5" name="Footer Placeholder 4">
             <a:extLst>
               <a:ext uri="{FF2B5EF4-FFF2-40B4-BE49-F238E27FC236}">
-                <a16:creationId xmlns:a16="http://schemas.microsoft.com/office/drawing/2014/main" id="{3F5D8780-1F94-4490-927D-E1FF418990BA}"/>
+                <a16:creationId xmlns:a16="http://schemas.microsoft.com/office/drawing/2014/main" xmlns="" id="{3F5D8780-1F94-4490-927D-E1FF418990BA}"/>
               </a:ext>
             </a:extLst>
           </p:cNvPr>
@@ -694,7 +703,7 @@
           <p:cNvPr id="6" name="Slide Number Placeholder 5">
             <a:extLst>
               <a:ext uri="{FF2B5EF4-FFF2-40B4-BE49-F238E27FC236}">
-                <a16:creationId xmlns:a16="http://schemas.microsoft.com/office/drawing/2014/main" id="{13C73CE9-7127-4CF4-AB94-1D0471455F06}"/>
+                <a16:creationId xmlns:a16="http://schemas.microsoft.com/office/drawing/2014/main" xmlns="" id="{13C73CE9-7127-4CF4-AB94-1D0471455F06}"/>
               </a:ext>
             </a:extLst>
           </p:cNvPr>
@@ -753,7 +762,7 @@
           <p:cNvPr id="2" name="Title 1">
             <a:extLst>
               <a:ext uri="{FF2B5EF4-FFF2-40B4-BE49-F238E27FC236}">
-                <a16:creationId xmlns:a16="http://schemas.microsoft.com/office/drawing/2014/main" id="{910D891C-9440-4E9E-A13D-3FD14FFA3C40}"/>
+                <a16:creationId xmlns:a16="http://schemas.microsoft.com/office/drawing/2014/main" xmlns="" id="{910D891C-9440-4E9E-A13D-3FD14FFA3C40}"/>
               </a:ext>
             </a:extLst>
           </p:cNvPr>
@@ -782,7 +791,7 @@
           <p:cNvPr id="3" name="Vertical Text Placeholder 2">
             <a:extLst>
               <a:ext uri="{FF2B5EF4-FFF2-40B4-BE49-F238E27FC236}">
-                <a16:creationId xmlns:a16="http://schemas.microsoft.com/office/drawing/2014/main" id="{EF8C24D5-4AD8-44CA-921C-933816CF7BA5}"/>
+                <a16:creationId xmlns:a16="http://schemas.microsoft.com/office/drawing/2014/main" xmlns="" id="{EF8C24D5-4AD8-44CA-921C-933816CF7BA5}"/>
               </a:ext>
             </a:extLst>
           </p:cNvPr>
@@ -840,7 +849,7 @@
           <p:cNvPr id="4" name="Date Placeholder 3">
             <a:extLst>
               <a:ext uri="{FF2B5EF4-FFF2-40B4-BE49-F238E27FC236}">
-                <a16:creationId xmlns:a16="http://schemas.microsoft.com/office/drawing/2014/main" id="{A0889116-1BAF-42EC-8B07-9ADF339979CA}"/>
+                <a16:creationId xmlns:a16="http://schemas.microsoft.com/office/drawing/2014/main" xmlns="" id="{A0889116-1BAF-42EC-8B07-9ADF339979CA}"/>
               </a:ext>
             </a:extLst>
           </p:cNvPr>
@@ -868,7 +877,7 @@
           <p:cNvPr id="5" name="Footer Placeholder 4">
             <a:extLst>
               <a:ext uri="{FF2B5EF4-FFF2-40B4-BE49-F238E27FC236}">
-                <a16:creationId xmlns:a16="http://schemas.microsoft.com/office/drawing/2014/main" id="{71D840ED-C5FA-48B9-88EA-0D98B7EE319E}"/>
+                <a16:creationId xmlns:a16="http://schemas.microsoft.com/office/drawing/2014/main" xmlns="" id="{71D840ED-C5FA-48B9-88EA-0D98B7EE319E}"/>
               </a:ext>
             </a:extLst>
           </p:cNvPr>
@@ -896,7 +905,7 @@
           <p:cNvPr id="6" name="Slide Number Placeholder 5">
             <a:extLst>
               <a:ext uri="{FF2B5EF4-FFF2-40B4-BE49-F238E27FC236}">
-                <a16:creationId xmlns:a16="http://schemas.microsoft.com/office/drawing/2014/main" id="{C266EC96-9723-471B-9476-B2D3332B4140}"/>
+                <a16:creationId xmlns:a16="http://schemas.microsoft.com/office/drawing/2014/main" xmlns="" id="{C266EC96-9723-471B-9476-B2D3332B4140}"/>
               </a:ext>
             </a:extLst>
           </p:cNvPr>
@@ -955,7 +964,7 @@
           <p:cNvPr id="2" name="Vertical Title 1">
             <a:extLst>
               <a:ext uri="{FF2B5EF4-FFF2-40B4-BE49-F238E27FC236}">
-                <a16:creationId xmlns:a16="http://schemas.microsoft.com/office/drawing/2014/main" id="{648F476B-BD8C-4F42-AC6E-5B3C3753E136}"/>
+                <a16:creationId xmlns:a16="http://schemas.microsoft.com/office/drawing/2014/main" xmlns="" id="{648F476B-BD8C-4F42-AC6E-5B3C3753E136}"/>
               </a:ext>
             </a:extLst>
           </p:cNvPr>
@@ -989,7 +998,7 @@
           <p:cNvPr id="3" name="Vertical Text Placeholder 2">
             <a:extLst>
               <a:ext uri="{FF2B5EF4-FFF2-40B4-BE49-F238E27FC236}">
-                <a16:creationId xmlns:a16="http://schemas.microsoft.com/office/drawing/2014/main" id="{4881892C-9944-46F2-8B13-B3254BA17661}"/>
+                <a16:creationId xmlns:a16="http://schemas.microsoft.com/office/drawing/2014/main" xmlns="" id="{4881892C-9944-46F2-8B13-B3254BA17661}"/>
               </a:ext>
             </a:extLst>
           </p:cNvPr>
@@ -1052,7 +1061,7 @@
           <p:cNvPr id="4" name="Date Placeholder 3">
             <a:extLst>
               <a:ext uri="{FF2B5EF4-FFF2-40B4-BE49-F238E27FC236}">
-                <a16:creationId xmlns:a16="http://schemas.microsoft.com/office/drawing/2014/main" id="{E70F9E4C-2A23-44B9-9176-0E583DACCAC8}"/>
+                <a16:creationId xmlns:a16="http://schemas.microsoft.com/office/drawing/2014/main" xmlns="" id="{E70F9E4C-2A23-44B9-9176-0E583DACCAC8}"/>
               </a:ext>
             </a:extLst>
           </p:cNvPr>
@@ -1080,7 +1089,7 @@
           <p:cNvPr id="5" name="Footer Placeholder 4">
             <a:extLst>
               <a:ext uri="{FF2B5EF4-FFF2-40B4-BE49-F238E27FC236}">
-                <a16:creationId xmlns:a16="http://schemas.microsoft.com/office/drawing/2014/main" id="{F18E584B-C168-42B3-812D-D251AA261509}"/>
+                <a16:creationId xmlns:a16="http://schemas.microsoft.com/office/drawing/2014/main" xmlns="" id="{F18E584B-C168-42B3-812D-D251AA261509}"/>
               </a:ext>
             </a:extLst>
           </p:cNvPr>
@@ -1108,7 +1117,7 @@
           <p:cNvPr id="6" name="Slide Number Placeholder 5">
             <a:extLst>
               <a:ext uri="{FF2B5EF4-FFF2-40B4-BE49-F238E27FC236}">
-                <a16:creationId xmlns:a16="http://schemas.microsoft.com/office/drawing/2014/main" id="{C0DAF2D2-3B10-4BB1-85F7-F40CA3CA3191}"/>
+                <a16:creationId xmlns:a16="http://schemas.microsoft.com/office/drawing/2014/main" xmlns="" id="{C0DAF2D2-3B10-4BB1-85F7-F40CA3CA3191}"/>
               </a:ext>
             </a:extLst>
           </p:cNvPr>
@@ -1167,7 +1176,7 @@
           <p:cNvPr id="7" name="Rectangle 6">
             <a:extLst>
               <a:ext uri="{FF2B5EF4-FFF2-40B4-BE49-F238E27FC236}">
-                <a16:creationId xmlns:a16="http://schemas.microsoft.com/office/drawing/2014/main" id="{E57106A6-23B3-47DB-9211-0358820FBF36}"/>
+                <a16:creationId xmlns:a16="http://schemas.microsoft.com/office/drawing/2014/main" xmlns="" id="{E57106A6-23B3-47DB-9211-0358820FBF36}"/>
               </a:ext>
             </a:extLst>
           </p:cNvPr>
@@ -1221,7 +1230,7 @@
           <p:cNvPr id="2" name="Title 1">
             <a:extLst>
               <a:ext uri="{FF2B5EF4-FFF2-40B4-BE49-F238E27FC236}">
-                <a16:creationId xmlns:a16="http://schemas.microsoft.com/office/drawing/2014/main" id="{73E4760E-BD66-4A9B-8C6E-9AC448C48F6C}"/>
+                <a16:creationId xmlns:a16="http://schemas.microsoft.com/office/drawing/2014/main" xmlns="" id="{73E4760E-BD66-4A9B-8C6E-9AC448C48F6C}"/>
               </a:ext>
             </a:extLst>
           </p:cNvPr>
@@ -1265,7 +1274,7 @@
           <p:cNvPr id="3" name="Content Placeholder 2">
             <a:extLst>
               <a:ext uri="{FF2B5EF4-FFF2-40B4-BE49-F238E27FC236}">
-                <a16:creationId xmlns:a16="http://schemas.microsoft.com/office/drawing/2014/main" id="{6C8BB224-F908-4530-955A-B7794B4F4470}"/>
+                <a16:creationId xmlns:a16="http://schemas.microsoft.com/office/drawing/2014/main" xmlns="" id="{6C8BB224-F908-4530-955A-B7794B4F4470}"/>
               </a:ext>
             </a:extLst>
           </p:cNvPr>
@@ -1323,7 +1332,7 @@
           <p:cNvPr id="4" name="Date Placeholder 3">
             <a:extLst>
               <a:ext uri="{FF2B5EF4-FFF2-40B4-BE49-F238E27FC236}">
-                <a16:creationId xmlns:a16="http://schemas.microsoft.com/office/drawing/2014/main" id="{6640A871-D509-430D-AD1D-C1A845BCBA3B}"/>
+                <a16:creationId xmlns:a16="http://schemas.microsoft.com/office/drawing/2014/main" xmlns="" id="{6640A871-D509-430D-AD1D-C1A845BCBA3B}"/>
               </a:ext>
             </a:extLst>
           </p:cNvPr>
@@ -1351,7 +1360,7 @@
           <p:cNvPr id="5" name="Footer Placeholder 4">
             <a:extLst>
               <a:ext uri="{FF2B5EF4-FFF2-40B4-BE49-F238E27FC236}">
-                <a16:creationId xmlns:a16="http://schemas.microsoft.com/office/drawing/2014/main" id="{AFC79C84-5E67-446F-A4FF-2EF086276B69}"/>
+                <a16:creationId xmlns:a16="http://schemas.microsoft.com/office/drawing/2014/main" xmlns="" id="{AFC79C84-5E67-446F-A4FF-2EF086276B69}"/>
               </a:ext>
             </a:extLst>
           </p:cNvPr>
@@ -1379,7 +1388,7 @@
           <p:cNvPr id="6" name="Slide Number Placeholder 5">
             <a:extLst>
               <a:ext uri="{FF2B5EF4-FFF2-40B4-BE49-F238E27FC236}">
-                <a16:creationId xmlns:a16="http://schemas.microsoft.com/office/drawing/2014/main" id="{740B496C-3675-4FE9-89BB-76C949C7B379}"/>
+                <a16:creationId xmlns:a16="http://schemas.microsoft.com/office/drawing/2014/main" xmlns="" id="{740B496C-3675-4FE9-89BB-76C949C7B379}"/>
               </a:ext>
             </a:extLst>
           </p:cNvPr>
@@ -1438,7 +1447,7 @@
           <p:cNvPr id="2" name="Title 1">
             <a:extLst>
               <a:ext uri="{FF2B5EF4-FFF2-40B4-BE49-F238E27FC236}">
-                <a16:creationId xmlns:a16="http://schemas.microsoft.com/office/drawing/2014/main" id="{20771DB5-329D-4933-B54D-66CB912A45A1}"/>
+                <a16:creationId xmlns:a16="http://schemas.microsoft.com/office/drawing/2014/main" xmlns="" id="{20771DB5-329D-4933-B54D-66CB912A45A1}"/>
               </a:ext>
             </a:extLst>
           </p:cNvPr>
@@ -1476,7 +1485,7 @@
           <p:cNvPr id="3" name="Text Placeholder 2">
             <a:extLst>
               <a:ext uri="{FF2B5EF4-FFF2-40B4-BE49-F238E27FC236}">
-                <a16:creationId xmlns:a16="http://schemas.microsoft.com/office/drawing/2014/main" id="{2C49264E-6080-4653-AE92-237CED09F8BA}"/>
+                <a16:creationId xmlns:a16="http://schemas.microsoft.com/office/drawing/2014/main" xmlns="" id="{2C49264E-6080-4653-AE92-237CED09F8BA}"/>
               </a:ext>
             </a:extLst>
           </p:cNvPr>
@@ -1601,7 +1610,7 @@
           <p:cNvPr id="4" name="Date Placeholder 3">
             <a:extLst>
               <a:ext uri="{FF2B5EF4-FFF2-40B4-BE49-F238E27FC236}">
-                <a16:creationId xmlns:a16="http://schemas.microsoft.com/office/drawing/2014/main" id="{85E57D42-2381-4265-927A-17B2576DF4AA}"/>
+                <a16:creationId xmlns:a16="http://schemas.microsoft.com/office/drawing/2014/main" xmlns="" id="{85E57D42-2381-4265-927A-17B2576DF4AA}"/>
               </a:ext>
             </a:extLst>
           </p:cNvPr>
@@ -1629,7 +1638,7 @@
           <p:cNvPr id="5" name="Footer Placeholder 4">
             <a:extLst>
               <a:ext uri="{FF2B5EF4-FFF2-40B4-BE49-F238E27FC236}">
-                <a16:creationId xmlns:a16="http://schemas.microsoft.com/office/drawing/2014/main" id="{499CAA6B-3F84-42F2-877A-7C8F1168A58A}"/>
+                <a16:creationId xmlns:a16="http://schemas.microsoft.com/office/drawing/2014/main" xmlns="" id="{499CAA6B-3F84-42F2-877A-7C8F1168A58A}"/>
               </a:ext>
             </a:extLst>
           </p:cNvPr>
@@ -1657,7 +1666,7 @@
           <p:cNvPr id="6" name="Slide Number Placeholder 5">
             <a:extLst>
               <a:ext uri="{FF2B5EF4-FFF2-40B4-BE49-F238E27FC236}">
-                <a16:creationId xmlns:a16="http://schemas.microsoft.com/office/drawing/2014/main" id="{F664DB4D-F1A8-45C0-ACAB-39D27E2E1144}"/>
+                <a16:creationId xmlns:a16="http://schemas.microsoft.com/office/drawing/2014/main" xmlns="" id="{F664DB4D-F1A8-45C0-ACAB-39D27E2E1144}"/>
               </a:ext>
             </a:extLst>
           </p:cNvPr>
@@ -1716,7 +1725,7 @@
           <p:cNvPr id="2" name="Title 1">
             <a:extLst>
               <a:ext uri="{FF2B5EF4-FFF2-40B4-BE49-F238E27FC236}">
-                <a16:creationId xmlns:a16="http://schemas.microsoft.com/office/drawing/2014/main" id="{5E364E69-6708-48BA-AB0D-FDFBEB8CFC24}"/>
+                <a16:creationId xmlns:a16="http://schemas.microsoft.com/office/drawing/2014/main" xmlns="" id="{5E364E69-6708-48BA-AB0D-FDFBEB8CFC24}"/>
               </a:ext>
             </a:extLst>
           </p:cNvPr>
@@ -1745,7 +1754,7 @@
           <p:cNvPr id="3" name="Content Placeholder 2">
             <a:extLst>
               <a:ext uri="{FF2B5EF4-FFF2-40B4-BE49-F238E27FC236}">
-                <a16:creationId xmlns:a16="http://schemas.microsoft.com/office/drawing/2014/main" id="{D4FD9A8E-AFE3-482F-B015-ACEF4BC53ABF}"/>
+                <a16:creationId xmlns:a16="http://schemas.microsoft.com/office/drawing/2014/main" xmlns="" id="{D4FD9A8E-AFE3-482F-B015-ACEF4BC53ABF}"/>
               </a:ext>
             </a:extLst>
           </p:cNvPr>
@@ -1808,7 +1817,7 @@
           <p:cNvPr id="4" name="Content Placeholder 3">
             <a:extLst>
               <a:ext uri="{FF2B5EF4-FFF2-40B4-BE49-F238E27FC236}">
-                <a16:creationId xmlns:a16="http://schemas.microsoft.com/office/drawing/2014/main" id="{A39E927C-2619-43E6-B4AB-7BAB15DE3B2E}"/>
+                <a16:creationId xmlns:a16="http://schemas.microsoft.com/office/drawing/2014/main" xmlns="" id="{A39E927C-2619-43E6-B4AB-7BAB15DE3B2E}"/>
               </a:ext>
             </a:extLst>
           </p:cNvPr>
@@ -1871,7 +1880,7 @@
           <p:cNvPr id="5" name="Date Placeholder 4">
             <a:extLst>
               <a:ext uri="{FF2B5EF4-FFF2-40B4-BE49-F238E27FC236}">
-                <a16:creationId xmlns:a16="http://schemas.microsoft.com/office/drawing/2014/main" id="{F756F779-1A5F-425E-A52D-E5BDB783D936}"/>
+                <a16:creationId xmlns:a16="http://schemas.microsoft.com/office/drawing/2014/main" xmlns="" id="{F756F779-1A5F-425E-A52D-E5BDB783D936}"/>
               </a:ext>
             </a:extLst>
           </p:cNvPr>
@@ -1899,7 +1908,7 @@
           <p:cNvPr id="6" name="Footer Placeholder 5">
             <a:extLst>
               <a:ext uri="{FF2B5EF4-FFF2-40B4-BE49-F238E27FC236}">
-                <a16:creationId xmlns:a16="http://schemas.microsoft.com/office/drawing/2014/main" id="{B1E33CE2-452C-4F29-B303-0F33D8D80230}"/>
+                <a16:creationId xmlns:a16="http://schemas.microsoft.com/office/drawing/2014/main" xmlns="" id="{B1E33CE2-452C-4F29-B303-0F33D8D80230}"/>
               </a:ext>
             </a:extLst>
           </p:cNvPr>
@@ -1927,7 +1936,7 @@
           <p:cNvPr id="7" name="Slide Number Placeholder 6">
             <a:extLst>
               <a:ext uri="{FF2B5EF4-FFF2-40B4-BE49-F238E27FC236}">
-                <a16:creationId xmlns:a16="http://schemas.microsoft.com/office/drawing/2014/main" id="{8A23760E-B40B-4999-9E8C-9344192E8055}"/>
+                <a16:creationId xmlns:a16="http://schemas.microsoft.com/office/drawing/2014/main" xmlns="" id="{8A23760E-B40B-4999-9E8C-9344192E8055}"/>
               </a:ext>
             </a:extLst>
           </p:cNvPr>
@@ -1986,7 +1995,7 @@
           <p:cNvPr id="2" name="Title 1">
             <a:extLst>
               <a:ext uri="{FF2B5EF4-FFF2-40B4-BE49-F238E27FC236}">
-                <a16:creationId xmlns:a16="http://schemas.microsoft.com/office/drawing/2014/main" id="{4FE1D64B-CD97-4694-B391-0C45C93213CD}"/>
+                <a16:creationId xmlns:a16="http://schemas.microsoft.com/office/drawing/2014/main" xmlns="" id="{4FE1D64B-CD97-4694-B391-0C45C93213CD}"/>
               </a:ext>
             </a:extLst>
           </p:cNvPr>
@@ -2020,7 +2029,7 @@
           <p:cNvPr id="3" name="Text Placeholder 2">
             <a:extLst>
               <a:ext uri="{FF2B5EF4-FFF2-40B4-BE49-F238E27FC236}">
-                <a16:creationId xmlns:a16="http://schemas.microsoft.com/office/drawing/2014/main" id="{AF63BFE1-3BB9-4980-A648-17E6179F6AC2}"/>
+                <a16:creationId xmlns:a16="http://schemas.microsoft.com/office/drawing/2014/main" xmlns="" id="{AF63BFE1-3BB9-4980-A648-17E6179F6AC2}"/>
               </a:ext>
             </a:extLst>
           </p:cNvPr>
@@ -2091,7 +2100,7 @@
           <p:cNvPr id="4" name="Content Placeholder 3">
             <a:extLst>
               <a:ext uri="{FF2B5EF4-FFF2-40B4-BE49-F238E27FC236}">
-                <a16:creationId xmlns:a16="http://schemas.microsoft.com/office/drawing/2014/main" id="{3F12E616-A70F-4EA8-9C4D-A48FD1D82792}"/>
+                <a16:creationId xmlns:a16="http://schemas.microsoft.com/office/drawing/2014/main" xmlns="" id="{3F12E616-A70F-4EA8-9C4D-A48FD1D82792}"/>
               </a:ext>
             </a:extLst>
           </p:cNvPr>
@@ -2154,7 +2163,7 @@
           <p:cNvPr id="5" name="Text Placeholder 4">
             <a:extLst>
               <a:ext uri="{FF2B5EF4-FFF2-40B4-BE49-F238E27FC236}">
-                <a16:creationId xmlns:a16="http://schemas.microsoft.com/office/drawing/2014/main" id="{AEDF44F3-2658-42C2-9FA0-BBBB723F7D92}"/>
+                <a16:creationId xmlns:a16="http://schemas.microsoft.com/office/drawing/2014/main" xmlns="" id="{AEDF44F3-2658-42C2-9FA0-BBBB723F7D92}"/>
               </a:ext>
             </a:extLst>
           </p:cNvPr>
@@ -2225,7 +2234,7 @@
           <p:cNvPr id="6" name="Content Placeholder 5">
             <a:extLst>
               <a:ext uri="{FF2B5EF4-FFF2-40B4-BE49-F238E27FC236}">
-                <a16:creationId xmlns:a16="http://schemas.microsoft.com/office/drawing/2014/main" id="{8A5A9136-F974-4220-B52D-66716F3982DF}"/>
+                <a16:creationId xmlns:a16="http://schemas.microsoft.com/office/drawing/2014/main" xmlns="" id="{8A5A9136-F974-4220-B52D-66716F3982DF}"/>
               </a:ext>
             </a:extLst>
           </p:cNvPr>
@@ -2288,7 +2297,7 @@
           <p:cNvPr id="7" name="Date Placeholder 6">
             <a:extLst>
               <a:ext uri="{FF2B5EF4-FFF2-40B4-BE49-F238E27FC236}">
-                <a16:creationId xmlns:a16="http://schemas.microsoft.com/office/drawing/2014/main" id="{9F5F0572-D989-4AC9-B938-27A5395E2A38}"/>
+                <a16:creationId xmlns:a16="http://schemas.microsoft.com/office/drawing/2014/main" xmlns="" id="{9F5F0572-D989-4AC9-B938-27A5395E2A38}"/>
               </a:ext>
             </a:extLst>
           </p:cNvPr>
@@ -2316,7 +2325,7 @@
           <p:cNvPr id="8" name="Footer Placeholder 7">
             <a:extLst>
               <a:ext uri="{FF2B5EF4-FFF2-40B4-BE49-F238E27FC236}">
-                <a16:creationId xmlns:a16="http://schemas.microsoft.com/office/drawing/2014/main" id="{3AF9219E-8255-47E0-B83B-BE4F75099E0D}"/>
+                <a16:creationId xmlns:a16="http://schemas.microsoft.com/office/drawing/2014/main" xmlns="" id="{3AF9219E-8255-47E0-B83B-BE4F75099E0D}"/>
               </a:ext>
             </a:extLst>
           </p:cNvPr>
@@ -2344,7 +2353,7 @@
           <p:cNvPr id="9" name="Slide Number Placeholder 8">
             <a:extLst>
               <a:ext uri="{FF2B5EF4-FFF2-40B4-BE49-F238E27FC236}">
-                <a16:creationId xmlns:a16="http://schemas.microsoft.com/office/drawing/2014/main" id="{BF0D8E78-83DA-4C04-B128-573632E594E5}"/>
+                <a16:creationId xmlns:a16="http://schemas.microsoft.com/office/drawing/2014/main" xmlns="" id="{BF0D8E78-83DA-4C04-B128-573632E594E5}"/>
               </a:ext>
             </a:extLst>
           </p:cNvPr>
@@ -2403,7 +2412,7 @@
           <p:cNvPr id="2" name="Title 1">
             <a:extLst>
               <a:ext uri="{FF2B5EF4-FFF2-40B4-BE49-F238E27FC236}">
-                <a16:creationId xmlns:a16="http://schemas.microsoft.com/office/drawing/2014/main" id="{A2E908A0-151D-40DB-8960-1676966B2DEE}"/>
+                <a16:creationId xmlns:a16="http://schemas.microsoft.com/office/drawing/2014/main" xmlns="" id="{A2E908A0-151D-40DB-8960-1676966B2DEE}"/>
               </a:ext>
             </a:extLst>
           </p:cNvPr>
@@ -2432,7 +2441,7 @@
           <p:cNvPr id="3" name="Date Placeholder 2">
             <a:extLst>
               <a:ext uri="{FF2B5EF4-FFF2-40B4-BE49-F238E27FC236}">
-                <a16:creationId xmlns:a16="http://schemas.microsoft.com/office/drawing/2014/main" id="{A2C30B44-A59D-4D10-8705-4AF760BC6D5A}"/>
+                <a16:creationId xmlns:a16="http://schemas.microsoft.com/office/drawing/2014/main" xmlns="" id="{A2C30B44-A59D-4D10-8705-4AF760BC6D5A}"/>
               </a:ext>
             </a:extLst>
           </p:cNvPr>
@@ -2460,7 +2469,7 @@
           <p:cNvPr id="4" name="Footer Placeholder 3">
             <a:extLst>
               <a:ext uri="{FF2B5EF4-FFF2-40B4-BE49-F238E27FC236}">
-                <a16:creationId xmlns:a16="http://schemas.microsoft.com/office/drawing/2014/main" id="{B4CFBF68-EE48-4D6F-AD31-4EB2F2EC785D}"/>
+                <a16:creationId xmlns:a16="http://schemas.microsoft.com/office/drawing/2014/main" xmlns="" id="{B4CFBF68-EE48-4D6F-AD31-4EB2F2EC785D}"/>
               </a:ext>
             </a:extLst>
           </p:cNvPr>
@@ -2488,7 +2497,7 @@
           <p:cNvPr id="5" name="Slide Number Placeholder 4">
             <a:extLst>
               <a:ext uri="{FF2B5EF4-FFF2-40B4-BE49-F238E27FC236}">
-                <a16:creationId xmlns:a16="http://schemas.microsoft.com/office/drawing/2014/main" id="{B0267B72-35E2-4266-9479-26AD2FB64143}"/>
+                <a16:creationId xmlns:a16="http://schemas.microsoft.com/office/drawing/2014/main" xmlns="" id="{B0267B72-35E2-4266-9479-26AD2FB64143}"/>
               </a:ext>
             </a:extLst>
           </p:cNvPr>
@@ -2547,7 +2556,7 @@
           <p:cNvPr id="2" name="Date Placeholder 1">
             <a:extLst>
               <a:ext uri="{FF2B5EF4-FFF2-40B4-BE49-F238E27FC236}">
-                <a16:creationId xmlns:a16="http://schemas.microsoft.com/office/drawing/2014/main" id="{7459B65B-13CE-4113-8394-765EA3C33CDA}"/>
+                <a16:creationId xmlns:a16="http://schemas.microsoft.com/office/drawing/2014/main" xmlns="" id="{7459B65B-13CE-4113-8394-765EA3C33CDA}"/>
               </a:ext>
             </a:extLst>
           </p:cNvPr>
@@ -2575,7 +2584,7 @@
           <p:cNvPr id="3" name="Footer Placeholder 2">
             <a:extLst>
               <a:ext uri="{FF2B5EF4-FFF2-40B4-BE49-F238E27FC236}">
-                <a16:creationId xmlns:a16="http://schemas.microsoft.com/office/drawing/2014/main" id="{4CBA28CB-DB96-4130-AD7A-F63F1330C475}"/>
+                <a16:creationId xmlns:a16="http://schemas.microsoft.com/office/drawing/2014/main" xmlns="" id="{4CBA28CB-DB96-4130-AD7A-F63F1330C475}"/>
               </a:ext>
             </a:extLst>
           </p:cNvPr>
@@ -2603,7 +2612,7 @@
           <p:cNvPr id="4" name="Slide Number Placeholder 3">
             <a:extLst>
               <a:ext uri="{FF2B5EF4-FFF2-40B4-BE49-F238E27FC236}">
-                <a16:creationId xmlns:a16="http://schemas.microsoft.com/office/drawing/2014/main" id="{4C2F95E9-D150-4439-8E74-E9B117E63A62}"/>
+                <a16:creationId xmlns:a16="http://schemas.microsoft.com/office/drawing/2014/main" xmlns="" id="{4C2F95E9-D150-4439-8E74-E9B117E63A62}"/>
               </a:ext>
             </a:extLst>
           </p:cNvPr>
@@ -2662,7 +2671,7 @@
           <p:cNvPr id="2" name="Title 1">
             <a:extLst>
               <a:ext uri="{FF2B5EF4-FFF2-40B4-BE49-F238E27FC236}">
-                <a16:creationId xmlns:a16="http://schemas.microsoft.com/office/drawing/2014/main" id="{9452A0CA-FB89-42F1-837A-5B153AD5D3A9}"/>
+                <a16:creationId xmlns:a16="http://schemas.microsoft.com/office/drawing/2014/main" xmlns="" id="{9452A0CA-FB89-42F1-837A-5B153AD5D3A9}"/>
               </a:ext>
             </a:extLst>
           </p:cNvPr>
@@ -2700,7 +2709,7 @@
           <p:cNvPr id="3" name="Content Placeholder 2">
             <a:extLst>
               <a:ext uri="{FF2B5EF4-FFF2-40B4-BE49-F238E27FC236}">
-                <a16:creationId xmlns:a16="http://schemas.microsoft.com/office/drawing/2014/main" id="{9E482D2F-973B-4C21-8854-9387AB8C517D}"/>
+                <a16:creationId xmlns:a16="http://schemas.microsoft.com/office/drawing/2014/main" xmlns="" id="{9E482D2F-973B-4C21-8854-9387AB8C517D}"/>
               </a:ext>
             </a:extLst>
           </p:cNvPr>
@@ -2791,7 +2800,7 @@
           <p:cNvPr id="4" name="Text Placeholder 3">
             <a:extLst>
               <a:ext uri="{FF2B5EF4-FFF2-40B4-BE49-F238E27FC236}">
-                <a16:creationId xmlns:a16="http://schemas.microsoft.com/office/drawing/2014/main" id="{9D7CC838-1E09-4498-8348-C9BB701AFE0F}"/>
+                <a16:creationId xmlns:a16="http://schemas.microsoft.com/office/drawing/2014/main" xmlns="" id="{9D7CC838-1E09-4498-8348-C9BB701AFE0F}"/>
               </a:ext>
             </a:extLst>
           </p:cNvPr>
@@ -2862,7 +2871,7 @@
           <p:cNvPr id="5" name="Date Placeholder 4">
             <a:extLst>
               <a:ext uri="{FF2B5EF4-FFF2-40B4-BE49-F238E27FC236}">
-                <a16:creationId xmlns:a16="http://schemas.microsoft.com/office/drawing/2014/main" id="{18A4079E-8F31-4964-A287-4A6BB84BF0D1}"/>
+                <a16:creationId xmlns:a16="http://schemas.microsoft.com/office/drawing/2014/main" xmlns="" id="{18A4079E-8F31-4964-A287-4A6BB84BF0D1}"/>
               </a:ext>
             </a:extLst>
           </p:cNvPr>
@@ -2890,7 +2899,7 @@
           <p:cNvPr id="6" name="Footer Placeholder 5">
             <a:extLst>
               <a:ext uri="{FF2B5EF4-FFF2-40B4-BE49-F238E27FC236}">
-                <a16:creationId xmlns:a16="http://schemas.microsoft.com/office/drawing/2014/main" id="{49E70FF1-EDB1-4E40-A95A-2F4DE39925FC}"/>
+                <a16:creationId xmlns:a16="http://schemas.microsoft.com/office/drawing/2014/main" xmlns="" id="{49E70FF1-EDB1-4E40-A95A-2F4DE39925FC}"/>
               </a:ext>
             </a:extLst>
           </p:cNvPr>
@@ -2918,7 +2927,7 @@
           <p:cNvPr id="7" name="Slide Number Placeholder 6">
             <a:extLst>
               <a:ext uri="{FF2B5EF4-FFF2-40B4-BE49-F238E27FC236}">
-                <a16:creationId xmlns:a16="http://schemas.microsoft.com/office/drawing/2014/main" id="{7CD2C22A-C089-4328-A678-09404246DF3F}"/>
+                <a16:creationId xmlns:a16="http://schemas.microsoft.com/office/drawing/2014/main" xmlns="" id="{7CD2C22A-C089-4328-A678-09404246DF3F}"/>
               </a:ext>
             </a:extLst>
           </p:cNvPr>
@@ -2977,7 +2986,7 @@
           <p:cNvPr id="2" name="Title 1">
             <a:extLst>
               <a:ext uri="{FF2B5EF4-FFF2-40B4-BE49-F238E27FC236}">
-                <a16:creationId xmlns:a16="http://schemas.microsoft.com/office/drawing/2014/main" id="{512D6421-C36E-49BA-8976-6BFF11606746}"/>
+                <a16:creationId xmlns:a16="http://schemas.microsoft.com/office/drawing/2014/main" xmlns="" id="{512D6421-C36E-49BA-8976-6BFF11606746}"/>
               </a:ext>
             </a:extLst>
           </p:cNvPr>
@@ -3015,7 +3024,7 @@
           <p:cNvPr id="3" name="Picture Placeholder 2">
             <a:extLst>
               <a:ext uri="{FF2B5EF4-FFF2-40B4-BE49-F238E27FC236}">
-                <a16:creationId xmlns:a16="http://schemas.microsoft.com/office/drawing/2014/main" id="{A82CEBA7-AC8A-46AF-B4BC-D3352612C684}"/>
+                <a16:creationId xmlns:a16="http://schemas.microsoft.com/office/drawing/2014/main" xmlns="" id="{A82CEBA7-AC8A-46AF-B4BC-D3352612C684}"/>
               </a:ext>
             </a:extLst>
           </p:cNvPr>
@@ -3082,7 +3091,7 @@
           <p:cNvPr id="4" name="Text Placeholder 3">
             <a:extLst>
               <a:ext uri="{FF2B5EF4-FFF2-40B4-BE49-F238E27FC236}">
-                <a16:creationId xmlns:a16="http://schemas.microsoft.com/office/drawing/2014/main" id="{406B9D9A-C266-4396-8AC1-A3F8E2C3F09E}"/>
+                <a16:creationId xmlns:a16="http://schemas.microsoft.com/office/drawing/2014/main" xmlns="" id="{406B9D9A-C266-4396-8AC1-A3F8E2C3F09E}"/>
               </a:ext>
             </a:extLst>
           </p:cNvPr>
@@ -3153,7 +3162,7 @@
           <p:cNvPr id="5" name="Date Placeholder 4">
             <a:extLst>
               <a:ext uri="{FF2B5EF4-FFF2-40B4-BE49-F238E27FC236}">
-                <a16:creationId xmlns:a16="http://schemas.microsoft.com/office/drawing/2014/main" id="{F713B861-875A-45AA-9509-EC4DA8A7EF23}"/>
+                <a16:creationId xmlns:a16="http://schemas.microsoft.com/office/drawing/2014/main" xmlns="" id="{F713B861-875A-45AA-9509-EC4DA8A7EF23}"/>
               </a:ext>
             </a:extLst>
           </p:cNvPr>
@@ -3181,7 +3190,7 @@
           <p:cNvPr id="6" name="Footer Placeholder 5">
             <a:extLst>
               <a:ext uri="{FF2B5EF4-FFF2-40B4-BE49-F238E27FC236}">
-                <a16:creationId xmlns:a16="http://schemas.microsoft.com/office/drawing/2014/main" id="{6B0F0CDA-2999-4D42-BE21-26B6FF7721DD}"/>
+                <a16:creationId xmlns:a16="http://schemas.microsoft.com/office/drawing/2014/main" xmlns="" id="{6B0F0CDA-2999-4D42-BE21-26B6FF7721DD}"/>
               </a:ext>
             </a:extLst>
           </p:cNvPr>
@@ -3209,7 +3218,7 @@
           <p:cNvPr id="7" name="Slide Number Placeholder 6">
             <a:extLst>
               <a:ext uri="{FF2B5EF4-FFF2-40B4-BE49-F238E27FC236}">
-                <a16:creationId xmlns:a16="http://schemas.microsoft.com/office/drawing/2014/main" id="{B90EB0E6-471C-41CF-B828-3D27ADD1AED0}"/>
+                <a16:creationId xmlns:a16="http://schemas.microsoft.com/office/drawing/2014/main" xmlns="" id="{B90EB0E6-471C-41CF-B828-3D27ADD1AED0}"/>
               </a:ext>
             </a:extLst>
           </p:cNvPr>
@@ -3273,7 +3282,7 @@
           <p:cNvPr id="2" name="Title Placeholder 1">
             <a:extLst>
               <a:ext uri="{FF2B5EF4-FFF2-40B4-BE49-F238E27FC236}">
-                <a16:creationId xmlns:a16="http://schemas.microsoft.com/office/drawing/2014/main" id="{B3B381D8-D1FB-4C6B-9D69-894B9A5C721D}"/>
+                <a16:creationId xmlns:a16="http://schemas.microsoft.com/office/drawing/2014/main" xmlns="" id="{B3B381D8-D1FB-4C6B-9D69-894B9A5C721D}"/>
               </a:ext>
             </a:extLst>
           </p:cNvPr>
@@ -3312,7 +3321,7 @@
           <p:cNvPr id="3" name="Text Placeholder 2">
             <a:extLst>
               <a:ext uri="{FF2B5EF4-FFF2-40B4-BE49-F238E27FC236}">
-                <a16:creationId xmlns:a16="http://schemas.microsoft.com/office/drawing/2014/main" id="{98A4D415-BA9B-4E64-B82E-95A6D68E561B}"/>
+                <a16:creationId xmlns:a16="http://schemas.microsoft.com/office/drawing/2014/main" xmlns="" id="{98A4D415-BA9B-4E64-B82E-95A6D68E561B}"/>
               </a:ext>
             </a:extLst>
           </p:cNvPr>
@@ -3380,7 +3389,7 @@
           <p:cNvPr id="4" name="Date Placeholder 3">
             <a:extLst>
               <a:ext uri="{FF2B5EF4-FFF2-40B4-BE49-F238E27FC236}">
-                <a16:creationId xmlns:a16="http://schemas.microsoft.com/office/drawing/2014/main" id="{41F3B732-08FF-4D39-927D-20B3020FED42}"/>
+                <a16:creationId xmlns:a16="http://schemas.microsoft.com/office/drawing/2014/main" xmlns="" id="{41F3B732-08FF-4D39-927D-20B3020FED42}"/>
               </a:ext>
             </a:extLst>
           </p:cNvPr>
@@ -3426,7 +3435,7 @@
           <p:cNvPr id="5" name="Footer Placeholder 4">
             <a:extLst>
               <a:ext uri="{FF2B5EF4-FFF2-40B4-BE49-F238E27FC236}">
-                <a16:creationId xmlns:a16="http://schemas.microsoft.com/office/drawing/2014/main" id="{B84510C7-0DCF-42D9-ABFB-314DBA19D5FF}"/>
+                <a16:creationId xmlns:a16="http://schemas.microsoft.com/office/drawing/2014/main" xmlns="" id="{B84510C7-0DCF-42D9-ABFB-314DBA19D5FF}"/>
               </a:ext>
             </a:extLst>
           </p:cNvPr>
@@ -3472,7 +3481,7 @@
           <p:cNvPr id="6" name="Slide Number Placeholder 5">
             <a:extLst>
               <a:ext uri="{FF2B5EF4-FFF2-40B4-BE49-F238E27FC236}">
-                <a16:creationId xmlns:a16="http://schemas.microsoft.com/office/drawing/2014/main" id="{C51794AC-1A67-4A76-AD6E-E979A02CD6B9}"/>
+                <a16:creationId xmlns:a16="http://schemas.microsoft.com/office/drawing/2014/main" xmlns="" id="{C51794AC-1A67-4A76-AD6E-E979A02CD6B9}"/>
               </a:ext>
             </a:extLst>
           </p:cNvPr>
@@ -3841,7 +3850,7 @@
           <p:cNvPr id="16" name="Rectangle 15">
             <a:extLst>
               <a:ext uri="{FF2B5EF4-FFF2-40B4-BE49-F238E27FC236}">
-                <a16:creationId xmlns:a16="http://schemas.microsoft.com/office/drawing/2014/main" id="{72109EA0-FF7F-420C-895F-53C89A5736DF}"/>
+                <a16:creationId xmlns:a16="http://schemas.microsoft.com/office/drawing/2014/main" xmlns="" id="{72109EA0-FF7F-420C-895F-53C89A5736DF}"/>
               </a:ext>
             </a:extLst>
           </p:cNvPr>
@@ -3895,7 +3904,7 @@
           <p:cNvPr id="2" name="Title 1">
             <a:extLst>
               <a:ext uri="{FF2B5EF4-FFF2-40B4-BE49-F238E27FC236}">
-                <a16:creationId xmlns:a16="http://schemas.microsoft.com/office/drawing/2014/main" id="{4052366B-E1D8-404E-A3D4-5AB21A409BBF}"/>
+                <a16:creationId xmlns:a16="http://schemas.microsoft.com/office/drawing/2014/main" xmlns="" id="{4052366B-E1D8-404E-A3D4-5AB21A409BBF}"/>
               </a:ext>
             </a:extLst>
           </p:cNvPr>
@@ -3978,7 +3987,7 @@
           <p:cNvPr id="3" name="Subtitle 2">
             <a:extLst>
               <a:ext uri="{FF2B5EF4-FFF2-40B4-BE49-F238E27FC236}">
-                <a16:creationId xmlns:a16="http://schemas.microsoft.com/office/drawing/2014/main" id="{35D181C8-0C2C-42A9-936F-3500987B9342}"/>
+                <a16:creationId xmlns:a16="http://schemas.microsoft.com/office/drawing/2014/main" xmlns="" id="{35D181C8-0C2C-42A9-936F-3500987B9342}"/>
               </a:ext>
             </a:extLst>
           </p:cNvPr>
@@ -4015,7 +4024,7 @@
           <p:cNvPr id="15" name="Group 14">
             <a:extLst>
               <a:ext uri="{FF2B5EF4-FFF2-40B4-BE49-F238E27FC236}">
-                <a16:creationId xmlns:a16="http://schemas.microsoft.com/office/drawing/2014/main" id="{0BE8A880-C286-46FA-A3AC-8ED3D9E87618}"/>
+                <a16:creationId xmlns:a16="http://schemas.microsoft.com/office/drawing/2014/main" xmlns="" id="{0BE8A880-C286-46FA-A3AC-8ED3D9E87618}"/>
               </a:ext>
             </a:extLst>
           </p:cNvPr>
@@ -4035,7 +4044,7 @@
             <p:cNvPr id="5" name="Picture 4">
               <a:extLst>
                 <a:ext uri="{FF2B5EF4-FFF2-40B4-BE49-F238E27FC236}">
-                  <a16:creationId xmlns:a16="http://schemas.microsoft.com/office/drawing/2014/main" id="{0E0E5A43-E242-4115-88B9-EF3B27D0740E}"/>
+                  <a16:creationId xmlns:a16="http://schemas.microsoft.com/office/drawing/2014/main" xmlns="" id="{0E0E5A43-E242-4115-88B9-EF3B27D0740E}"/>
                 </a:ext>
               </a:extLst>
             </p:cNvPr>
@@ -4045,7 +4054,7 @@
             <p:nvPr/>
           </p:nvPicPr>
           <p:blipFill>
-            <a:blip r:embed="rId2">
+            <a:blip r:embed="rId2" cstate="print">
               <a:extLst>
                 <a:ext uri="{28A0092B-C50C-407E-A947-70E740481C1C}">
                   <a14:useLocalDpi xmlns:a14="http://schemas.microsoft.com/office/drawing/2010/main" val="0"/>
@@ -4071,7 +4080,7 @@
             <p:cNvPr id="7" name="Picture 6">
               <a:extLst>
                 <a:ext uri="{FF2B5EF4-FFF2-40B4-BE49-F238E27FC236}">
-                  <a16:creationId xmlns:a16="http://schemas.microsoft.com/office/drawing/2014/main" id="{0EF72CCE-1F82-46BC-B54C-29FE528BCF32}"/>
+                  <a16:creationId xmlns:a16="http://schemas.microsoft.com/office/drawing/2014/main" xmlns="" id="{0EF72CCE-1F82-46BC-B54C-29FE528BCF32}"/>
                 </a:ext>
               </a:extLst>
             </p:cNvPr>
@@ -4081,7 +4090,7 @@
             <p:nvPr/>
           </p:nvPicPr>
           <p:blipFill>
-            <a:blip r:embed="rId3">
+            <a:blip r:embed="rId3" cstate="print">
               <a:extLst>
                 <a:ext uri="{28A0092B-C50C-407E-A947-70E740481C1C}">
                   <a14:useLocalDpi xmlns:a14="http://schemas.microsoft.com/office/drawing/2010/main" val="0"/>
@@ -4107,7 +4116,7 @@
             <p:cNvPr id="9" name="Picture 8">
               <a:extLst>
                 <a:ext uri="{FF2B5EF4-FFF2-40B4-BE49-F238E27FC236}">
-                  <a16:creationId xmlns:a16="http://schemas.microsoft.com/office/drawing/2014/main" id="{87802FB3-4E1A-4B84-98FB-EC7177DB3FB5}"/>
+                  <a16:creationId xmlns:a16="http://schemas.microsoft.com/office/drawing/2014/main" xmlns="" id="{87802FB3-4E1A-4B84-98FB-EC7177DB3FB5}"/>
                 </a:ext>
               </a:extLst>
             </p:cNvPr>
@@ -4117,7 +4126,7 @@
             <p:nvPr/>
           </p:nvPicPr>
           <p:blipFill>
-            <a:blip r:embed="rId4">
+            <a:blip r:embed="rId4" cstate="print">
               <a:extLst>
                 <a:ext uri="{28A0092B-C50C-407E-A947-70E740481C1C}">
                   <a14:useLocalDpi xmlns:a14="http://schemas.microsoft.com/office/drawing/2010/main" val="0"/>
@@ -4143,7 +4152,7 @@
             <p:cNvPr id="11" name="Picture 10">
               <a:extLst>
                 <a:ext uri="{FF2B5EF4-FFF2-40B4-BE49-F238E27FC236}">
-                  <a16:creationId xmlns:a16="http://schemas.microsoft.com/office/drawing/2014/main" id="{71F22C2D-7FB2-4357-B985-0BEDD60104DB}"/>
+                  <a16:creationId xmlns:a16="http://schemas.microsoft.com/office/drawing/2014/main" xmlns="" id="{71F22C2D-7FB2-4357-B985-0BEDD60104DB}"/>
                 </a:ext>
               </a:extLst>
             </p:cNvPr>
@@ -4153,7 +4162,7 @@
             <p:nvPr/>
           </p:nvPicPr>
           <p:blipFill>
-            <a:blip r:embed="rId5">
+            <a:blip r:embed="rId5" cstate="print">
               <a:extLst>
                 <a:ext uri="{28A0092B-C50C-407E-A947-70E740481C1C}">
                   <a14:useLocalDpi xmlns:a14="http://schemas.microsoft.com/office/drawing/2010/main" val="0"/>
@@ -4179,7 +4188,7 @@
             <p:cNvPr id="13" name="Picture 12">
               <a:extLst>
                 <a:ext uri="{FF2B5EF4-FFF2-40B4-BE49-F238E27FC236}">
-                  <a16:creationId xmlns:a16="http://schemas.microsoft.com/office/drawing/2014/main" id="{960B8296-6273-41E4-B9CE-7C48B45DF117}"/>
+                  <a16:creationId xmlns:a16="http://schemas.microsoft.com/office/drawing/2014/main" xmlns="" id="{960B8296-6273-41E4-B9CE-7C48B45DF117}"/>
                 </a:ext>
               </a:extLst>
             </p:cNvPr>
@@ -4189,7 +4198,7 @@
             <p:nvPr/>
           </p:nvPicPr>
           <p:blipFill rotWithShape="1">
-            <a:blip r:embed="rId6">
+            <a:blip r:embed="rId6" cstate="print">
               <a:extLst>
                 <a:ext uri="{28A0092B-C50C-407E-A947-70E740481C1C}">
                   <a14:useLocalDpi xmlns:a14="http://schemas.microsoft.com/office/drawing/2010/main" val="0"/>
@@ -4220,6 +4229,13 @@
   <p:clrMapOvr>
     <a:masterClrMapping/>
   </p:clrMapOvr>
+  <p:timing>
+    <p:tnLst>
+      <p:par>
+        <p:cTn id="1" dur="indefinite" restart="never" nodeType="tmRoot"/>
+      </p:par>
+    </p:tnLst>
+  </p:timing>
 </p:sld>
 </file>
 
@@ -4245,7 +4261,7 @@
           <p:cNvPr id="2" name="Title 1">
             <a:extLst>
               <a:ext uri="{FF2B5EF4-FFF2-40B4-BE49-F238E27FC236}">
-                <a16:creationId xmlns:a16="http://schemas.microsoft.com/office/drawing/2014/main" id="{347F207B-BB07-4922-A57D-B4C903FC428E}"/>
+                <a16:creationId xmlns:a16="http://schemas.microsoft.com/office/drawing/2014/main" xmlns="" id="{8E084B19-F9E8-4B24-AF50-875DDB114356}"/>
               </a:ext>
             </a:extLst>
           </p:cNvPr>
@@ -4261,41 +4277,44 @@
           <a:bodyPr/>
           <a:lstStyle/>
           <a:p>
+            <a:r>
+              <a:rPr lang="en-GB" dirty="0"/>
+              <a:t>Client-Server Secure Delegation</a:t>
+            </a:r>
+          </a:p>
+        </p:txBody>
+      </p:sp>
+      <p:sp>
+        <p:nvSpPr>
+          <p:cNvPr id="3" name="Content Placeholder 2">
+            <a:extLst>
+              <a:ext uri="{FF2B5EF4-FFF2-40B4-BE49-F238E27FC236}">
+                <a16:creationId xmlns:a16="http://schemas.microsoft.com/office/drawing/2014/main" xmlns="" id="{F5F9F6ED-1C73-4978-BD29-7983B514D9C7}"/>
+              </a:ext>
+            </a:extLst>
+          </p:cNvPr>
+          <p:cNvSpPr>
+            <a:spLocks noGrp="1"/>
+          </p:cNvSpPr>
+          <p:nvPr>
+            <p:ph idx="1"/>
+          </p:nvPr>
+        </p:nvSpPr>
+        <p:spPr/>
+        <p:txBody>
+          <a:bodyPr/>
+          <a:lstStyle/>
+          <a:p>
             <a:endParaRPr lang="en-GB"/>
           </a:p>
         </p:txBody>
       </p:sp>
       <p:sp>
         <p:nvSpPr>
-          <p:cNvPr id="3" name="Content Placeholder 2">
-            <a:extLst>
-              <a:ext uri="{FF2B5EF4-FFF2-40B4-BE49-F238E27FC236}">
-                <a16:creationId xmlns:a16="http://schemas.microsoft.com/office/drawing/2014/main" id="{93C25EE1-11B7-4754-8CD2-9BAAFC741274}"/>
-              </a:ext>
-            </a:extLst>
-          </p:cNvPr>
-          <p:cNvSpPr>
-            <a:spLocks noGrp="1"/>
-          </p:cNvSpPr>
-          <p:nvPr>
-            <p:ph idx="1"/>
-          </p:nvPr>
-        </p:nvSpPr>
-        <p:spPr/>
-        <p:txBody>
-          <a:bodyPr/>
-          <a:lstStyle/>
-          <a:p>
-            <a:endParaRPr lang="en-GB"/>
-          </a:p>
-        </p:txBody>
-      </p:sp>
-      <p:sp>
-        <p:nvSpPr>
           <p:cNvPr id="4" name="Date Placeholder 3">
             <a:extLst>
               <a:ext uri="{FF2B5EF4-FFF2-40B4-BE49-F238E27FC236}">
-                <a16:creationId xmlns:a16="http://schemas.microsoft.com/office/drawing/2014/main" id="{DC82C15D-A931-4941-9425-2ADDABA05615}"/>
+                <a16:creationId xmlns:a16="http://schemas.microsoft.com/office/drawing/2014/main" xmlns="" id="{0B33E9EF-2D87-4726-8B0B-6F169B3D247E}"/>
               </a:ext>
             </a:extLst>
           </p:cNvPr>
@@ -4323,7 +4342,7 @@
           <p:cNvPr id="5" name="Footer Placeholder 4">
             <a:extLst>
               <a:ext uri="{FF2B5EF4-FFF2-40B4-BE49-F238E27FC236}">
-                <a16:creationId xmlns:a16="http://schemas.microsoft.com/office/drawing/2014/main" id="{50EC109D-C82D-4B9F-A687-5E2E7548A042}"/>
+                <a16:creationId xmlns:a16="http://schemas.microsoft.com/office/drawing/2014/main" xmlns="" id="{B1F7E519-9E03-4E71-AF3E-6D802F8203DC}"/>
               </a:ext>
             </a:extLst>
           </p:cNvPr>
@@ -4351,7 +4370,7 @@
           <p:cNvPr id="6" name="Slide Number Placeholder 5">
             <a:extLst>
               <a:ext uri="{FF2B5EF4-FFF2-40B4-BE49-F238E27FC236}">
-                <a16:creationId xmlns:a16="http://schemas.microsoft.com/office/drawing/2014/main" id="{10251BAC-EF96-4A44-928F-936DC5EE20B9}"/>
+                <a16:creationId xmlns:a16="http://schemas.microsoft.com/office/drawing/2014/main" xmlns="" id="{4550C95E-E3CE-42EF-AA3F-2EDEB9EFF163}"/>
               </a:ext>
             </a:extLst>
           </p:cNvPr>
@@ -4370,6 +4389,369 @@
             <a:fld id="{C65EB005-FA87-4171-8C7C-FBB2804DF50E}" type="slidenum">
               <a:rPr lang="en-GB" smtClean="0"/>
               <a:t>10</a:t>
+            </a:fld>
+            <a:endParaRPr lang="en-GB"/>
+          </a:p>
+        </p:txBody>
+      </p:sp>
+    </p:spTree>
+    <p:extLst>
+      <p:ext uri="{BB962C8B-B14F-4D97-AF65-F5344CB8AC3E}">
+        <p14:creationId xmlns:p14="http://schemas.microsoft.com/office/powerpoint/2010/main" val="2191660528"/>
+      </p:ext>
+    </p:extLst>
+  </p:cSld>
+  <p:clrMapOvr>
+    <a:masterClrMapping/>
+  </p:clrMapOvr>
+</p:sld>
+</file>
+
+<file path=ppt/slides/slide11.xml><?xml version="1.0" encoding="utf-8"?>
+<p:sld xmlns:a="http://schemas.openxmlformats.org/drawingml/2006/main" xmlns:r="http://schemas.openxmlformats.org/officeDocument/2006/relationships" xmlns:p="http://schemas.openxmlformats.org/presentationml/2006/main">
+  <p:cSld>
+    <p:spTree>
+      <p:nvGrpSpPr>
+        <p:cNvPr id="1" name=""/>
+        <p:cNvGrpSpPr/>
+        <p:nvPr/>
+      </p:nvGrpSpPr>
+      <p:grpSpPr>
+        <a:xfrm>
+          <a:off x="0" y="0"/>
+          <a:ext cx="0" cy="0"/>
+          <a:chOff x="0" y="0"/>
+          <a:chExt cx="0" cy="0"/>
+        </a:xfrm>
+      </p:grpSpPr>
+      <p:sp>
+        <p:nvSpPr>
+          <p:cNvPr id="2" name="Title 1">
+            <a:extLst>
+              <a:ext uri="{FF2B5EF4-FFF2-40B4-BE49-F238E27FC236}">
+                <a16:creationId xmlns:a16="http://schemas.microsoft.com/office/drawing/2014/main" xmlns="" id="{43207510-8B83-4B00-AE79-AE0BE7790A83}"/>
+              </a:ext>
+            </a:extLst>
+          </p:cNvPr>
+          <p:cNvSpPr>
+            <a:spLocks noGrp="1"/>
+          </p:cNvSpPr>
+          <p:nvPr>
+            <p:ph type="title"/>
+          </p:nvPr>
+        </p:nvSpPr>
+        <p:spPr/>
+        <p:txBody>
+          <a:bodyPr/>
+          <a:lstStyle/>
+          <a:p>
+            <a:r>
+              <a:rPr lang="en-GB" dirty="0"/>
+              <a:t>Proposed Ph.D. Timeline</a:t>
+            </a:r>
+          </a:p>
+        </p:txBody>
+      </p:sp>
+      <p:sp>
+        <p:nvSpPr>
+          <p:cNvPr id="3" name="Content Placeholder 2">
+            <a:extLst>
+              <a:ext uri="{FF2B5EF4-FFF2-40B4-BE49-F238E27FC236}">
+                <a16:creationId xmlns:a16="http://schemas.microsoft.com/office/drawing/2014/main" xmlns="" id="{6B8EDEC2-1241-443F-BCEA-BB38519CC5CF}"/>
+              </a:ext>
+            </a:extLst>
+          </p:cNvPr>
+          <p:cNvSpPr>
+            <a:spLocks noGrp="1"/>
+          </p:cNvSpPr>
+          <p:nvPr>
+            <p:ph idx="1"/>
+          </p:nvPr>
+        </p:nvSpPr>
+        <p:spPr/>
+        <p:txBody>
+          <a:bodyPr/>
+          <a:lstStyle/>
+          <a:p>
+            <a:endParaRPr lang="en-GB"/>
+          </a:p>
+        </p:txBody>
+      </p:sp>
+      <p:sp>
+        <p:nvSpPr>
+          <p:cNvPr id="4" name="Date Placeholder 3">
+            <a:extLst>
+              <a:ext uri="{FF2B5EF4-FFF2-40B4-BE49-F238E27FC236}">
+                <a16:creationId xmlns:a16="http://schemas.microsoft.com/office/drawing/2014/main" xmlns="" id="{17EE6D29-EBFA-4A0B-BA80-EE253C453D1C}"/>
+              </a:ext>
+            </a:extLst>
+          </p:cNvPr>
+          <p:cNvSpPr>
+            <a:spLocks noGrp="1"/>
+          </p:cNvSpPr>
+          <p:nvPr>
+            <p:ph type="dt" sz="half" idx="10"/>
+          </p:nvPr>
+        </p:nvSpPr>
+        <p:spPr/>
+        <p:txBody>
+          <a:bodyPr/>
+          <a:lstStyle/>
+          <a:p>
+            <a:r>
+              <a:rPr lang="en-GB"/>
+              <a:t>23/11/2018</a:t>
+            </a:r>
+          </a:p>
+        </p:txBody>
+      </p:sp>
+      <p:sp>
+        <p:nvSpPr>
+          <p:cNvPr id="5" name="Footer Placeholder 4">
+            <a:extLst>
+              <a:ext uri="{FF2B5EF4-FFF2-40B4-BE49-F238E27FC236}">
+                <a16:creationId xmlns:a16="http://schemas.microsoft.com/office/drawing/2014/main" xmlns="" id="{83A0606B-6767-497E-8B54-AF5241A6062E}"/>
+              </a:ext>
+            </a:extLst>
+          </p:cNvPr>
+          <p:cNvSpPr>
+            <a:spLocks noGrp="1"/>
+          </p:cNvSpPr>
+          <p:nvPr>
+            <p:ph type="ftr" sz="quarter" idx="11"/>
+          </p:nvPr>
+        </p:nvSpPr>
+        <p:spPr/>
+        <p:txBody>
+          <a:bodyPr/>
+          <a:lstStyle/>
+          <a:p>
+            <a:r>
+              <a:rPr lang="en-GB"/>
+              <a:t>Matteo Pompili – First Year Proposal</a:t>
+            </a:r>
+          </a:p>
+        </p:txBody>
+      </p:sp>
+      <p:sp>
+        <p:nvSpPr>
+          <p:cNvPr id="6" name="Slide Number Placeholder 5">
+            <a:extLst>
+              <a:ext uri="{FF2B5EF4-FFF2-40B4-BE49-F238E27FC236}">
+                <a16:creationId xmlns:a16="http://schemas.microsoft.com/office/drawing/2014/main" xmlns="" id="{1DDB5C26-A5C5-4B76-88DA-C7DF74D06D98}"/>
+              </a:ext>
+            </a:extLst>
+          </p:cNvPr>
+          <p:cNvSpPr>
+            <a:spLocks noGrp="1"/>
+          </p:cNvSpPr>
+          <p:nvPr>
+            <p:ph type="sldNum" sz="quarter" idx="12"/>
+          </p:nvPr>
+        </p:nvSpPr>
+        <p:spPr/>
+        <p:txBody>
+          <a:bodyPr/>
+          <a:lstStyle/>
+          <a:p>
+            <a:fld id="{C65EB005-FA87-4171-8C7C-FBB2804DF50E}" type="slidenum">
+              <a:rPr lang="en-GB" smtClean="0"/>
+              <a:t>11</a:t>
+            </a:fld>
+            <a:endParaRPr lang="en-GB"/>
+          </a:p>
+        </p:txBody>
+      </p:sp>
+      <p:pic>
+        <p:nvPicPr>
+          <p:cNvPr id="7" name="Picture 6">
+            <a:extLst>
+              <a:ext uri="{FF2B5EF4-FFF2-40B4-BE49-F238E27FC236}">
+                <a16:creationId xmlns:a16="http://schemas.microsoft.com/office/drawing/2014/main" xmlns="" id="{911898D0-9046-4A1F-8166-FF9EBC7AAD59}"/>
+              </a:ext>
+            </a:extLst>
+          </p:cNvPr>
+          <p:cNvPicPr>
+            <a:picLocks noChangeAspect="1"/>
+          </p:cNvPicPr>
+          <p:nvPr/>
+        </p:nvPicPr>
+        <p:blipFill>
+          <a:blip r:embed="rId2"/>
+          <a:stretch>
+            <a:fillRect/>
+          </a:stretch>
+        </p:blipFill>
+        <p:spPr>
+          <a:xfrm>
+            <a:off x="1319212" y="1946559"/>
+            <a:ext cx="9553575" cy="4109470"/>
+          </a:xfrm>
+          <a:prstGeom prst="rect">
+            <a:avLst/>
+          </a:prstGeom>
+        </p:spPr>
+      </p:pic>
+    </p:spTree>
+    <p:extLst>
+      <p:ext uri="{BB962C8B-B14F-4D97-AF65-F5344CB8AC3E}">
+        <p14:creationId xmlns:p14="http://schemas.microsoft.com/office/powerpoint/2010/main" val="1703441167"/>
+      </p:ext>
+    </p:extLst>
+  </p:cSld>
+  <p:clrMapOvr>
+    <a:masterClrMapping/>
+  </p:clrMapOvr>
+</p:sld>
+</file>
+
+<file path=ppt/slides/slide12.xml><?xml version="1.0" encoding="utf-8"?>
+<p:sld xmlns:a="http://schemas.openxmlformats.org/drawingml/2006/main" xmlns:r="http://schemas.openxmlformats.org/officeDocument/2006/relationships" xmlns:p="http://schemas.openxmlformats.org/presentationml/2006/main">
+  <p:cSld>
+    <p:spTree>
+      <p:nvGrpSpPr>
+        <p:cNvPr id="1" name=""/>
+        <p:cNvGrpSpPr/>
+        <p:nvPr/>
+      </p:nvGrpSpPr>
+      <p:grpSpPr>
+        <a:xfrm>
+          <a:off x="0" y="0"/>
+          <a:ext cx="0" cy="0"/>
+          <a:chOff x="0" y="0"/>
+          <a:chExt cx="0" cy="0"/>
+        </a:xfrm>
+      </p:grpSpPr>
+      <p:sp>
+        <p:nvSpPr>
+          <p:cNvPr id="2" name="Title 1">
+            <a:extLst>
+              <a:ext uri="{FF2B5EF4-FFF2-40B4-BE49-F238E27FC236}">
+                <a16:creationId xmlns:a16="http://schemas.microsoft.com/office/drawing/2014/main" xmlns="" id="{347F207B-BB07-4922-A57D-B4C903FC428E}"/>
+              </a:ext>
+            </a:extLst>
+          </p:cNvPr>
+          <p:cNvSpPr>
+            <a:spLocks noGrp="1"/>
+          </p:cNvSpPr>
+          <p:nvPr>
+            <p:ph type="title"/>
+          </p:nvPr>
+        </p:nvSpPr>
+        <p:spPr/>
+        <p:txBody>
+          <a:bodyPr/>
+          <a:lstStyle/>
+          <a:p>
+            <a:endParaRPr lang="en-GB"/>
+          </a:p>
+        </p:txBody>
+      </p:sp>
+      <p:sp>
+        <p:nvSpPr>
+          <p:cNvPr id="3" name="Content Placeholder 2">
+            <a:extLst>
+              <a:ext uri="{FF2B5EF4-FFF2-40B4-BE49-F238E27FC236}">
+                <a16:creationId xmlns:a16="http://schemas.microsoft.com/office/drawing/2014/main" xmlns="" id="{93C25EE1-11B7-4754-8CD2-9BAAFC741274}"/>
+              </a:ext>
+            </a:extLst>
+          </p:cNvPr>
+          <p:cNvSpPr>
+            <a:spLocks noGrp="1"/>
+          </p:cNvSpPr>
+          <p:nvPr>
+            <p:ph idx="1"/>
+          </p:nvPr>
+        </p:nvSpPr>
+        <p:spPr/>
+        <p:txBody>
+          <a:bodyPr/>
+          <a:lstStyle/>
+          <a:p>
+            <a:endParaRPr lang="en-GB"/>
+          </a:p>
+        </p:txBody>
+      </p:sp>
+      <p:sp>
+        <p:nvSpPr>
+          <p:cNvPr id="4" name="Date Placeholder 3">
+            <a:extLst>
+              <a:ext uri="{FF2B5EF4-FFF2-40B4-BE49-F238E27FC236}">
+                <a16:creationId xmlns:a16="http://schemas.microsoft.com/office/drawing/2014/main" xmlns="" id="{DC82C15D-A931-4941-9425-2ADDABA05615}"/>
+              </a:ext>
+            </a:extLst>
+          </p:cNvPr>
+          <p:cNvSpPr>
+            <a:spLocks noGrp="1"/>
+          </p:cNvSpPr>
+          <p:nvPr>
+            <p:ph type="dt" sz="half" idx="10"/>
+          </p:nvPr>
+        </p:nvSpPr>
+        <p:spPr/>
+        <p:txBody>
+          <a:bodyPr/>
+          <a:lstStyle/>
+          <a:p>
+            <a:r>
+              <a:rPr lang="en-GB"/>
+              <a:t>23/11/2018</a:t>
+            </a:r>
+          </a:p>
+        </p:txBody>
+      </p:sp>
+      <p:sp>
+        <p:nvSpPr>
+          <p:cNvPr id="5" name="Footer Placeholder 4">
+            <a:extLst>
+              <a:ext uri="{FF2B5EF4-FFF2-40B4-BE49-F238E27FC236}">
+                <a16:creationId xmlns:a16="http://schemas.microsoft.com/office/drawing/2014/main" xmlns="" id="{50EC109D-C82D-4B9F-A687-5E2E7548A042}"/>
+              </a:ext>
+            </a:extLst>
+          </p:cNvPr>
+          <p:cNvSpPr>
+            <a:spLocks noGrp="1"/>
+          </p:cNvSpPr>
+          <p:nvPr>
+            <p:ph type="ftr" sz="quarter" idx="11"/>
+          </p:nvPr>
+        </p:nvSpPr>
+        <p:spPr/>
+        <p:txBody>
+          <a:bodyPr/>
+          <a:lstStyle/>
+          <a:p>
+            <a:r>
+              <a:rPr lang="en-GB"/>
+              <a:t>Matteo Pompili – First Year Proposal</a:t>
+            </a:r>
+          </a:p>
+        </p:txBody>
+      </p:sp>
+      <p:sp>
+        <p:nvSpPr>
+          <p:cNvPr id="6" name="Slide Number Placeholder 5">
+            <a:extLst>
+              <a:ext uri="{FF2B5EF4-FFF2-40B4-BE49-F238E27FC236}">
+                <a16:creationId xmlns:a16="http://schemas.microsoft.com/office/drawing/2014/main" xmlns="" id="{10251BAC-EF96-4A44-928F-936DC5EE20B9}"/>
+              </a:ext>
+            </a:extLst>
+          </p:cNvPr>
+          <p:cNvSpPr>
+            <a:spLocks noGrp="1"/>
+          </p:cNvSpPr>
+          <p:nvPr>
+            <p:ph type="sldNum" sz="quarter" idx="12"/>
+          </p:nvPr>
+        </p:nvSpPr>
+        <p:spPr/>
+        <p:txBody>
+          <a:bodyPr/>
+          <a:lstStyle/>
+          <a:p>
+            <a:fld id="{C65EB005-FA87-4171-8C7C-FBB2804DF50E}" type="slidenum">
+              <a:rPr lang="en-GB" smtClean="0"/>
+              <a:t>12</a:t>
             </a:fld>
             <a:endParaRPr lang="en-GB"/>
           </a:p>
@@ -4410,7 +4792,7 @@
           <p:cNvPr id="2" name="Title 1">
             <a:extLst>
               <a:ext uri="{FF2B5EF4-FFF2-40B4-BE49-F238E27FC236}">
-                <a16:creationId xmlns:a16="http://schemas.microsoft.com/office/drawing/2014/main" id="{C893F8C1-F5C5-428B-BB9C-749ED6BDBD10}"/>
+                <a16:creationId xmlns:a16="http://schemas.microsoft.com/office/drawing/2014/main" xmlns="" id="{C893F8C1-F5C5-428B-BB9C-749ED6BDBD10}"/>
               </a:ext>
             </a:extLst>
           </p:cNvPr>
@@ -4428,33 +4810,16 @@
           <a:p>
             <a:r>
               <a:rPr lang="en-GB" dirty="0"/>
-              <a:t>What is a Quantum Network?</a:t>
-            </a:r>
-          </a:p>
-        </p:txBody>
-      </p:sp>
-      <p:sp>
-        <p:nvSpPr>
-          <p:cNvPr id="3" name="Content Placeholder 2">
-            <a:extLst>
-              <a:ext uri="{FF2B5EF4-FFF2-40B4-BE49-F238E27FC236}">
-                <a16:creationId xmlns:a16="http://schemas.microsoft.com/office/drawing/2014/main" id="{937A0F7F-9B87-4C51-99AF-E8F8E2E581A8}"/>
-              </a:ext>
-            </a:extLst>
-          </p:cNvPr>
-          <p:cNvSpPr>
-            <a:spLocks noGrp="1"/>
-          </p:cNvSpPr>
-          <p:nvPr>
-            <p:ph idx="1"/>
-          </p:nvPr>
-        </p:nvSpPr>
-        <p:spPr/>
-        <p:txBody>
-          <a:bodyPr/>
-          <a:lstStyle/>
-          <a:p>
-            <a:endParaRPr lang="en-GB"/>
+              <a:t>What is a </a:t>
+            </a:r>
+            <a:r>
+              <a:rPr lang="en-GB" dirty="0" smtClean="0"/>
+              <a:t>(Quantum) </a:t>
+            </a:r>
+            <a:r>
+              <a:rPr lang="en-GB" dirty="0"/>
+              <a:t>Network?</a:t>
+            </a:r>
           </a:p>
         </p:txBody>
       </p:sp>
@@ -4463,7 +4828,7 @@
           <p:cNvPr id="4" name="Date Placeholder 3">
             <a:extLst>
               <a:ext uri="{FF2B5EF4-FFF2-40B4-BE49-F238E27FC236}">
-                <a16:creationId xmlns:a16="http://schemas.microsoft.com/office/drawing/2014/main" id="{0252B0D5-ED16-4631-AE92-A0C1A72600AA}"/>
+                <a16:creationId xmlns:a16="http://schemas.microsoft.com/office/drawing/2014/main" xmlns="" id="{0252B0D5-ED16-4631-AE92-A0C1A72600AA}"/>
               </a:ext>
             </a:extLst>
           </p:cNvPr>
@@ -4491,7 +4856,7 @@
           <p:cNvPr id="5" name="Footer Placeholder 4">
             <a:extLst>
               <a:ext uri="{FF2B5EF4-FFF2-40B4-BE49-F238E27FC236}">
-                <a16:creationId xmlns:a16="http://schemas.microsoft.com/office/drawing/2014/main" id="{E363BA60-A7FB-4D97-B01D-ACDE1FF0EFBD}"/>
+                <a16:creationId xmlns:a16="http://schemas.microsoft.com/office/drawing/2014/main" xmlns="" id="{E363BA60-A7FB-4D97-B01D-ACDE1FF0EFBD}"/>
               </a:ext>
             </a:extLst>
           </p:cNvPr>
@@ -4519,7 +4884,7 @@
           <p:cNvPr id="6" name="Slide Number Placeholder 5">
             <a:extLst>
               <a:ext uri="{FF2B5EF4-FFF2-40B4-BE49-F238E27FC236}">
-                <a16:creationId xmlns:a16="http://schemas.microsoft.com/office/drawing/2014/main" id="{0ADB66BD-7AEC-44AA-84A8-7EE767874EC4}"/>
+                <a16:creationId xmlns:a16="http://schemas.microsoft.com/office/drawing/2014/main" xmlns="" id="{0ADB66BD-7AEC-44AA-84A8-7EE767874EC4}"/>
               </a:ext>
             </a:extLst>
           </p:cNvPr>
@@ -4543,6 +4908,512 @@
           </a:p>
         </p:txBody>
       </p:sp>
+      <p:pic>
+        <p:nvPicPr>
+          <p:cNvPr id="1026" name="Picture 2" descr="K:\ns\qt\Diamond\Documents\Documents Matteo\go-nogo\presentation\assets\images\IMP.png"/>
+          <p:cNvPicPr>
+            <a:picLocks noChangeAspect="1" noChangeArrowheads="1"/>
+          </p:cNvPicPr>
+          <p:nvPr/>
+        </p:nvPicPr>
+        <p:blipFill>
+          <a:blip r:embed="rId2">
+            <a:extLst>
+              <a:ext uri="{28A0092B-C50C-407E-A947-70E740481C1C}">
+                <a14:useLocalDpi xmlns:a14="http://schemas.microsoft.com/office/drawing/2010/main" val="0"/>
+              </a:ext>
+            </a:extLst>
+          </a:blip>
+          <a:srcRect/>
+          <a:stretch>
+            <a:fillRect/>
+          </a:stretch>
+        </p:blipFill>
+        <p:spPr bwMode="auto">
+          <a:xfrm>
+            <a:off x="114299" y="2314574"/>
+            <a:ext cx="2695575" cy="6796290"/>
+          </a:xfrm>
+          <a:prstGeom prst="rect">
+            <a:avLst/>
+          </a:prstGeom>
+          <a:noFill/>
+          <a:extLst>
+            <a:ext uri="{909E8E84-426E-40DD-AFC4-6F175D3DCCD1}">
+              <a14:hiddenFill xmlns:a14="http://schemas.microsoft.com/office/drawing/2010/main">
+                <a:solidFill>
+                  <a:srgbClr val="FFFFFF"/>
+                </a:solidFill>
+              </a14:hiddenFill>
+            </a:ext>
+          </a:extLst>
+        </p:spPr>
+      </p:pic>
+      <p:pic>
+        <p:nvPicPr>
+          <p:cNvPr id="11" name="Picture 2" descr="K:\ns\qt\Diamond\Documents\Documents Matteo\go-nogo\presentation\assets\images\IMP.png"/>
+          <p:cNvPicPr>
+            <a:picLocks noChangeAspect="1" noChangeArrowheads="1"/>
+          </p:cNvPicPr>
+          <p:nvPr/>
+        </p:nvPicPr>
+        <p:blipFill>
+          <a:blip r:embed="rId3" cstate="print">
+            <a:extLst>
+              <a:ext uri="{28A0092B-C50C-407E-A947-70E740481C1C}">
+                <a14:useLocalDpi xmlns:a14="http://schemas.microsoft.com/office/drawing/2010/main" val="0"/>
+              </a:ext>
+            </a:extLst>
+          </a:blip>
+          <a:srcRect/>
+          <a:stretch>
+            <a:fillRect/>
+          </a:stretch>
+        </p:blipFill>
+        <p:spPr bwMode="auto">
+          <a:xfrm>
+            <a:off x="4486274" y="2126103"/>
+            <a:ext cx="846921" cy="2135320"/>
+          </a:xfrm>
+          <a:prstGeom prst="rect">
+            <a:avLst/>
+          </a:prstGeom>
+          <a:noFill/>
+          <a:extLst>
+            <a:ext uri="{909E8E84-426E-40DD-AFC4-6F175D3DCCD1}">
+              <a14:hiddenFill xmlns:a14="http://schemas.microsoft.com/office/drawing/2010/main">
+                <a:solidFill>
+                  <a:srgbClr val="FFFFFF"/>
+                </a:solidFill>
+              </a14:hiddenFill>
+            </a:ext>
+          </a:extLst>
+        </p:spPr>
+      </p:pic>
+      <p:pic>
+        <p:nvPicPr>
+          <p:cNvPr id="13" name="Picture 2" descr="K:\ns\qt\Diamond\Documents\Documents Matteo\go-nogo\presentation\assets\images\IMP.png"/>
+          <p:cNvPicPr>
+            <a:picLocks noChangeAspect="1" noChangeArrowheads="1"/>
+          </p:cNvPicPr>
+          <p:nvPr/>
+        </p:nvPicPr>
+        <p:blipFill>
+          <a:blip r:embed="rId4" cstate="print">
+            <a:extLst>
+              <a:ext uri="{28A0092B-C50C-407E-A947-70E740481C1C}">
+                <a14:useLocalDpi xmlns:a14="http://schemas.microsoft.com/office/drawing/2010/main" val="0"/>
+              </a:ext>
+            </a:extLst>
+          </a:blip>
+          <a:srcRect/>
+          <a:stretch>
+            <a:fillRect/>
+          </a:stretch>
+        </p:blipFill>
+        <p:spPr bwMode="auto">
+          <a:xfrm>
+            <a:off x="10605177" y="2019300"/>
+            <a:ext cx="663012" cy="1671638"/>
+          </a:xfrm>
+          <a:prstGeom prst="rect">
+            <a:avLst/>
+          </a:prstGeom>
+          <a:noFill/>
+          <a:extLst>
+            <a:ext uri="{909E8E84-426E-40DD-AFC4-6F175D3DCCD1}">
+              <a14:hiddenFill xmlns:a14="http://schemas.microsoft.com/office/drawing/2010/main">
+                <a:solidFill>
+                  <a:srgbClr val="FFFFFF"/>
+                </a:solidFill>
+              </a14:hiddenFill>
+            </a:ext>
+          </a:extLst>
+        </p:spPr>
+      </p:pic>
+      <p:cxnSp>
+        <p:nvCxnSpPr>
+          <p:cNvPr id="14" name="Straight Connector 13"/>
+          <p:cNvCxnSpPr/>
+          <p:nvPr/>
+        </p:nvCxnSpPr>
+        <p:spPr>
+          <a:xfrm flipV="1">
+            <a:off x="2876550" y="3448050"/>
+            <a:ext cx="1514475" cy="1190625"/>
+          </a:xfrm>
+          <a:prstGeom prst="line">
+            <a:avLst/>
+          </a:prstGeom>
+          <a:ln w="28575"/>
+        </p:spPr>
+        <p:style>
+          <a:lnRef idx="1">
+            <a:schemeClr val="dk1"/>
+          </a:lnRef>
+          <a:fillRef idx="0">
+            <a:schemeClr val="dk1"/>
+          </a:fillRef>
+          <a:effectRef idx="0">
+            <a:schemeClr val="dk1"/>
+          </a:effectRef>
+          <a:fontRef idx="minor">
+            <a:schemeClr val="tx1"/>
+          </a:fontRef>
+        </p:style>
+      </p:cxnSp>
+      <p:cxnSp>
+        <p:nvCxnSpPr>
+          <p:cNvPr id="16" name="Straight Connector 15"/>
+          <p:cNvCxnSpPr/>
+          <p:nvPr/>
+        </p:nvCxnSpPr>
+        <p:spPr>
+          <a:xfrm flipV="1">
+            <a:off x="9014502" y="3690938"/>
+            <a:ext cx="1590675" cy="1709737"/>
+          </a:xfrm>
+          <a:prstGeom prst="line">
+            <a:avLst/>
+          </a:prstGeom>
+          <a:ln w="28575"/>
+        </p:spPr>
+        <p:style>
+          <a:lnRef idx="1">
+            <a:schemeClr val="dk1"/>
+          </a:lnRef>
+          <a:fillRef idx="0">
+            <a:schemeClr val="dk1"/>
+          </a:fillRef>
+          <a:effectRef idx="0">
+            <a:schemeClr val="dk1"/>
+          </a:effectRef>
+          <a:fontRef idx="minor">
+            <a:schemeClr val="tx1"/>
+          </a:fontRef>
+        </p:style>
+      </p:cxnSp>
+      <p:cxnSp>
+        <p:nvCxnSpPr>
+          <p:cNvPr id="17" name="Straight Connector 16"/>
+          <p:cNvCxnSpPr/>
+          <p:nvPr/>
+        </p:nvCxnSpPr>
+        <p:spPr>
+          <a:xfrm>
+            <a:off x="5410199" y="3669506"/>
+            <a:ext cx="1895475" cy="1938337"/>
+          </a:xfrm>
+          <a:prstGeom prst="line">
+            <a:avLst/>
+          </a:prstGeom>
+          <a:ln w="28575"/>
+        </p:spPr>
+        <p:style>
+          <a:lnRef idx="1">
+            <a:schemeClr val="dk1"/>
+          </a:lnRef>
+          <a:fillRef idx="0">
+            <a:schemeClr val="dk1"/>
+          </a:fillRef>
+          <a:effectRef idx="0">
+            <a:schemeClr val="dk1"/>
+          </a:effectRef>
+          <a:fontRef idx="minor">
+            <a:schemeClr val="tx1"/>
+          </a:fontRef>
+        </p:style>
+      </p:cxnSp>
+      <p:cxnSp>
+        <p:nvCxnSpPr>
+          <p:cNvPr id="23" name="Straight Connector 22"/>
+          <p:cNvCxnSpPr/>
+          <p:nvPr/>
+        </p:nvCxnSpPr>
+        <p:spPr>
+          <a:xfrm>
+            <a:off x="5486398" y="2700338"/>
+            <a:ext cx="4943477" cy="0"/>
+          </a:xfrm>
+          <a:prstGeom prst="line">
+            <a:avLst/>
+          </a:prstGeom>
+          <a:ln w="28575"/>
+        </p:spPr>
+        <p:style>
+          <a:lnRef idx="1">
+            <a:schemeClr val="dk1"/>
+          </a:lnRef>
+          <a:fillRef idx="0">
+            <a:schemeClr val="dk1"/>
+          </a:fillRef>
+          <a:effectRef idx="0">
+            <a:schemeClr val="dk1"/>
+          </a:effectRef>
+          <a:fontRef idx="minor">
+            <a:schemeClr val="tx1"/>
+          </a:fontRef>
+        </p:style>
+      </p:cxnSp>
+      <p:pic>
+        <p:nvPicPr>
+          <p:cNvPr id="12" name="Picture 2" descr="K:\ns\qt\Diamond\Documents\Documents Matteo\go-nogo\presentation\assets\images\IMP.png"/>
+          <p:cNvPicPr>
+            <a:picLocks noGrp="1" noChangeAspect="1" noChangeArrowheads="1"/>
+          </p:cNvPicPr>
+          <p:nvPr>
+            <p:ph idx="1"/>
+          </p:nvPr>
+        </p:nvPicPr>
+        <p:blipFill>
+          <a:blip r:embed="rId2">
+            <a:extLst>
+              <a:ext uri="{28A0092B-C50C-407E-A947-70E740481C1C}">
+                <a14:useLocalDpi xmlns:a14="http://schemas.microsoft.com/office/drawing/2010/main" val="0"/>
+              </a:ext>
+            </a:extLst>
+          </a:blip>
+          <a:srcRect/>
+          <a:stretch>
+            <a:fillRect/>
+          </a:stretch>
+        </p:blipFill>
+        <p:spPr bwMode="auto">
+          <a:xfrm>
+            <a:off x="7381874" y="2383884"/>
+            <a:ext cx="1666875" cy="4202654"/>
+          </a:xfrm>
+          <a:prstGeom prst="rect">
+            <a:avLst/>
+          </a:prstGeom>
+          <a:noFill/>
+          <a:extLst>
+            <a:ext uri="{909E8E84-426E-40DD-AFC4-6F175D3DCCD1}">
+              <a14:hiddenFill xmlns:a14="http://schemas.microsoft.com/office/drawing/2010/main">
+                <a:solidFill>
+                  <a:srgbClr val="FFFFFF"/>
+                </a:solidFill>
+              </a14:hiddenFill>
+            </a:ext>
+          </a:extLst>
+        </p:spPr>
+      </p:pic>
+      <p:pic>
+        <p:nvPicPr>
+          <p:cNvPr id="1027" name="Picture 3"/>
+          <p:cNvPicPr>
+            <a:picLocks noChangeAspect="1" noChangeArrowheads="1"/>
+          </p:cNvPicPr>
+          <p:nvPr/>
+        </p:nvPicPr>
+        <p:blipFill>
+          <a:blip r:embed="rId5" cstate="print">
+            <a:extLst>
+              <a:ext uri="{28A0092B-C50C-407E-A947-70E740481C1C}">
+                <a14:useLocalDpi xmlns:a14="http://schemas.microsoft.com/office/drawing/2010/main" val="0"/>
+              </a:ext>
+            </a:extLst>
+          </a:blip>
+          <a:srcRect/>
+          <a:stretch>
+            <a:fillRect/>
+          </a:stretch>
+        </p:blipFill>
+        <p:spPr bwMode="auto">
+          <a:xfrm rot="19299665">
+            <a:off x="3355181" y="3668430"/>
+            <a:ext cx="557212" cy="254995"/>
+          </a:xfrm>
+          <a:prstGeom prst="rect">
+            <a:avLst/>
+          </a:prstGeom>
+          <a:noFill/>
+          <a:ln>
+            <a:noFill/>
+          </a:ln>
+          <a:extLst>
+            <a:ext uri="{909E8E84-426E-40DD-AFC4-6F175D3DCCD1}">
+              <a14:hiddenFill xmlns:a14="http://schemas.microsoft.com/office/drawing/2010/main">
+                <a:solidFill>
+                  <a:schemeClr val="accent1"/>
+                </a:solidFill>
+              </a14:hiddenFill>
+            </a:ext>
+            <a:ext uri="{91240B29-F687-4F45-9708-019B960494DF}">
+              <a14:hiddenLine xmlns:a14="http://schemas.microsoft.com/office/drawing/2010/main" w="9525">
+                <a:solidFill>
+                  <a:schemeClr val="tx1"/>
+                </a:solidFill>
+                <a:miter lim="800000"/>
+                <a:headEnd/>
+                <a:tailEnd/>
+              </a14:hiddenLine>
+            </a:ext>
+          </a:extLst>
+        </p:spPr>
+      </p:pic>
+      <p:pic>
+        <p:nvPicPr>
+          <p:cNvPr id="26" name="Picture 3"/>
+          <p:cNvPicPr>
+            <a:picLocks noChangeAspect="1" noChangeArrowheads="1"/>
+          </p:cNvPicPr>
+          <p:nvPr/>
+        </p:nvPicPr>
+        <p:blipFill>
+          <a:blip r:embed="rId5" cstate="print">
+            <a:extLst>
+              <a:ext uri="{28A0092B-C50C-407E-A947-70E740481C1C}">
+                <a14:useLocalDpi xmlns:a14="http://schemas.microsoft.com/office/drawing/2010/main" val="0"/>
+              </a:ext>
+            </a:extLst>
+          </a:blip>
+          <a:srcRect/>
+          <a:stretch>
+            <a:fillRect/>
+          </a:stretch>
+        </p:blipFill>
+        <p:spPr bwMode="auto">
+          <a:xfrm>
+            <a:off x="6465094" y="2398927"/>
+            <a:ext cx="557212" cy="254995"/>
+          </a:xfrm>
+          <a:prstGeom prst="rect">
+            <a:avLst/>
+          </a:prstGeom>
+          <a:noFill/>
+          <a:ln>
+            <a:noFill/>
+          </a:ln>
+          <a:extLst>
+            <a:ext uri="{909E8E84-426E-40DD-AFC4-6F175D3DCCD1}">
+              <a14:hiddenFill xmlns:a14="http://schemas.microsoft.com/office/drawing/2010/main">
+                <a:solidFill>
+                  <a:schemeClr val="accent1"/>
+                </a:solidFill>
+              </a14:hiddenFill>
+            </a:ext>
+            <a:ext uri="{91240B29-F687-4F45-9708-019B960494DF}">
+              <a14:hiddenLine xmlns:a14="http://schemas.microsoft.com/office/drawing/2010/main" w="9525">
+                <a:solidFill>
+                  <a:schemeClr val="tx1"/>
+                </a:solidFill>
+                <a:miter lim="800000"/>
+                <a:headEnd/>
+                <a:tailEnd/>
+              </a14:hiddenLine>
+            </a:ext>
+          </a:extLst>
+        </p:spPr>
+      </p:pic>
+      <p:pic>
+        <p:nvPicPr>
+          <p:cNvPr id="27" name="Picture 3"/>
+          <p:cNvPicPr>
+            <a:picLocks noChangeAspect="1" noChangeArrowheads="1"/>
+          </p:cNvPicPr>
+          <p:nvPr/>
+        </p:nvPicPr>
+        <p:blipFill>
+          <a:blip r:embed="rId5" cstate="print">
+            <a:extLst>
+              <a:ext uri="{28A0092B-C50C-407E-A947-70E740481C1C}">
+                <a14:useLocalDpi xmlns:a14="http://schemas.microsoft.com/office/drawing/2010/main" val="0"/>
+              </a:ext>
+            </a:extLst>
+          </a:blip>
+          <a:srcRect/>
+          <a:stretch>
+            <a:fillRect/>
+          </a:stretch>
+        </p:blipFill>
+        <p:spPr bwMode="auto">
+          <a:xfrm rot="2790666">
+            <a:off x="6014418" y="4201364"/>
+            <a:ext cx="557212" cy="254995"/>
+          </a:xfrm>
+          <a:prstGeom prst="rect">
+            <a:avLst/>
+          </a:prstGeom>
+          <a:noFill/>
+          <a:ln>
+            <a:noFill/>
+          </a:ln>
+          <a:extLst>
+            <a:ext uri="{909E8E84-426E-40DD-AFC4-6F175D3DCCD1}">
+              <a14:hiddenFill xmlns:a14="http://schemas.microsoft.com/office/drawing/2010/main">
+                <a:solidFill>
+                  <a:schemeClr val="accent1"/>
+                </a:solidFill>
+              </a14:hiddenFill>
+            </a:ext>
+            <a:ext uri="{91240B29-F687-4F45-9708-019B960494DF}">
+              <a14:hiddenLine xmlns:a14="http://schemas.microsoft.com/office/drawing/2010/main" w="9525">
+                <a:solidFill>
+                  <a:schemeClr val="tx1"/>
+                </a:solidFill>
+                <a:miter lim="800000"/>
+                <a:headEnd/>
+                <a:tailEnd/>
+              </a14:hiddenLine>
+            </a:ext>
+          </a:extLst>
+        </p:spPr>
+      </p:pic>
+      <p:pic>
+        <p:nvPicPr>
+          <p:cNvPr id="28" name="Picture 3"/>
+          <p:cNvPicPr>
+            <a:picLocks noChangeAspect="1" noChangeArrowheads="1"/>
+          </p:cNvPicPr>
+          <p:nvPr/>
+        </p:nvPicPr>
+        <p:blipFill>
+          <a:blip r:embed="rId5" cstate="print">
+            <a:extLst>
+              <a:ext uri="{28A0092B-C50C-407E-A947-70E740481C1C}">
+                <a14:useLocalDpi xmlns:a14="http://schemas.microsoft.com/office/drawing/2010/main" val="0"/>
+              </a:ext>
+            </a:extLst>
+          </a:blip>
+          <a:srcRect/>
+          <a:stretch>
+            <a:fillRect/>
+          </a:stretch>
+        </p:blipFill>
+        <p:spPr bwMode="auto">
+          <a:xfrm rot="18820652">
+            <a:off x="9531232" y="4133924"/>
+            <a:ext cx="557212" cy="254995"/>
+          </a:xfrm>
+          <a:prstGeom prst="rect">
+            <a:avLst/>
+          </a:prstGeom>
+          <a:noFill/>
+          <a:ln>
+            <a:noFill/>
+          </a:ln>
+          <a:extLst>
+            <a:ext uri="{909E8E84-426E-40DD-AFC4-6F175D3DCCD1}">
+              <a14:hiddenFill xmlns:a14="http://schemas.microsoft.com/office/drawing/2010/main">
+                <a:solidFill>
+                  <a:schemeClr val="accent1"/>
+                </a:solidFill>
+              </a14:hiddenFill>
+            </a:ext>
+            <a:ext uri="{91240B29-F687-4F45-9708-019B960494DF}">
+              <a14:hiddenLine xmlns:a14="http://schemas.microsoft.com/office/drawing/2010/main" w="9525">
+                <a:solidFill>
+                  <a:schemeClr val="tx1"/>
+                </a:solidFill>
+                <a:miter lim="800000"/>
+                <a:headEnd/>
+                <a:tailEnd/>
+              </a14:hiddenLine>
+            </a:ext>
+          </a:extLst>
+        </p:spPr>
+      </p:pic>
     </p:spTree>
     <p:extLst>
       <p:ext uri="{BB962C8B-B14F-4D97-AF65-F5344CB8AC3E}">
@@ -4553,6 +5424,13 @@
   <p:clrMapOvr>
     <a:masterClrMapping/>
   </p:clrMapOvr>
+  <p:timing>
+    <p:tnLst>
+      <p:par>
+        <p:cTn id="1" dur="indefinite" restart="never" nodeType="tmRoot"/>
+      </p:par>
+    </p:tnLst>
+  </p:timing>
 </p:sld>
 </file>
 
@@ -4578,7 +5456,7 @@
           <p:cNvPr id="2" name="Title 1">
             <a:extLst>
               <a:ext uri="{FF2B5EF4-FFF2-40B4-BE49-F238E27FC236}">
-                <a16:creationId xmlns:a16="http://schemas.microsoft.com/office/drawing/2014/main" id="{561280E3-8A8B-4015-A804-CD9B353FBC87}"/>
+                <a16:creationId xmlns:a16="http://schemas.microsoft.com/office/drawing/2014/main" xmlns="" id="{C893F8C1-F5C5-428B-BB9C-749ED6BDBD10}"/>
               </a:ext>
             </a:extLst>
           </p:cNvPr>
@@ -4596,33 +5474,16 @@
           <a:p>
             <a:r>
               <a:rPr lang="en-GB" dirty="0"/>
-              <a:t>The Nitrogen Vacancy Centre in Diamond</a:t>
-            </a:r>
-          </a:p>
-        </p:txBody>
-      </p:sp>
-      <p:sp>
-        <p:nvSpPr>
-          <p:cNvPr id="3" name="Content Placeholder 2">
-            <a:extLst>
-              <a:ext uri="{FF2B5EF4-FFF2-40B4-BE49-F238E27FC236}">
-                <a16:creationId xmlns:a16="http://schemas.microsoft.com/office/drawing/2014/main" id="{90AF49E2-E064-4EB7-B0A4-D5B29651E2AA}"/>
-              </a:ext>
-            </a:extLst>
-          </p:cNvPr>
-          <p:cNvSpPr>
-            <a:spLocks noGrp="1"/>
-          </p:cNvSpPr>
-          <p:nvPr>
-            <p:ph idx="1"/>
-          </p:nvPr>
-        </p:nvSpPr>
-        <p:spPr/>
-        <p:txBody>
-          <a:bodyPr/>
-          <a:lstStyle/>
-          <a:p>
-            <a:endParaRPr lang="en-GB"/>
+              <a:t>What is a </a:t>
+            </a:r>
+            <a:r>
+              <a:rPr lang="en-GB" dirty="0" smtClean="0"/>
+              <a:t>(Quantum) </a:t>
+            </a:r>
+            <a:r>
+              <a:rPr lang="en-GB" dirty="0"/>
+              <a:t>Network?</a:t>
+            </a:r>
           </a:p>
         </p:txBody>
       </p:sp>
@@ -4631,7 +5492,7 @@
           <p:cNvPr id="4" name="Date Placeholder 3">
             <a:extLst>
               <a:ext uri="{FF2B5EF4-FFF2-40B4-BE49-F238E27FC236}">
-                <a16:creationId xmlns:a16="http://schemas.microsoft.com/office/drawing/2014/main" id="{F9B32B6D-BC2F-4169-93CF-F4B14B246F00}"/>
+                <a16:creationId xmlns:a16="http://schemas.microsoft.com/office/drawing/2014/main" xmlns="" id="{0252B0D5-ED16-4631-AE92-A0C1A72600AA}"/>
               </a:ext>
             </a:extLst>
           </p:cNvPr>
@@ -4659,7 +5520,7 @@
           <p:cNvPr id="5" name="Footer Placeholder 4">
             <a:extLst>
               <a:ext uri="{FF2B5EF4-FFF2-40B4-BE49-F238E27FC236}">
-                <a16:creationId xmlns:a16="http://schemas.microsoft.com/office/drawing/2014/main" id="{50BE2538-D335-4099-8C25-4B9E73A4A2DF}"/>
+                <a16:creationId xmlns:a16="http://schemas.microsoft.com/office/drawing/2014/main" xmlns="" id="{E363BA60-A7FB-4D97-B01D-ACDE1FF0EFBD}"/>
               </a:ext>
             </a:extLst>
           </p:cNvPr>
@@ -4687,7 +5548,7 @@
           <p:cNvPr id="6" name="Slide Number Placeholder 5">
             <a:extLst>
               <a:ext uri="{FF2B5EF4-FFF2-40B4-BE49-F238E27FC236}">
-                <a16:creationId xmlns:a16="http://schemas.microsoft.com/office/drawing/2014/main" id="{9BD335DB-50FB-4825-8645-C2D1080D214E}"/>
+                <a16:creationId xmlns:a16="http://schemas.microsoft.com/office/drawing/2014/main" xmlns="" id="{0ADB66BD-7AEC-44AA-84A8-7EE767874EC4}"/>
               </a:ext>
             </a:extLst>
           </p:cNvPr>
@@ -4711,16 +5572,763 @@
           </a:p>
         </p:txBody>
       </p:sp>
+      <p:cxnSp>
+        <p:nvCxnSpPr>
+          <p:cNvPr id="14" name="Straight Connector 13"/>
+          <p:cNvCxnSpPr/>
+          <p:nvPr/>
+        </p:nvCxnSpPr>
+        <p:spPr>
+          <a:xfrm flipV="1">
+            <a:off x="2876550" y="3448050"/>
+            <a:ext cx="1514475" cy="1190625"/>
+          </a:xfrm>
+          <a:prstGeom prst="line">
+            <a:avLst/>
+          </a:prstGeom>
+          <a:ln w="28575"/>
+        </p:spPr>
+        <p:style>
+          <a:lnRef idx="1">
+            <a:schemeClr val="dk1"/>
+          </a:lnRef>
+          <a:fillRef idx="0">
+            <a:schemeClr val="dk1"/>
+          </a:fillRef>
+          <a:effectRef idx="0">
+            <a:schemeClr val="dk1"/>
+          </a:effectRef>
+          <a:fontRef idx="minor">
+            <a:schemeClr val="tx1"/>
+          </a:fontRef>
+        </p:style>
+      </p:cxnSp>
+      <p:cxnSp>
+        <p:nvCxnSpPr>
+          <p:cNvPr id="16" name="Straight Connector 15"/>
+          <p:cNvCxnSpPr/>
+          <p:nvPr/>
+        </p:nvCxnSpPr>
+        <p:spPr>
+          <a:xfrm flipV="1">
+            <a:off x="9014502" y="3690938"/>
+            <a:ext cx="1590675" cy="1709737"/>
+          </a:xfrm>
+          <a:prstGeom prst="line">
+            <a:avLst/>
+          </a:prstGeom>
+          <a:ln w="28575"/>
+        </p:spPr>
+        <p:style>
+          <a:lnRef idx="1">
+            <a:schemeClr val="dk1"/>
+          </a:lnRef>
+          <a:fillRef idx="0">
+            <a:schemeClr val="dk1"/>
+          </a:fillRef>
+          <a:effectRef idx="0">
+            <a:schemeClr val="dk1"/>
+          </a:effectRef>
+          <a:fontRef idx="minor">
+            <a:schemeClr val="tx1"/>
+          </a:fontRef>
+        </p:style>
+      </p:cxnSp>
+      <p:cxnSp>
+        <p:nvCxnSpPr>
+          <p:cNvPr id="17" name="Straight Connector 16"/>
+          <p:cNvCxnSpPr/>
+          <p:nvPr/>
+        </p:nvCxnSpPr>
+        <p:spPr>
+          <a:xfrm>
+            <a:off x="5410199" y="3669506"/>
+            <a:ext cx="1895475" cy="1938337"/>
+          </a:xfrm>
+          <a:prstGeom prst="line">
+            <a:avLst/>
+          </a:prstGeom>
+          <a:ln w="28575"/>
+        </p:spPr>
+        <p:style>
+          <a:lnRef idx="1">
+            <a:schemeClr val="dk1"/>
+          </a:lnRef>
+          <a:fillRef idx="0">
+            <a:schemeClr val="dk1"/>
+          </a:fillRef>
+          <a:effectRef idx="0">
+            <a:schemeClr val="dk1"/>
+          </a:effectRef>
+          <a:fontRef idx="minor">
+            <a:schemeClr val="tx1"/>
+          </a:fontRef>
+        </p:style>
+      </p:cxnSp>
+      <p:cxnSp>
+        <p:nvCxnSpPr>
+          <p:cNvPr id="23" name="Straight Connector 22"/>
+          <p:cNvCxnSpPr/>
+          <p:nvPr/>
+        </p:nvCxnSpPr>
+        <p:spPr>
+          <a:xfrm>
+            <a:off x="5486398" y="2700338"/>
+            <a:ext cx="4943477" cy="0"/>
+          </a:xfrm>
+          <a:prstGeom prst="line">
+            <a:avLst/>
+          </a:prstGeom>
+          <a:ln w="28575"/>
+        </p:spPr>
+        <p:style>
+          <a:lnRef idx="1">
+            <a:schemeClr val="dk1"/>
+          </a:lnRef>
+          <a:fillRef idx="0">
+            <a:schemeClr val="dk1"/>
+          </a:fillRef>
+          <a:effectRef idx="0">
+            <a:schemeClr val="dk1"/>
+          </a:effectRef>
+          <a:fontRef idx="minor">
+            <a:schemeClr val="tx1"/>
+          </a:fontRef>
+        </p:style>
+      </p:cxnSp>
+      <p:pic>
+        <p:nvPicPr>
+          <p:cNvPr id="2051" name="Picture 3" descr="K:\ns\qt\Diamond\Posters - Presentations - Abstracts\Matteo\Talks\2018-06-15 Werkbespreking - Qutech\diamond_electron_carbon.png"/>
+          <p:cNvPicPr>
+            <a:picLocks noChangeAspect="1" noChangeArrowheads="1"/>
+          </p:cNvPicPr>
+          <p:nvPr/>
+        </p:nvPicPr>
+        <p:blipFill>
+          <a:blip r:embed="rId2">
+            <a:extLst>
+              <a:ext uri="{28A0092B-C50C-407E-A947-70E740481C1C}">
+                <a14:useLocalDpi xmlns:a14="http://schemas.microsoft.com/office/drawing/2010/main" val="0"/>
+              </a:ext>
+            </a:extLst>
+          </a:blip>
+          <a:srcRect/>
+          <a:stretch>
+            <a:fillRect/>
+          </a:stretch>
+        </p:blipFill>
+        <p:spPr bwMode="auto">
+          <a:xfrm>
+            <a:off x="-71380" y="4438650"/>
+            <a:ext cx="2795530" cy="2638425"/>
+          </a:xfrm>
+          <a:prstGeom prst="rect">
+            <a:avLst/>
+          </a:prstGeom>
+          <a:noFill/>
+          <a:extLst>
+            <a:ext uri="{909E8E84-426E-40DD-AFC4-6F175D3DCCD1}">
+              <a14:hiddenFill xmlns:a14="http://schemas.microsoft.com/office/drawing/2010/main">
+                <a:solidFill>
+                  <a:srgbClr val="FFFFFF"/>
+                </a:solidFill>
+              </a14:hiddenFill>
+            </a:ext>
+          </a:extLst>
+        </p:spPr>
+      </p:pic>
+      <p:pic>
+        <p:nvPicPr>
+          <p:cNvPr id="21" name="Picture 3" descr="K:\ns\qt\Diamond\Posters - Presentations - Abstracts\Matteo\Talks\2018-06-15 Werkbespreking - Qutech\diamond_electron_carbon.png"/>
+          <p:cNvPicPr>
+            <a:picLocks noChangeAspect="1" noChangeArrowheads="1"/>
+          </p:cNvPicPr>
+          <p:nvPr/>
+        </p:nvPicPr>
+        <p:blipFill>
+          <a:blip r:embed="rId3" cstate="print">
+            <a:extLst>
+              <a:ext uri="{28A0092B-C50C-407E-A947-70E740481C1C}">
+                <a14:useLocalDpi xmlns:a14="http://schemas.microsoft.com/office/drawing/2010/main" val="0"/>
+              </a:ext>
+            </a:extLst>
+          </a:blip>
+          <a:srcRect/>
+          <a:stretch>
+            <a:fillRect/>
+          </a:stretch>
+        </p:blipFill>
+        <p:spPr bwMode="auto">
+          <a:xfrm>
+            <a:off x="7234295" y="5292672"/>
+            <a:ext cx="1890655" cy="1784403"/>
+          </a:xfrm>
+          <a:prstGeom prst="rect">
+            <a:avLst/>
+          </a:prstGeom>
+          <a:noFill/>
+          <a:extLst>
+            <a:ext uri="{909E8E84-426E-40DD-AFC4-6F175D3DCCD1}">
+              <a14:hiddenFill xmlns:a14="http://schemas.microsoft.com/office/drawing/2010/main">
+                <a:solidFill>
+                  <a:srgbClr val="FFFFFF"/>
+                </a:solidFill>
+              </a14:hiddenFill>
+            </a:ext>
+          </a:extLst>
+        </p:spPr>
+      </p:pic>
+      <p:pic>
+        <p:nvPicPr>
+          <p:cNvPr id="22" name="Picture 3" descr="K:\ns\qt\Diamond\Posters - Presentations - Abstracts\Matteo\Talks\2018-06-15 Werkbespreking - Qutech\diamond_electron_carbon.png"/>
+          <p:cNvPicPr>
+            <a:picLocks noChangeAspect="1" noChangeArrowheads="1"/>
+          </p:cNvPicPr>
+          <p:nvPr/>
+        </p:nvPicPr>
+        <p:blipFill>
+          <a:blip r:embed="rId4" cstate="print">
+            <a:extLst>
+              <a:ext uri="{28A0092B-C50C-407E-A947-70E740481C1C}">
+                <a14:useLocalDpi xmlns:a14="http://schemas.microsoft.com/office/drawing/2010/main" val="0"/>
+              </a:ext>
+            </a:extLst>
+          </a:blip>
+          <a:srcRect/>
+          <a:stretch>
+            <a:fillRect/>
+          </a:stretch>
+        </p:blipFill>
+        <p:spPr bwMode="auto">
+          <a:xfrm>
+            <a:off x="4481570" y="2657475"/>
+            <a:ext cx="842905" cy="795535"/>
+          </a:xfrm>
+          <a:prstGeom prst="rect">
+            <a:avLst/>
+          </a:prstGeom>
+          <a:noFill/>
+          <a:extLst>
+            <a:ext uri="{909E8E84-426E-40DD-AFC4-6F175D3DCCD1}">
+              <a14:hiddenFill xmlns:a14="http://schemas.microsoft.com/office/drawing/2010/main">
+                <a:solidFill>
+                  <a:srgbClr val="FFFFFF"/>
+                </a:solidFill>
+              </a14:hiddenFill>
+            </a:ext>
+          </a:extLst>
+        </p:spPr>
+      </p:pic>
+      <p:pic>
+        <p:nvPicPr>
+          <p:cNvPr id="24" name="Picture 3" descr="K:\ns\qt\Diamond\Posters - Presentations - Abstracts\Matteo\Talks\2018-06-15 Werkbespreking - Qutech\diamond_electron_carbon.png"/>
+          <p:cNvPicPr>
+            <a:picLocks noChangeAspect="1" noChangeArrowheads="1"/>
+          </p:cNvPicPr>
+          <p:nvPr/>
+        </p:nvPicPr>
+        <p:blipFill>
+          <a:blip r:embed="rId5" cstate="print">
+            <a:extLst>
+              <a:ext uri="{28A0092B-C50C-407E-A947-70E740481C1C}">
+                <a14:useLocalDpi xmlns:a14="http://schemas.microsoft.com/office/drawing/2010/main" val="0"/>
+              </a:ext>
+            </a:extLst>
+          </a:blip>
+          <a:srcRect/>
+          <a:stretch>
+            <a:fillRect/>
+          </a:stretch>
+        </p:blipFill>
+        <p:spPr bwMode="auto">
+          <a:xfrm>
+            <a:off x="10633752" y="2639495"/>
+            <a:ext cx="881005" cy="831494"/>
+          </a:xfrm>
+          <a:prstGeom prst="rect">
+            <a:avLst/>
+          </a:prstGeom>
+          <a:noFill/>
+          <a:extLst>
+            <a:ext uri="{909E8E84-426E-40DD-AFC4-6F175D3DCCD1}">
+              <a14:hiddenFill xmlns:a14="http://schemas.microsoft.com/office/drawing/2010/main">
+                <a:solidFill>
+                  <a:srgbClr val="FFFFFF"/>
+                </a:solidFill>
+              </a14:hiddenFill>
+            </a:ext>
+          </a:extLst>
+        </p:spPr>
+      </p:pic>
+      <p:pic>
+        <p:nvPicPr>
+          <p:cNvPr id="2052" name="Picture 4"/>
+          <p:cNvPicPr>
+            <a:picLocks noChangeAspect="1" noChangeArrowheads="1"/>
+          </p:cNvPicPr>
+          <p:nvPr/>
+        </p:nvPicPr>
+        <p:blipFill>
+          <a:blip r:embed="rId6" cstate="print">
+            <a:extLst>
+              <a:ext uri="{28A0092B-C50C-407E-A947-70E740481C1C}">
+                <a14:useLocalDpi xmlns:a14="http://schemas.microsoft.com/office/drawing/2010/main" val="0"/>
+              </a:ext>
+            </a:extLst>
+          </a:blip>
+          <a:srcRect/>
+          <a:stretch>
+            <a:fillRect/>
+          </a:stretch>
+        </p:blipFill>
+        <p:spPr bwMode="auto">
+          <a:xfrm rot="19220141">
+            <a:off x="3252311" y="3572797"/>
+            <a:ext cx="762953" cy="375119"/>
+          </a:xfrm>
+          <a:prstGeom prst="rect">
+            <a:avLst/>
+          </a:prstGeom>
+          <a:noFill/>
+          <a:ln>
+            <a:noFill/>
+          </a:ln>
+          <a:extLst>
+            <a:ext uri="{909E8E84-426E-40DD-AFC4-6F175D3DCCD1}">
+              <a14:hiddenFill xmlns:a14="http://schemas.microsoft.com/office/drawing/2010/main">
+                <a:solidFill>
+                  <a:schemeClr val="accent1"/>
+                </a:solidFill>
+              </a14:hiddenFill>
+            </a:ext>
+            <a:ext uri="{91240B29-F687-4F45-9708-019B960494DF}">
+              <a14:hiddenLine xmlns:a14="http://schemas.microsoft.com/office/drawing/2010/main" w="9525">
+                <a:solidFill>
+                  <a:schemeClr val="tx1"/>
+                </a:solidFill>
+                <a:miter lim="800000"/>
+                <a:headEnd/>
+                <a:tailEnd/>
+              </a14:hiddenLine>
+            </a:ext>
+          </a:extLst>
+        </p:spPr>
+      </p:pic>
+      <p:pic>
+        <p:nvPicPr>
+          <p:cNvPr id="25" name="Picture 4"/>
+          <p:cNvPicPr>
+            <a:picLocks noChangeAspect="1" noChangeArrowheads="1"/>
+          </p:cNvPicPr>
+          <p:nvPr/>
+        </p:nvPicPr>
+        <p:blipFill>
+          <a:blip r:embed="rId6" cstate="print">
+            <a:extLst>
+              <a:ext uri="{28A0092B-C50C-407E-A947-70E740481C1C}">
+                <a14:useLocalDpi xmlns:a14="http://schemas.microsoft.com/office/drawing/2010/main" val="0"/>
+              </a:ext>
+            </a:extLst>
+          </a:blip>
+          <a:srcRect/>
+          <a:stretch>
+            <a:fillRect/>
+          </a:stretch>
+        </p:blipFill>
+        <p:spPr bwMode="auto">
+          <a:xfrm>
+            <a:off x="6357936" y="2260530"/>
+            <a:ext cx="762953" cy="375119"/>
+          </a:xfrm>
+          <a:prstGeom prst="rect">
+            <a:avLst/>
+          </a:prstGeom>
+          <a:noFill/>
+          <a:ln>
+            <a:noFill/>
+          </a:ln>
+          <a:extLst>
+            <a:ext uri="{909E8E84-426E-40DD-AFC4-6F175D3DCCD1}">
+              <a14:hiddenFill xmlns:a14="http://schemas.microsoft.com/office/drawing/2010/main">
+                <a:solidFill>
+                  <a:schemeClr val="accent1"/>
+                </a:solidFill>
+              </a14:hiddenFill>
+            </a:ext>
+            <a:ext uri="{91240B29-F687-4F45-9708-019B960494DF}">
+              <a14:hiddenLine xmlns:a14="http://schemas.microsoft.com/office/drawing/2010/main" w="9525">
+                <a:solidFill>
+                  <a:schemeClr val="tx1"/>
+                </a:solidFill>
+                <a:miter lim="800000"/>
+                <a:headEnd/>
+                <a:tailEnd/>
+              </a14:hiddenLine>
+            </a:ext>
+          </a:extLst>
+        </p:spPr>
+      </p:pic>
+      <p:pic>
+        <p:nvPicPr>
+          <p:cNvPr id="26" name="Picture 4"/>
+          <p:cNvPicPr>
+            <a:picLocks noChangeAspect="1" noChangeArrowheads="1"/>
+          </p:cNvPicPr>
+          <p:nvPr/>
+        </p:nvPicPr>
+        <p:blipFill>
+          <a:blip r:embed="rId6" cstate="print">
+            <a:extLst>
+              <a:ext uri="{28A0092B-C50C-407E-A947-70E740481C1C}">
+                <a14:useLocalDpi xmlns:a14="http://schemas.microsoft.com/office/drawing/2010/main" val="0"/>
+              </a:ext>
+            </a:extLst>
+          </a:blip>
+          <a:srcRect/>
+          <a:stretch>
+            <a:fillRect/>
+          </a:stretch>
+        </p:blipFill>
+        <p:spPr bwMode="auto">
+          <a:xfrm rot="2713436">
+            <a:off x="5976459" y="4147013"/>
+            <a:ext cx="762953" cy="375119"/>
+          </a:xfrm>
+          <a:prstGeom prst="rect">
+            <a:avLst/>
+          </a:prstGeom>
+          <a:noFill/>
+          <a:ln>
+            <a:noFill/>
+          </a:ln>
+          <a:extLst>
+            <a:ext uri="{909E8E84-426E-40DD-AFC4-6F175D3DCCD1}">
+              <a14:hiddenFill xmlns:a14="http://schemas.microsoft.com/office/drawing/2010/main">
+                <a:solidFill>
+                  <a:schemeClr val="accent1"/>
+                </a:solidFill>
+              </a14:hiddenFill>
+            </a:ext>
+            <a:ext uri="{91240B29-F687-4F45-9708-019B960494DF}">
+              <a14:hiddenLine xmlns:a14="http://schemas.microsoft.com/office/drawing/2010/main" w="9525">
+                <a:solidFill>
+                  <a:schemeClr val="tx1"/>
+                </a:solidFill>
+                <a:miter lim="800000"/>
+                <a:headEnd/>
+                <a:tailEnd/>
+              </a14:hiddenLine>
+            </a:ext>
+          </a:extLst>
+        </p:spPr>
+      </p:pic>
+      <p:pic>
+        <p:nvPicPr>
+          <p:cNvPr id="27" name="Picture 4"/>
+          <p:cNvPicPr>
+            <a:picLocks noChangeAspect="1" noChangeArrowheads="1"/>
+          </p:cNvPicPr>
+          <p:nvPr/>
+        </p:nvPicPr>
+        <p:blipFill>
+          <a:blip r:embed="rId6" cstate="print">
+            <a:extLst>
+              <a:ext uri="{28A0092B-C50C-407E-A947-70E740481C1C}">
+                <a14:useLocalDpi xmlns:a14="http://schemas.microsoft.com/office/drawing/2010/main" val="0"/>
+              </a:ext>
+            </a:extLst>
+          </a:blip>
+          <a:srcRect/>
+          <a:stretch>
+            <a:fillRect/>
+          </a:stretch>
+        </p:blipFill>
+        <p:spPr bwMode="auto">
+          <a:xfrm rot="18793568">
+            <a:off x="9428362" y="4059983"/>
+            <a:ext cx="762953" cy="375119"/>
+          </a:xfrm>
+          <a:prstGeom prst="rect">
+            <a:avLst/>
+          </a:prstGeom>
+          <a:noFill/>
+          <a:ln>
+            <a:noFill/>
+          </a:ln>
+          <a:extLst>
+            <a:ext uri="{909E8E84-426E-40DD-AFC4-6F175D3DCCD1}">
+              <a14:hiddenFill xmlns:a14="http://schemas.microsoft.com/office/drawing/2010/main">
+                <a:solidFill>
+                  <a:schemeClr val="accent1"/>
+                </a:solidFill>
+              </a14:hiddenFill>
+            </a:ext>
+            <a:ext uri="{91240B29-F687-4F45-9708-019B960494DF}">
+              <a14:hiddenLine xmlns:a14="http://schemas.microsoft.com/office/drawing/2010/main" w="9525">
+                <a:solidFill>
+                  <a:schemeClr val="tx1"/>
+                </a:solidFill>
+                <a:miter lim="800000"/>
+                <a:headEnd/>
+                <a:tailEnd/>
+              </a14:hiddenLine>
+            </a:ext>
+          </a:extLst>
+        </p:spPr>
+      </p:pic>
+      <p:pic>
+        <p:nvPicPr>
+          <p:cNvPr id="2053" name="Picture 5"/>
+          <p:cNvPicPr>
+            <a:picLocks noChangeAspect="1" noChangeArrowheads="1"/>
+          </p:cNvPicPr>
+          <p:nvPr/>
+        </p:nvPicPr>
+        <p:blipFill>
+          <a:blip r:embed="rId7">
+            <a:clrChange>
+              <a:clrFrom>
+                <a:srgbClr val="FFFFFF"/>
+              </a:clrFrom>
+              <a:clrTo>
+                <a:srgbClr val="FFFFFF">
+                  <a:alpha val="0"/>
+                </a:srgbClr>
+              </a:clrTo>
+            </a:clrChange>
+            <a:extLst>
+              <a:ext uri="{28A0092B-C50C-407E-A947-70E740481C1C}">
+                <a14:useLocalDpi xmlns:a14="http://schemas.microsoft.com/office/drawing/2010/main" val="0"/>
+              </a:ext>
+            </a:extLst>
+          </a:blip>
+          <a:srcRect/>
+          <a:stretch>
+            <a:fillRect/>
+          </a:stretch>
+        </p:blipFill>
+        <p:spPr bwMode="auto">
+          <a:xfrm>
+            <a:off x="2564137" y="5292672"/>
+            <a:ext cx="1312545" cy="1143604"/>
+          </a:xfrm>
+          <a:prstGeom prst="rect">
+            <a:avLst/>
+          </a:prstGeom>
+          <a:noFill/>
+          <a:ln>
+            <a:noFill/>
+          </a:ln>
+          <a:extLst>
+            <a:ext uri="{909E8E84-426E-40DD-AFC4-6F175D3DCCD1}">
+              <a14:hiddenFill xmlns:a14="http://schemas.microsoft.com/office/drawing/2010/main">
+                <a:solidFill>
+                  <a:schemeClr val="accent1"/>
+                </a:solidFill>
+              </a14:hiddenFill>
+            </a:ext>
+            <a:ext uri="{91240B29-F687-4F45-9708-019B960494DF}">
+              <a14:hiddenLine xmlns:a14="http://schemas.microsoft.com/office/drawing/2010/main" w="9525">
+                <a:solidFill>
+                  <a:schemeClr val="tx1"/>
+                </a:solidFill>
+                <a:miter lim="800000"/>
+                <a:headEnd/>
+                <a:tailEnd/>
+              </a14:hiddenLine>
+            </a:ext>
+          </a:extLst>
+        </p:spPr>
+      </p:pic>
+      <p:pic>
+        <p:nvPicPr>
+          <p:cNvPr id="28" name="Picture 5"/>
+          <p:cNvPicPr>
+            <a:picLocks noChangeAspect="1" noChangeArrowheads="1"/>
+          </p:cNvPicPr>
+          <p:nvPr/>
+        </p:nvPicPr>
+        <p:blipFill>
+          <a:blip r:embed="rId8" cstate="print">
+            <a:clrChange>
+              <a:clrFrom>
+                <a:srgbClr val="FFFFFF"/>
+              </a:clrFrom>
+              <a:clrTo>
+                <a:srgbClr val="FFFFFF">
+                  <a:alpha val="0"/>
+                </a:srgbClr>
+              </a:clrTo>
+            </a:clrChange>
+            <a:extLst>
+              <a:ext uri="{28A0092B-C50C-407E-A947-70E740481C1C}">
+                <a14:useLocalDpi xmlns:a14="http://schemas.microsoft.com/office/drawing/2010/main" val="0"/>
+              </a:ext>
+            </a:extLst>
+          </a:blip>
+          <a:srcRect/>
+          <a:stretch>
+            <a:fillRect/>
+          </a:stretch>
+        </p:blipFill>
+        <p:spPr bwMode="auto">
+          <a:xfrm>
+            <a:off x="11303816" y="3269162"/>
+            <a:ext cx="728675" cy="634886"/>
+          </a:xfrm>
+          <a:prstGeom prst="rect">
+            <a:avLst/>
+          </a:prstGeom>
+          <a:noFill/>
+          <a:ln>
+            <a:noFill/>
+          </a:ln>
+          <a:extLst>
+            <a:ext uri="{909E8E84-426E-40DD-AFC4-6F175D3DCCD1}">
+              <a14:hiddenFill xmlns:a14="http://schemas.microsoft.com/office/drawing/2010/main">
+                <a:solidFill>
+                  <a:schemeClr val="accent1"/>
+                </a:solidFill>
+              </a14:hiddenFill>
+            </a:ext>
+            <a:ext uri="{91240B29-F687-4F45-9708-019B960494DF}">
+              <a14:hiddenLine xmlns:a14="http://schemas.microsoft.com/office/drawing/2010/main" w="9525">
+                <a:solidFill>
+                  <a:schemeClr val="tx1"/>
+                </a:solidFill>
+                <a:miter lim="800000"/>
+                <a:headEnd/>
+                <a:tailEnd/>
+              </a14:hiddenLine>
+            </a:ext>
+          </a:extLst>
+        </p:spPr>
+      </p:pic>
+      <p:pic>
+        <p:nvPicPr>
+          <p:cNvPr id="29" name="Picture 4"/>
+          <p:cNvPicPr>
+            <a:picLocks noChangeAspect="1" noChangeArrowheads="1"/>
+          </p:cNvPicPr>
+          <p:nvPr/>
+        </p:nvPicPr>
+        <p:blipFill>
+          <a:blip r:embed="rId9" cstate="print">
+            <a:extLst>
+              <a:ext uri="{28A0092B-C50C-407E-A947-70E740481C1C}">
+                <a14:useLocalDpi xmlns:a14="http://schemas.microsoft.com/office/drawing/2010/main" val="0"/>
+              </a:ext>
+            </a:extLst>
+          </a:blip>
+          <a:srcRect/>
+          <a:stretch>
+            <a:fillRect/>
+          </a:stretch>
+        </p:blipFill>
+        <p:spPr bwMode="auto">
+          <a:xfrm>
+            <a:off x="288636" y="3931670"/>
+            <a:ext cx="1037749" cy="510227"/>
+          </a:xfrm>
+          <a:prstGeom prst="rect">
+            <a:avLst/>
+          </a:prstGeom>
+          <a:noFill/>
+          <a:ln>
+            <a:noFill/>
+          </a:ln>
+          <a:extLst>
+            <a:ext uri="{909E8E84-426E-40DD-AFC4-6F175D3DCCD1}">
+              <a14:hiddenFill xmlns:a14="http://schemas.microsoft.com/office/drawing/2010/main">
+                <a:solidFill>
+                  <a:schemeClr val="accent1"/>
+                </a:solidFill>
+              </a14:hiddenFill>
+            </a:ext>
+            <a:ext uri="{91240B29-F687-4F45-9708-019B960494DF}">
+              <a14:hiddenLine xmlns:a14="http://schemas.microsoft.com/office/drawing/2010/main" w="9525">
+                <a:solidFill>
+                  <a:schemeClr val="tx1"/>
+                </a:solidFill>
+                <a:miter lim="800000"/>
+                <a:headEnd/>
+                <a:tailEnd/>
+              </a14:hiddenLine>
+            </a:ext>
+          </a:extLst>
+        </p:spPr>
+      </p:pic>
+      <p:pic>
+        <p:nvPicPr>
+          <p:cNvPr id="30" name="Picture 4"/>
+          <p:cNvPicPr>
+            <a:picLocks noChangeAspect="1" noChangeArrowheads="1"/>
+          </p:cNvPicPr>
+          <p:nvPr/>
+        </p:nvPicPr>
+        <p:blipFill>
+          <a:blip r:embed="rId10" cstate="print">
+            <a:extLst>
+              <a:ext uri="{28A0092B-C50C-407E-A947-70E740481C1C}">
+                <a14:useLocalDpi xmlns:a14="http://schemas.microsoft.com/office/drawing/2010/main" val="0"/>
+              </a:ext>
+            </a:extLst>
+          </a:blip>
+          <a:srcRect/>
+          <a:stretch>
+            <a:fillRect/>
+          </a:stretch>
+        </p:blipFill>
+        <p:spPr bwMode="auto">
+          <a:xfrm>
+            <a:off x="11035693" y="2208093"/>
+            <a:ext cx="869604" cy="427556"/>
+          </a:xfrm>
+          <a:prstGeom prst="rect">
+            <a:avLst/>
+          </a:prstGeom>
+          <a:noFill/>
+          <a:ln>
+            <a:noFill/>
+          </a:ln>
+          <a:extLst>
+            <a:ext uri="{909E8E84-426E-40DD-AFC4-6F175D3DCCD1}">
+              <a14:hiddenFill xmlns:a14="http://schemas.microsoft.com/office/drawing/2010/main">
+                <a:solidFill>
+                  <a:schemeClr val="accent1"/>
+                </a:solidFill>
+              </a14:hiddenFill>
+            </a:ext>
+            <a:ext uri="{91240B29-F687-4F45-9708-019B960494DF}">
+              <a14:hiddenLine xmlns:a14="http://schemas.microsoft.com/office/drawing/2010/main" w="9525">
+                <a:solidFill>
+                  <a:schemeClr val="tx1"/>
+                </a:solidFill>
+                <a:miter lim="800000"/>
+                <a:headEnd/>
+                <a:tailEnd/>
+              </a14:hiddenLine>
+            </a:ext>
+          </a:extLst>
+        </p:spPr>
+      </p:pic>
     </p:spTree>
     <p:extLst>
       <p:ext uri="{BB962C8B-B14F-4D97-AF65-F5344CB8AC3E}">
-        <p14:creationId xmlns:p14="http://schemas.microsoft.com/office/powerpoint/2010/main" val="194335550"/>
+        <p14:creationId xmlns:p14="http://schemas.microsoft.com/office/powerpoint/2010/main" val="3044257035"/>
       </p:ext>
     </p:extLst>
   </p:cSld>
   <p:clrMapOvr>
     <a:masterClrMapping/>
   </p:clrMapOvr>
+  <p:timing>
+    <p:tnLst>
+      <p:par>
+        <p:cTn id="1" dur="indefinite" restart="never" nodeType="tmRoot"/>
+      </p:par>
+    </p:tnLst>
+  </p:timing>
 </p:sld>
 </file>
 
@@ -4746,7 +6354,7 @@
           <p:cNvPr id="2" name="Title 1">
             <a:extLst>
               <a:ext uri="{FF2B5EF4-FFF2-40B4-BE49-F238E27FC236}">
-                <a16:creationId xmlns:a16="http://schemas.microsoft.com/office/drawing/2014/main" id="{79D1F416-776B-4843-A8FF-3500C39CDFA4}"/>
+                <a16:creationId xmlns:a16="http://schemas.microsoft.com/office/drawing/2014/main" xmlns="" id="{C893F8C1-F5C5-428B-BB9C-749ED6BDBD10}"/>
               </a:ext>
             </a:extLst>
           </p:cNvPr>
@@ -4764,17 +6372,413 @@
           <a:p>
             <a:r>
               <a:rPr lang="en-GB" dirty="0"/>
-              <a:t>Research goals</a:t>
-            </a:r>
-          </a:p>
-        </p:txBody>
-      </p:sp>
-      <p:sp>
-        <p:nvSpPr>
-          <p:cNvPr id="3" name="Content Placeholder 2">
-            <a:extLst>
-              <a:ext uri="{FF2B5EF4-FFF2-40B4-BE49-F238E27FC236}">
-                <a16:creationId xmlns:a16="http://schemas.microsoft.com/office/drawing/2014/main" id="{BF561162-7D88-4D0D-8A94-05B2FF4E139A}"/>
+              <a:t>What is a </a:t>
+            </a:r>
+            <a:r>
+              <a:rPr lang="en-GB" dirty="0" smtClean="0"/>
+              <a:t>(Quantum) </a:t>
+            </a:r>
+            <a:r>
+              <a:rPr lang="en-GB" dirty="0"/>
+              <a:t>Network?</a:t>
+            </a:r>
+          </a:p>
+        </p:txBody>
+      </p:sp>
+      <p:sp>
+        <p:nvSpPr>
+          <p:cNvPr id="4" name="Date Placeholder 3">
+            <a:extLst>
+              <a:ext uri="{FF2B5EF4-FFF2-40B4-BE49-F238E27FC236}">
+                <a16:creationId xmlns:a16="http://schemas.microsoft.com/office/drawing/2014/main" xmlns="" id="{0252B0D5-ED16-4631-AE92-A0C1A72600AA}"/>
+              </a:ext>
+            </a:extLst>
+          </p:cNvPr>
+          <p:cNvSpPr>
+            <a:spLocks noGrp="1"/>
+          </p:cNvSpPr>
+          <p:nvPr>
+            <p:ph type="dt" sz="half" idx="10"/>
+          </p:nvPr>
+        </p:nvSpPr>
+        <p:spPr/>
+        <p:txBody>
+          <a:bodyPr/>
+          <a:lstStyle/>
+          <a:p>
+            <a:r>
+              <a:rPr lang="en-GB"/>
+              <a:t>23/11/2018</a:t>
+            </a:r>
+          </a:p>
+        </p:txBody>
+      </p:sp>
+      <p:sp>
+        <p:nvSpPr>
+          <p:cNvPr id="5" name="Footer Placeholder 4">
+            <a:extLst>
+              <a:ext uri="{FF2B5EF4-FFF2-40B4-BE49-F238E27FC236}">
+                <a16:creationId xmlns:a16="http://schemas.microsoft.com/office/drawing/2014/main" xmlns="" id="{E363BA60-A7FB-4D97-B01D-ACDE1FF0EFBD}"/>
+              </a:ext>
+            </a:extLst>
+          </p:cNvPr>
+          <p:cNvSpPr>
+            <a:spLocks noGrp="1"/>
+          </p:cNvSpPr>
+          <p:nvPr>
+            <p:ph type="ftr" sz="quarter" idx="11"/>
+          </p:nvPr>
+        </p:nvSpPr>
+        <p:spPr/>
+        <p:txBody>
+          <a:bodyPr/>
+          <a:lstStyle/>
+          <a:p>
+            <a:r>
+              <a:rPr lang="en-GB"/>
+              <a:t>Matteo Pompili – First Year Proposal</a:t>
+            </a:r>
+          </a:p>
+        </p:txBody>
+      </p:sp>
+      <p:sp>
+        <p:nvSpPr>
+          <p:cNvPr id="6" name="Slide Number Placeholder 5">
+            <a:extLst>
+              <a:ext uri="{FF2B5EF4-FFF2-40B4-BE49-F238E27FC236}">
+                <a16:creationId xmlns:a16="http://schemas.microsoft.com/office/drawing/2014/main" xmlns="" id="{0ADB66BD-7AEC-44AA-84A8-7EE767874EC4}"/>
+              </a:ext>
+            </a:extLst>
+          </p:cNvPr>
+          <p:cNvSpPr>
+            <a:spLocks noGrp="1"/>
+          </p:cNvSpPr>
+          <p:nvPr>
+            <p:ph type="sldNum" sz="quarter" idx="12"/>
+          </p:nvPr>
+        </p:nvSpPr>
+        <p:spPr/>
+        <p:txBody>
+          <a:bodyPr/>
+          <a:lstStyle/>
+          <a:p>
+            <a:fld id="{C65EB005-FA87-4171-8C7C-FBB2804DF50E}" type="slidenum">
+              <a:rPr lang="en-GB" smtClean="0"/>
+              <a:t>4</a:t>
+            </a:fld>
+            <a:endParaRPr lang="en-GB"/>
+          </a:p>
+        </p:txBody>
+      </p:sp>
+      <p:grpSp>
+        <p:nvGrpSpPr>
+          <p:cNvPr id="3" name="Group 2"/>
+          <p:cNvGrpSpPr/>
+          <p:nvPr/>
+        </p:nvGrpSpPr>
+        <p:grpSpPr>
+          <a:xfrm>
+            <a:off x="7101182" y="3414838"/>
+            <a:ext cx="5847969" cy="2239817"/>
+            <a:chOff x="-71380" y="2639495"/>
+            <a:chExt cx="11586137" cy="4437580"/>
+          </a:xfrm>
+        </p:grpSpPr>
+        <p:cxnSp>
+          <p:nvCxnSpPr>
+            <p:cNvPr id="14" name="Straight Connector 13"/>
+            <p:cNvCxnSpPr/>
+            <p:nvPr/>
+          </p:nvCxnSpPr>
+          <p:spPr>
+            <a:xfrm flipV="1">
+              <a:off x="2876550" y="3448050"/>
+              <a:ext cx="1514475" cy="1190625"/>
+            </a:xfrm>
+            <a:prstGeom prst="line">
+              <a:avLst/>
+            </a:prstGeom>
+            <a:ln w="28575"/>
+          </p:spPr>
+          <p:style>
+            <a:lnRef idx="1">
+              <a:schemeClr val="dk1"/>
+            </a:lnRef>
+            <a:fillRef idx="0">
+              <a:schemeClr val="dk1"/>
+            </a:fillRef>
+            <a:effectRef idx="0">
+              <a:schemeClr val="dk1"/>
+            </a:effectRef>
+            <a:fontRef idx="minor">
+              <a:schemeClr val="tx1"/>
+            </a:fontRef>
+          </p:style>
+        </p:cxnSp>
+        <p:cxnSp>
+          <p:nvCxnSpPr>
+            <p:cNvPr id="16" name="Straight Connector 15"/>
+            <p:cNvCxnSpPr/>
+            <p:nvPr/>
+          </p:nvCxnSpPr>
+          <p:spPr>
+            <a:xfrm flipV="1">
+              <a:off x="9014502" y="3690938"/>
+              <a:ext cx="1590675" cy="1709737"/>
+            </a:xfrm>
+            <a:prstGeom prst="line">
+              <a:avLst/>
+            </a:prstGeom>
+            <a:ln w="28575"/>
+          </p:spPr>
+          <p:style>
+            <a:lnRef idx="1">
+              <a:schemeClr val="dk1"/>
+            </a:lnRef>
+            <a:fillRef idx="0">
+              <a:schemeClr val="dk1"/>
+            </a:fillRef>
+            <a:effectRef idx="0">
+              <a:schemeClr val="dk1"/>
+            </a:effectRef>
+            <a:fontRef idx="minor">
+              <a:schemeClr val="tx1"/>
+            </a:fontRef>
+          </p:style>
+        </p:cxnSp>
+        <p:cxnSp>
+          <p:nvCxnSpPr>
+            <p:cNvPr id="17" name="Straight Connector 16"/>
+            <p:cNvCxnSpPr/>
+            <p:nvPr/>
+          </p:nvCxnSpPr>
+          <p:spPr>
+            <a:xfrm>
+              <a:off x="5410199" y="3669506"/>
+              <a:ext cx="1895475" cy="1938337"/>
+            </a:xfrm>
+            <a:prstGeom prst="line">
+              <a:avLst/>
+            </a:prstGeom>
+            <a:ln w="28575"/>
+          </p:spPr>
+          <p:style>
+            <a:lnRef idx="1">
+              <a:schemeClr val="dk1"/>
+            </a:lnRef>
+            <a:fillRef idx="0">
+              <a:schemeClr val="dk1"/>
+            </a:fillRef>
+            <a:effectRef idx="0">
+              <a:schemeClr val="dk1"/>
+            </a:effectRef>
+            <a:fontRef idx="minor">
+              <a:schemeClr val="tx1"/>
+            </a:fontRef>
+          </p:style>
+        </p:cxnSp>
+        <p:cxnSp>
+          <p:nvCxnSpPr>
+            <p:cNvPr id="23" name="Straight Connector 22"/>
+            <p:cNvCxnSpPr/>
+            <p:nvPr/>
+          </p:nvCxnSpPr>
+          <p:spPr>
+            <a:xfrm>
+              <a:off x="5486398" y="2700338"/>
+              <a:ext cx="4943477" cy="0"/>
+            </a:xfrm>
+            <a:prstGeom prst="line">
+              <a:avLst/>
+            </a:prstGeom>
+            <a:ln w="28575"/>
+          </p:spPr>
+          <p:style>
+            <a:lnRef idx="1">
+              <a:schemeClr val="dk1"/>
+            </a:lnRef>
+            <a:fillRef idx="0">
+              <a:schemeClr val="dk1"/>
+            </a:fillRef>
+            <a:effectRef idx="0">
+              <a:schemeClr val="dk1"/>
+            </a:effectRef>
+            <a:fontRef idx="minor">
+              <a:schemeClr val="tx1"/>
+            </a:fontRef>
+          </p:style>
+        </p:cxnSp>
+        <p:pic>
+          <p:nvPicPr>
+            <p:cNvPr id="2051" name="Picture 3" descr="K:\ns\qt\Diamond\Posters - Presentations - Abstracts\Matteo\Talks\2018-06-15 Werkbespreking - Qutech\diamond_electron_carbon.png"/>
+            <p:cNvPicPr>
+              <a:picLocks noChangeAspect="1" noChangeArrowheads="1"/>
+            </p:cNvPicPr>
+            <p:nvPr/>
+          </p:nvPicPr>
+          <p:blipFill>
+            <a:blip r:embed="rId2" cstate="print">
+              <a:extLst>
+                <a:ext uri="{28A0092B-C50C-407E-A947-70E740481C1C}">
+                  <a14:useLocalDpi xmlns:a14="http://schemas.microsoft.com/office/drawing/2010/main" val="0"/>
+                </a:ext>
+              </a:extLst>
+            </a:blip>
+            <a:srcRect/>
+            <a:stretch>
+              <a:fillRect/>
+            </a:stretch>
+          </p:blipFill>
+          <p:spPr bwMode="auto">
+            <a:xfrm>
+              <a:off x="-71380" y="4438650"/>
+              <a:ext cx="2795530" cy="2638425"/>
+            </a:xfrm>
+            <a:prstGeom prst="rect">
+              <a:avLst/>
+            </a:prstGeom>
+            <a:noFill/>
+            <a:extLst>
+              <a:ext uri="{909E8E84-426E-40DD-AFC4-6F175D3DCCD1}">
+                <a14:hiddenFill xmlns:a14="http://schemas.microsoft.com/office/drawing/2010/main">
+                  <a:solidFill>
+                    <a:srgbClr val="FFFFFF"/>
+                  </a:solidFill>
+                </a14:hiddenFill>
+              </a:ext>
+            </a:extLst>
+          </p:spPr>
+        </p:pic>
+        <p:pic>
+          <p:nvPicPr>
+            <p:cNvPr id="21" name="Picture 3" descr="K:\ns\qt\Diamond\Posters - Presentations - Abstracts\Matteo\Talks\2018-06-15 Werkbespreking - Qutech\diamond_electron_carbon.png"/>
+            <p:cNvPicPr>
+              <a:picLocks noChangeAspect="1" noChangeArrowheads="1"/>
+            </p:cNvPicPr>
+            <p:nvPr/>
+          </p:nvPicPr>
+          <p:blipFill>
+            <a:blip r:embed="rId3" cstate="print">
+              <a:extLst>
+                <a:ext uri="{28A0092B-C50C-407E-A947-70E740481C1C}">
+                  <a14:useLocalDpi xmlns:a14="http://schemas.microsoft.com/office/drawing/2010/main" val="0"/>
+                </a:ext>
+              </a:extLst>
+            </a:blip>
+            <a:srcRect/>
+            <a:stretch>
+              <a:fillRect/>
+            </a:stretch>
+          </p:blipFill>
+          <p:spPr bwMode="auto">
+            <a:xfrm>
+              <a:off x="7234295" y="5292672"/>
+              <a:ext cx="1890655" cy="1784403"/>
+            </a:xfrm>
+            <a:prstGeom prst="rect">
+              <a:avLst/>
+            </a:prstGeom>
+            <a:noFill/>
+            <a:extLst>
+              <a:ext uri="{909E8E84-426E-40DD-AFC4-6F175D3DCCD1}">
+                <a14:hiddenFill xmlns:a14="http://schemas.microsoft.com/office/drawing/2010/main">
+                  <a:solidFill>
+                    <a:srgbClr val="FFFFFF"/>
+                  </a:solidFill>
+                </a14:hiddenFill>
+              </a:ext>
+            </a:extLst>
+          </p:spPr>
+        </p:pic>
+        <p:pic>
+          <p:nvPicPr>
+            <p:cNvPr id="22" name="Picture 3" descr="K:\ns\qt\Diamond\Posters - Presentations - Abstracts\Matteo\Talks\2018-06-15 Werkbespreking - Qutech\diamond_electron_carbon.png"/>
+            <p:cNvPicPr>
+              <a:picLocks noChangeAspect="1" noChangeArrowheads="1"/>
+            </p:cNvPicPr>
+            <p:nvPr/>
+          </p:nvPicPr>
+          <p:blipFill>
+            <a:blip r:embed="rId4" cstate="print">
+              <a:extLst>
+                <a:ext uri="{28A0092B-C50C-407E-A947-70E740481C1C}">
+                  <a14:useLocalDpi xmlns:a14="http://schemas.microsoft.com/office/drawing/2010/main" val="0"/>
+                </a:ext>
+              </a:extLst>
+            </a:blip>
+            <a:srcRect/>
+            <a:stretch>
+              <a:fillRect/>
+            </a:stretch>
+          </p:blipFill>
+          <p:spPr bwMode="auto">
+            <a:xfrm>
+              <a:off x="4481570" y="2657475"/>
+              <a:ext cx="842905" cy="795535"/>
+            </a:xfrm>
+            <a:prstGeom prst="rect">
+              <a:avLst/>
+            </a:prstGeom>
+            <a:noFill/>
+            <a:extLst>
+              <a:ext uri="{909E8E84-426E-40DD-AFC4-6F175D3DCCD1}">
+                <a14:hiddenFill xmlns:a14="http://schemas.microsoft.com/office/drawing/2010/main">
+                  <a:solidFill>
+                    <a:srgbClr val="FFFFFF"/>
+                  </a:solidFill>
+                </a14:hiddenFill>
+              </a:ext>
+            </a:extLst>
+          </p:spPr>
+        </p:pic>
+        <p:pic>
+          <p:nvPicPr>
+            <p:cNvPr id="24" name="Picture 3" descr="K:\ns\qt\Diamond\Posters - Presentations - Abstracts\Matteo\Talks\2018-06-15 Werkbespreking - Qutech\diamond_electron_carbon.png"/>
+            <p:cNvPicPr>
+              <a:picLocks noChangeAspect="1" noChangeArrowheads="1"/>
+            </p:cNvPicPr>
+            <p:nvPr/>
+          </p:nvPicPr>
+          <p:blipFill>
+            <a:blip r:embed="rId5" cstate="print">
+              <a:extLst>
+                <a:ext uri="{28A0092B-C50C-407E-A947-70E740481C1C}">
+                  <a14:useLocalDpi xmlns:a14="http://schemas.microsoft.com/office/drawing/2010/main" val="0"/>
+                </a:ext>
+              </a:extLst>
+            </a:blip>
+            <a:srcRect/>
+            <a:stretch>
+              <a:fillRect/>
+            </a:stretch>
+          </p:blipFill>
+          <p:spPr bwMode="auto">
+            <a:xfrm>
+              <a:off x="10633752" y="2639495"/>
+              <a:ext cx="881005" cy="831494"/>
+            </a:xfrm>
+            <a:prstGeom prst="rect">
+              <a:avLst/>
+            </a:prstGeom>
+            <a:noFill/>
+            <a:extLst>
+              <a:ext uri="{909E8E84-426E-40DD-AFC4-6F175D3DCCD1}">
+                <a14:hiddenFill xmlns:a14="http://schemas.microsoft.com/office/drawing/2010/main">
+                  <a:solidFill>
+                    <a:srgbClr val="FFFFFF"/>
+                  </a:solidFill>
+                </a14:hiddenFill>
+              </a:ext>
+            </a:extLst>
+          </p:spPr>
+        </p:pic>
+      </p:grpSp>
+      <p:sp>
+        <p:nvSpPr>
+          <p:cNvPr id="31" name="Content Placeholder 2">
+            <a:extLst>
+              <a:ext uri="{FF2B5EF4-FFF2-40B4-BE49-F238E27FC236}">
+                <a16:creationId xmlns:a16="http://schemas.microsoft.com/office/drawing/2014/main" xmlns="" id="{90AF49E2-E064-4EB7-B0A4-D5B29651E2AA}"/>
               </a:ext>
             </a:extLst>
           </p:cNvPr>
@@ -4795,153 +6799,108 @@
           <a:bodyPr/>
           <a:lstStyle/>
           <a:p>
-            <a:pPr marL="0" indent="0" algn="ctr">
+            <a:pPr marL="0" indent="0">
               <a:buNone/>
             </a:pPr>
             <a:r>
+              <a:rPr lang="en-GB" dirty="0" smtClean="0"/>
+              <a:t>Known applications:</a:t>
+            </a:r>
+          </a:p>
+          <a:p>
+            <a:pPr>
+              <a:buFontTx/>
+              <a:buChar char="-"/>
+            </a:pPr>
+            <a:r>
+              <a:rPr lang="en-GB" dirty="0" smtClean="0"/>
+              <a:t>Quantum Key Distribution (QKD)</a:t>
+            </a:r>
+          </a:p>
+          <a:p>
+            <a:pPr>
+              <a:buFontTx/>
+              <a:buChar char="-"/>
+            </a:pPr>
+            <a:r>
+              <a:rPr lang="en-GB" dirty="0" smtClean="0"/>
+              <a:t>Blind quantum </a:t>
+            </a:r>
+            <a:r>
               <a:rPr lang="en-GB" dirty="0"/>
-              <a:t>Demonstration of quantum applications on a multi-node network</a:t>
-            </a:r>
-          </a:p>
-          <a:p>
-            <a:pPr marL="0" indent="0" algn="ctr">
-              <a:buNone/>
+              <a:t>c</a:t>
+            </a:r>
+            <a:r>
+              <a:rPr lang="en-GB" dirty="0" smtClean="0"/>
+              <a:t>omputation</a:t>
+            </a:r>
+          </a:p>
+          <a:p>
+            <a:pPr>
+              <a:buFontTx/>
+              <a:buChar char="-"/>
+            </a:pPr>
+            <a:r>
+              <a:rPr lang="en-GB" dirty="0" smtClean="0"/>
+              <a:t>Distributed quantum computation</a:t>
+            </a:r>
+          </a:p>
+          <a:p>
+            <a:pPr>
+              <a:buFontTx/>
+              <a:buChar char="-"/>
+            </a:pPr>
+            <a:r>
+              <a:rPr lang="en-GB" dirty="0" smtClean="0"/>
+              <a:t>Clock Synchronization</a:t>
+            </a:r>
+          </a:p>
+          <a:p>
+            <a:pPr>
+              <a:buFontTx/>
+              <a:buChar char="-"/>
+            </a:pPr>
+            <a:r>
+              <a:rPr lang="en-GB" dirty="0" smtClean="0"/>
+              <a:t>Leader election</a:t>
+            </a:r>
+          </a:p>
+          <a:p>
+            <a:pPr>
+              <a:buFontTx/>
+              <a:buChar char="-"/>
+            </a:pPr>
+            <a:r>
+              <a:rPr lang="en-GB" dirty="0" smtClean="0"/>
+              <a:t>…</a:t>
+            </a:r>
+          </a:p>
+          <a:p>
+            <a:pPr>
+              <a:buFontTx/>
+              <a:buChar char="-"/>
             </a:pPr>
             <a:endParaRPr lang="en-GB" dirty="0"/>
-          </a:p>
-          <a:p>
-            <a:pPr marL="514350" indent="-514350">
-              <a:buAutoNum type="arabicPeriod"/>
-            </a:pPr>
-            <a:r>
-              <a:rPr lang="en-GB" dirty="0"/>
-              <a:t>Generation of genuine multipartite entangled states,</a:t>
-            </a:r>
-          </a:p>
-          <a:p>
-            <a:pPr marL="514350" indent="-514350">
-              <a:buAutoNum type="arabicPeriod"/>
-            </a:pPr>
-            <a:r>
-              <a:rPr lang="en-GB" dirty="0"/>
-              <a:t> Proof of principle demonstration of the Link layer of the future Quantum Internet stack,</a:t>
-            </a:r>
-          </a:p>
-          <a:p>
-            <a:pPr marL="514350" indent="-514350">
-              <a:buAutoNum type="arabicPeriod"/>
-            </a:pPr>
-            <a:r>
-              <a:rPr lang="en-GB" dirty="0"/>
-              <a:t>Teleportation of entanglement in a four node network,</a:t>
-            </a:r>
-          </a:p>
-          <a:p>
-            <a:pPr marL="514350" indent="-514350">
-              <a:buAutoNum type="arabicPeriod"/>
-            </a:pPr>
-            <a:r>
-              <a:rPr lang="en-GB" dirty="0"/>
-              <a:t>Client-Server secure delegation of quantum computation.</a:t>
-            </a:r>
-          </a:p>
-        </p:txBody>
-      </p:sp>
-      <p:sp>
-        <p:nvSpPr>
-          <p:cNvPr id="4" name="Date Placeholder 3">
-            <a:extLst>
-              <a:ext uri="{FF2B5EF4-FFF2-40B4-BE49-F238E27FC236}">
-                <a16:creationId xmlns:a16="http://schemas.microsoft.com/office/drawing/2014/main" id="{C7E009AB-8BD0-4162-9EA8-028C2565EC4B}"/>
-              </a:ext>
-            </a:extLst>
-          </p:cNvPr>
-          <p:cNvSpPr>
-            <a:spLocks noGrp="1"/>
-          </p:cNvSpPr>
-          <p:nvPr>
-            <p:ph type="dt" sz="half" idx="10"/>
-          </p:nvPr>
-        </p:nvSpPr>
-        <p:spPr/>
-        <p:txBody>
-          <a:bodyPr/>
-          <a:lstStyle/>
-          <a:p>
-            <a:r>
-              <a:rPr lang="en-GB"/>
-              <a:t>23/11/2018</a:t>
-            </a:r>
-          </a:p>
-        </p:txBody>
-      </p:sp>
-      <p:sp>
-        <p:nvSpPr>
-          <p:cNvPr id="5" name="Footer Placeholder 4">
-            <a:extLst>
-              <a:ext uri="{FF2B5EF4-FFF2-40B4-BE49-F238E27FC236}">
-                <a16:creationId xmlns:a16="http://schemas.microsoft.com/office/drawing/2014/main" id="{2F3D8614-BEA7-4D46-B44F-F2D694B883D0}"/>
-              </a:ext>
-            </a:extLst>
-          </p:cNvPr>
-          <p:cNvSpPr>
-            <a:spLocks noGrp="1"/>
-          </p:cNvSpPr>
-          <p:nvPr>
-            <p:ph type="ftr" sz="quarter" idx="11"/>
-          </p:nvPr>
-        </p:nvSpPr>
-        <p:spPr/>
-        <p:txBody>
-          <a:bodyPr/>
-          <a:lstStyle/>
-          <a:p>
-            <a:r>
-              <a:rPr lang="en-GB" dirty="0"/>
-              <a:t>Matteo Pompili – First Year Proposal</a:t>
-            </a:r>
-          </a:p>
-        </p:txBody>
-      </p:sp>
-      <p:sp>
-        <p:nvSpPr>
-          <p:cNvPr id="6" name="Slide Number Placeholder 5">
-            <a:extLst>
-              <a:ext uri="{FF2B5EF4-FFF2-40B4-BE49-F238E27FC236}">
-                <a16:creationId xmlns:a16="http://schemas.microsoft.com/office/drawing/2014/main" id="{3C590C63-308D-4F05-8939-630D888B01FB}"/>
-              </a:ext>
-            </a:extLst>
-          </p:cNvPr>
-          <p:cNvSpPr>
-            <a:spLocks noGrp="1"/>
-          </p:cNvSpPr>
-          <p:nvPr>
-            <p:ph type="sldNum" sz="quarter" idx="12"/>
-          </p:nvPr>
-        </p:nvSpPr>
-        <p:spPr/>
-        <p:txBody>
-          <a:bodyPr/>
-          <a:lstStyle/>
-          <a:p>
-            <a:fld id="{C65EB005-FA87-4171-8C7C-FBB2804DF50E}" type="slidenum">
-              <a:rPr lang="en-GB" smtClean="0"/>
-              <a:t>4</a:t>
-            </a:fld>
-            <a:endParaRPr lang="en-GB"/>
           </a:p>
         </p:txBody>
       </p:sp>
     </p:spTree>
     <p:extLst>
       <p:ext uri="{BB962C8B-B14F-4D97-AF65-F5344CB8AC3E}">
-        <p14:creationId xmlns:p14="http://schemas.microsoft.com/office/powerpoint/2010/main" val="385159449"/>
+        <p14:creationId xmlns:p14="http://schemas.microsoft.com/office/powerpoint/2010/main" val="2410347231"/>
       </p:ext>
     </p:extLst>
   </p:cSld>
   <p:clrMapOvr>
     <a:masterClrMapping/>
   </p:clrMapOvr>
+  <p:timing>
+    <p:tnLst>
+      <p:par>
+        <p:cTn id="1" dur="indefinite" restart="never" nodeType="tmRoot"/>
+      </p:par>
+    </p:tnLst>
+  </p:timing>
 </p:sld>
 </file>
 
@@ -4967,7 +6926,7 @@
           <p:cNvPr id="2" name="Title 1">
             <a:extLst>
               <a:ext uri="{FF2B5EF4-FFF2-40B4-BE49-F238E27FC236}">
-                <a16:creationId xmlns:a16="http://schemas.microsoft.com/office/drawing/2014/main" id="{27D9740F-53F1-42CE-9C22-88BD7A3FB608}"/>
+                <a16:creationId xmlns:a16="http://schemas.microsoft.com/office/drawing/2014/main" xmlns="" id="{561280E3-8A8B-4015-A804-CD9B353FBC87}"/>
               </a:ext>
             </a:extLst>
           </p:cNvPr>
@@ -4985,33 +6944,8 @@
           <a:p>
             <a:r>
               <a:rPr lang="en-GB" dirty="0"/>
-              <a:t>Genuine Multipartite Entanglement</a:t>
-            </a:r>
-          </a:p>
-        </p:txBody>
-      </p:sp>
-      <p:sp>
-        <p:nvSpPr>
-          <p:cNvPr id="3" name="Content Placeholder 2">
-            <a:extLst>
-              <a:ext uri="{FF2B5EF4-FFF2-40B4-BE49-F238E27FC236}">
-                <a16:creationId xmlns:a16="http://schemas.microsoft.com/office/drawing/2014/main" id="{884DFFA4-656D-4548-938E-88E94329A996}"/>
-              </a:ext>
-            </a:extLst>
-          </p:cNvPr>
-          <p:cNvSpPr>
-            <a:spLocks noGrp="1"/>
-          </p:cNvSpPr>
-          <p:nvPr>
-            <p:ph idx="1"/>
-          </p:nvPr>
-        </p:nvSpPr>
-        <p:spPr/>
-        <p:txBody>
-          <a:bodyPr/>
-          <a:lstStyle/>
-          <a:p>
-            <a:endParaRPr lang="en-GB"/>
+              <a:t>The Nitrogen Vacancy Centre in Diamond</a:t>
+            </a:r>
           </a:p>
         </p:txBody>
       </p:sp>
@@ -5020,7 +6954,7 @@
           <p:cNvPr id="4" name="Date Placeholder 3">
             <a:extLst>
               <a:ext uri="{FF2B5EF4-FFF2-40B4-BE49-F238E27FC236}">
-                <a16:creationId xmlns:a16="http://schemas.microsoft.com/office/drawing/2014/main" id="{6557802A-E2AB-42E0-87FA-EC3CA24E93C3}"/>
+                <a16:creationId xmlns:a16="http://schemas.microsoft.com/office/drawing/2014/main" xmlns="" id="{F9B32B6D-BC2F-4169-93CF-F4B14B246F00}"/>
               </a:ext>
             </a:extLst>
           </p:cNvPr>
@@ -5048,7 +6982,7 @@
           <p:cNvPr id="5" name="Footer Placeholder 4">
             <a:extLst>
               <a:ext uri="{FF2B5EF4-FFF2-40B4-BE49-F238E27FC236}">
-                <a16:creationId xmlns:a16="http://schemas.microsoft.com/office/drawing/2014/main" id="{B7DE347E-0519-4F36-B8DC-2FED6348814C}"/>
+                <a16:creationId xmlns:a16="http://schemas.microsoft.com/office/drawing/2014/main" xmlns="" id="{50BE2538-D335-4099-8C25-4B9E73A4A2DF}"/>
               </a:ext>
             </a:extLst>
           </p:cNvPr>
@@ -5076,7 +7010,7 @@
           <p:cNvPr id="6" name="Slide Number Placeholder 5">
             <a:extLst>
               <a:ext uri="{FF2B5EF4-FFF2-40B4-BE49-F238E27FC236}">
-                <a16:creationId xmlns:a16="http://schemas.microsoft.com/office/drawing/2014/main" id="{6A84C597-C7EB-4E36-A28A-D2E502A63EF9}"/>
+                <a16:creationId xmlns:a16="http://schemas.microsoft.com/office/drawing/2014/main" xmlns="" id="{9BD335DB-50FB-4825-8645-C2D1080D214E}"/>
               </a:ext>
             </a:extLst>
           </p:cNvPr>
@@ -5100,16 +7034,269 @@
           </a:p>
         </p:txBody>
       </p:sp>
+      <p:pic>
+        <p:nvPicPr>
+          <p:cNvPr id="7" name="Picture 2"/>
+          <p:cNvPicPr>
+            <a:picLocks noChangeAspect="1" noChangeArrowheads="1"/>
+          </p:cNvPicPr>
+          <p:nvPr/>
+        </p:nvPicPr>
+        <p:blipFill>
+          <a:blip r:embed="rId2" cstate="print">
+            <a:extLst>
+              <a:ext uri="{28A0092B-C50C-407E-A947-70E740481C1C}">
+                <a14:useLocalDpi xmlns:a14="http://schemas.microsoft.com/office/drawing/2010/main" val="0"/>
+              </a:ext>
+            </a:extLst>
+          </a:blip>
+          <a:srcRect/>
+          <a:stretch>
+            <a:fillRect/>
+          </a:stretch>
+        </p:blipFill>
+        <p:spPr bwMode="auto">
+          <a:xfrm>
+            <a:off x="705803" y="2103120"/>
+            <a:ext cx="2655199" cy="3092768"/>
+          </a:xfrm>
+          <a:prstGeom prst="rect">
+            <a:avLst/>
+          </a:prstGeom>
+          <a:noFill/>
+          <a:ln>
+            <a:noFill/>
+          </a:ln>
+          <a:effectLst/>
+          <a:extLst>
+            <a:ext uri="{909E8E84-426E-40DD-AFC4-6F175D3DCCD1}">
+              <a14:hiddenFill xmlns:a14="http://schemas.microsoft.com/office/drawing/2010/main">
+                <a:solidFill>
+                  <a:schemeClr val="accent1"/>
+                </a:solidFill>
+              </a14:hiddenFill>
+            </a:ext>
+            <a:ext uri="{91240B29-F687-4F45-9708-019B960494DF}">
+              <a14:hiddenLine xmlns:a14="http://schemas.microsoft.com/office/drawing/2010/main" w="9525">
+                <a:solidFill>
+                  <a:schemeClr val="tx1"/>
+                </a:solidFill>
+                <a:miter lim="800000"/>
+                <a:headEnd/>
+                <a:tailEnd/>
+              </a14:hiddenLine>
+            </a:ext>
+            <a:ext uri="{AF507438-7753-43E0-B8FC-AC1667EBCBE1}">
+              <a14:hiddenEffects xmlns:a14="http://schemas.microsoft.com/office/drawing/2010/main">
+                <a:effectLst>
+                  <a:outerShdw dist="35921" dir="2700000" algn="ctr" rotWithShape="0">
+                    <a:schemeClr val="bg2"/>
+                  </a:outerShdw>
+                </a:effectLst>
+              </a14:hiddenEffects>
+            </a:ext>
+          </a:extLst>
+        </p:spPr>
+      </p:pic>
+      <p:grpSp>
+        <p:nvGrpSpPr>
+          <p:cNvPr id="10" name="Group 9"/>
+          <p:cNvGrpSpPr/>
+          <p:nvPr/>
+        </p:nvGrpSpPr>
+        <p:grpSpPr>
+          <a:xfrm>
+            <a:off x="3464858" y="2597816"/>
+            <a:ext cx="536900" cy="816408"/>
+            <a:chOff x="3361001" y="3139074"/>
+            <a:chExt cx="536900" cy="816408"/>
+          </a:xfrm>
+        </p:grpSpPr>
+        <p:pic>
+          <p:nvPicPr>
+            <p:cNvPr id="8" name="Picture 7" descr="A picture containing music&#10;&#10;Description generated with high confidence">
+              <a:extLst>
+                <a:ext uri="{FF2B5EF4-FFF2-40B4-BE49-F238E27FC236}">
+                  <a16:creationId xmlns="" xmlns:a16="http://schemas.microsoft.com/office/drawing/2014/main" id="{50407C5E-833F-43DD-A261-B80D96C872FD}"/>
+                </a:ext>
+              </a:extLst>
+            </p:cNvPr>
+            <p:cNvPicPr>
+              <a:picLocks noChangeAspect="1"/>
+            </p:cNvPicPr>
+            <p:nvPr/>
+          </p:nvPicPr>
+          <p:blipFill>
+            <a:blip r:embed="rId3" cstate="print">
+              <a:extLst>
+                <a:ext uri="{28A0092B-C50C-407E-A947-70E740481C1C}">
+                  <a14:useLocalDpi xmlns:a14="http://schemas.microsoft.com/office/drawing/2010/main" val="0"/>
+                </a:ext>
+              </a:extLst>
+            </a:blip>
+            <a:stretch>
+              <a:fillRect/>
+            </a:stretch>
+          </p:blipFill>
+          <p:spPr>
+            <a:xfrm rot="9266596" flipH="1">
+              <a:off x="3475586" y="3328488"/>
+              <a:ext cx="422315" cy="626994"/>
+            </a:xfrm>
+            <a:prstGeom prst="rect">
+              <a:avLst/>
+            </a:prstGeom>
+          </p:spPr>
+        </p:pic>
+        <p:sp>
+          <p:nvSpPr>
+            <p:cNvPr id="9" name="TextBox 8">
+              <a:extLst>
+                <a:ext uri="{FF2B5EF4-FFF2-40B4-BE49-F238E27FC236}">
+                  <a16:creationId xmlns="" xmlns:a16="http://schemas.microsoft.com/office/drawing/2014/main" id="{898C1F26-F80A-4852-AD86-4475101FD0C5}"/>
+                </a:ext>
+              </a:extLst>
+            </p:cNvPr>
+            <p:cNvSpPr txBox="1"/>
+            <p:nvPr/>
+          </p:nvSpPr>
+          <p:spPr>
+            <a:xfrm>
+              <a:off x="3361001" y="3139074"/>
+              <a:ext cx="466794" cy="338554"/>
+            </a:xfrm>
+            <a:prstGeom prst="rect">
+              <a:avLst/>
+            </a:prstGeom>
+            <a:noFill/>
+          </p:spPr>
+          <p:txBody>
+            <a:bodyPr wrap="none" rtlCol="0">
+              <a:spAutoFit/>
+            </a:bodyPr>
+            <a:lstStyle/>
+            <a:p>
+              <a:r>
+                <a:rPr lang="it-IT" sz="1600" b="1" dirty="0">
+                  <a:latin typeface="Constantia" panose="02030602050306030303" pitchFamily="18" charset="0"/>
+                </a:rPr>
+                <a:t>C¹³</a:t>
+              </a:r>
+              <a:endParaRPr lang="it-IT" sz="1200" b="1" dirty="0">
+                <a:latin typeface="Constantia" panose="02030602050306030303" pitchFamily="18" charset="0"/>
+              </a:endParaRPr>
+            </a:p>
+          </p:txBody>
+        </p:sp>
+      </p:grpSp>
+      <p:grpSp>
+        <p:nvGrpSpPr>
+          <p:cNvPr id="11" name="Group 10"/>
+          <p:cNvGrpSpPr/>
+          <p:nvPr/>
+        </p:nvGrpSpPr>
+        <p:grpSpPr>
+          <a:xfrm>
+            <a:off x="828338" y="4921916"/>
+            <a:ext cx="639240" cy="714068"/>
+            <a:chOff x="3361001" y="3139074"/>
+            <a:chExt cx="639240" cy="714068"/>
+          </a:xfrm>
+        </p:grpSpPr>
+        <p:pic>
+          <p:nvPicPr>
+            <p:cNvPr id="12" name="Picture 11" descr="A picture containing music&#10;&#10;Description generated with high confidence">
+              <a:extLst>
+                <a:ext uri="{FF2B5EF4-FFF2-40B4-BE49-F238E27FC236}">
+                  <a16:creationId xmlns="" xmlns:a16="http://schemas.microsoft.com/office/drawing/2014/main" id="{50407C5E-833F-43DD-A261-B80D96C872FD}"/>
+                </a:ext>
+              </a:extLst>
+            </p:cNvPr>
+            <p:cNvPicPr>
+              <a:picLocks noChangeAspect="1"/>
+            </p:cNvPicPr>
+            <p:nvPr/>
+          </p:nvPicPr>
+          <p:blipFill>
+            <a:blip r:embed="rId3" cstate="print">
+              <a:extLst>
+                <a:ext uri="{28A0092B-C50C-407E-A947-70E740481C1C}">
+                  <a14:useLocalDpi xmlns:a14="http://schemas.microsoft.com/office/drawing/2010/main" val="0"/>
+                </a:ext>
+              </a:extLst>
+            </a:blip>
+            <a:stretch>
+              <a:fillRect/>
+            </a:stretch>
+          </p:blipFill>
+          <p:spPr>
+            <a:xfrm rot="2913875" flipH="1">
+              <a:off x="3475586" y="3328488"/>
+              <a:ext cx="422315" cy="626994"/>
+            </a:xfrm>
+            <a:prstGeom prst="rect">
+              <a:avLst/>
+            </a:prstGeom>
+          </p:spPr>
+        </p:pic>
+        <p:sp>
+          <p:nvSpPr>
+            <p:cNvPr id="13" name="TextBox 12">
+              <a:extLst>
+                <a:ext uri="{FF2B5EF4-FFF2-40B4-BE49-F238E27FC236}">
+                  <a16:creationId xmlns="" xmlns:a16="http://schemas.microsoft.com/office/drawing/2014/main" id="{898C1F26-F80A-4852-AD86-4475101FD0C5}"/>
+                </a:ext>
+              </a:extLst>
+            </p:cNvPr>
+            <p:cNvSpPr txBox="1"/>
+            <p:nvPr/>
+          </p:nvSpPr>
+          <p:spPr>
+            <a:xfrm>
+              <a:off x="3361001" y="3139074"/>
+              <a:ext cx="466794" cy="338554"/>
+            </a:xfrm>
+            <a:prstGeom prst="rect">
+              <a:avLst/>
+            </a:prstGeom>
+            <a:noFill/>
+          </p:spPr>
+          <p:txBody>
+            <a:bodyPr wrap="none" rtlCol="0">
+              <a:spAutoFit/>
+            </a:bodyPr>
+            <a:lstStyle/>
+            <a:p>
+              <a:r>
+                <a:rPr lang="it-IT" sz="1600" b="1" dirty="0">
+                  <a:latin typeface="Constantia" panose="02030602050306030303" pitchFamily="18" charset="0"/>
+                </a:rPr>
+                <a:t>C¹³</a:t>
+              </a:r>
+              <a:endParaRPr lang="it-IT" sz="1200" b="1" dirty="0">
+                <a:latin typeface="Constantia" panose="02030602050306030303" pitchFamily="18" charset="0"/>
+              </a:endParaRPr>
+            </a:p>
+          </p:txBody>
+        </p:sp>
+      </p:grpSp>
     </p:spTree>
     <p:extLst>
       <p:ext uri="{BB962C8B-B14F-4D97-AF65-F5344CB8AC3E}">
-        <p14:creationId xmlns:p14="http://schemas.microsoft.com/office/powerpoint/2010/main" val="1937784935"/>
+        <p14:creationId xmlns:p14="http://schemas.microsoft.com/office/powerpoint/2010/main" val="194335550"/>
       </p:ext>
     </p:extLst>
   </p:cSld>
   <p:clrMapOvr>
     <a:masterClrMapping/>
   </p:clrMapOvr>
+  <p:timing>
+    <p:tnLst>
+      <p:par>
+        <p:cTn id="1" dur="indefinite" restart="never" nodeType="tmRoot"/>
+      </p:par>
+    </p:tnLst>
+  </p:timing>
 </p:sld>
 </file>
 
@@ -5135,7 +7322,7 @@
           <p:cNvPr id="2" name="Title 1">
             <a:extLst>
               <a:ext uri="{FF2B5EF4-FFF2-40B4-BE49-F238E27FC236}">
-                <a16:creationId xmlns:a16="http://schemas.microsoft.com/office/drawing/2014/main" id="{0137ED8F-287D-4DA9-A36E-701593310309}"/>
+                <a16:creationId xmlns:a16="http://schemas.microsoft.com/office/drawing/2014/main" xmlns="" id="{79D1F416-776B-4843-A8FF-3500C39CDFA4}"/>
               </a:ext>
             </a:extLst>
           </p:cNvPr>
@@ -5153,7 +7340,7 @@
           <a:p>
             <a:r>
               <a:rPr lang="en-GB" dirty="0"/>
-              <a:t>Link Layer Demonstration</a:t>
+              <a:t>Research goals</a:t>
             </a:r>
           </a:p>
         </p:txBody>
@@ -5163,7 +7350,7 @@
           <p:cNvPr id="3" name="Content Placeholder 2">
             <a:extLst>
               <a:ext uri="{FF2B5EF4-FFF2-40B4-BE49-F238E27FC236}">
-                <a16:creationId xmlns:a16="http://schemas.microsoft.com/office/drawing/2014/main" id="{FB02330F-BCF6-4141-870B-3423DB8E45B0}"/>
+                <a16:creationId xmlns:a16="http://schemas.microsoft.com/office/drawing/2014/main" xmlns="" id="{BF561162-7D88-4D0D-8A94-05B2FF4E139A}"/>
               </a:ext>
             </a:extLst>
           </p:cNvPr>
@@ -5174,12 +7361,69 @@
             <p:ph idx="1"/>
           </p:nvPr>
         </p:nvSpPr>
-        <p:spPr/>
-        <p:txBody>
-          <a:bodyPr/>
-          <a:lstStyle/>
-          <a:p>
-            <a:endParaRPr lang="en-GB"/>
+        <p:spPr>
+          <a:xfrm>
+            <a:off x="838200" y="1825625"/>
+            <a:ext cx="10515600" cy="4351338"/>
+          </a:xfrm>
+        </p:spPr>
+        <p:txBody>
+          <a:bodyPr/>
+          <a:lstStyle/>
+          <a:p>
+            <a:pPr marL="0" indent="0" algn="ctr">
+              <a:buNone/>
+            </a:pPr>
+            <a:r>
+              <a:rPr lang="en-GB" dirty="0"/>
+              <a:t>Demonstration of quantum applications on a multi-node network</a:t>
+            </a:r>
+          </a:p>
+          <a:p>
+            <a:pPr marL="0" indent="0" algn="ctr">
+              <a:buNone/>
+            </a:pPr>
+            <a:endParaRPr lang="en-GB" dirty="0"/>
+          </a:p>
+          <a:p>
+            <a:pPr marL="514350" indent="-514350">
+              <a:buAutoNum type="arabicPeriod"/>
+            </a:pPr>
+            <a:r>
+              <a:rPr lang="en-GB" dirty="0"/>
+              <a:t>Generation of genuine multipartite entangled states,</a:t>
+            </a:r>
+          </a:p>
+          <a:p>
+            <a:pPr marL="514350" indent="-514350">
+              <a:buAutoNum type="arabicPeriod"/>
+            </a:pPr>
+            <a:r>
+              <a:rPr lang="en-GB" dirty="0" smtClean="0"/>
+              <a:t>Proof </a:t>
+            </a:r>
+            <a:r>
+              <a:rPr lang="en-GB" dirty="0"/>
+              <a:t>of principle demonstration of the Link layer of the future Quantum Internet stack,</a:t>
+            </a:r>
+          </a:p>
+          <a:p>
+            <a:pPr marL="514350" indent="-514350">
+              <a:buAutoNum type="arabicPeriod"/>
+            </a:pPr>
+            <a:r>
+              <a:rPr lang="en-GB" dirty="0"/>
+              <a:t>Teleportation of entanglement in a four node network,</a:t>
+            </a:r>
+          </a:p>
+          <a:p>
+            <a:pPr marL="514350" indent="-514350">
+              <a:buAutoNum type="arabicPeriod"/>
+            </a:pPr>
+            <a:r>
+              <a:rPr lang="en-GB" dirty="0"/>
+              <a:t>Client-Server secure delegation of quantum computation.</a:t>
+            </a:r>
           </a:p>
         </p:txBody>
       </p:sp>
@@ -5188,7 +7432,7 @@
           <p:cNvPr id="4" name="Date Placeholder 3">
             <a:extLst>
               <a:ext uri="{FF2B5EF4-FFF2-40B4-BE49-F238E27FC236}">
-                <a16:creationId xmlns:a16="http://schemas.microsoft.com/office/drawing/2014/main" id="{1BBF6F09-B8B1-4E8A-BA82-312944F799EC}"/>
+                <a16:creationId xmlns:a16="http://schemas.microsoft.com/office/drawing/2014/main" xmlns="" id="{C7E009AB-8BD0-4162-9EA8-028C2565EC4B}"/>
               </a:ext>
             </a:extLst>
           </p:cNvPr>
@@ -5216,7 +7460,7 @@
           <p:cNvPr id="5" name="Footer Placeholder 4">
             <a:extLst>
               <a:ext uri="{FF2B5EF4-FFF2-40B4-BE49-F238E27FC236}">
-                <a16:creationId xmlns:a16="http://schemas.microsoft.com/office/drawing/2014/main" id="{28E905E5-0815-42FD-811F-86A56C9859A4}"/>
+                <a16:creationId xmlns:a16="http://schemas.microsoft.com/office/drawing/2014/main" xmlns="" id="{2F3D8614-BEA7-4D46-B44F-F2D694B883D0}"/>
               </a:ext>
             </a:extLst>
           </p:cNvPr>
@@ -5233,7 +7477,7 @@
           <a:lstStyle/>
           <a:p>
             <a:r>
-              <a:rPr lang="en-GB"/>
+              <a:rPr lang="en-GB" dirty="0"/>
               <a:t>Matteo Pompili – First Year Proposal</a:t>
             </a:r>
           </a:p>
@@ -5244,7 +7488,7 @@
           <p:cNvPr id="6" name="Slide Number Placeholder 5">
             <a:extLst>
               <a:ext uri="{FF2B5EF4-FFF2-40B4-BE49-F238E27FC236}">
-                <a16:creationId xmlns:a16="http://schemas.microsoft.com/office/drawing/2014/main" id="{4C11457C-1FD4-41BE-AC65-AABF9856ABB1}"/>
+                <a16:creationId xmlns:a16="http://schemas.microsoft.com/office/drawing/2014/main" xmlns="" id="{3C590C63-308D-4F05-8939-630D888B01FB}"/>
               </a:ext>
             </a:extLst>
           </p:cNvPr>
@@ -5271,13 +7515,20 @@
     </p:spTree>
     <p:extLst>
       <p:ext uri="{BB962C8B-B14F-4D97-AF65-F5344CB8AC3E}">
-        <p14:creationId xmlns:p14="http://schemas.microsoft.com/office/powerpoint/2010/main" val="4020699099"/>
+        <p14:creationId xmlns:p14="http://schemas.microsoft.com/office/powerpoint/2010/main" val="385159449"/>
       </p:ext>
     </p:extLst>
   </p:cSld>
   <p:clrMapOvr>
     <a:masterClrMapping/>
   </p:clrMapOvr>
+  <p:timing>
+    <p:tnLst>
+      <p:par>
+        <p:cTn id="1" dur="indefinite" restart="never" nodeType="tmRoot"/>
+      </p:par>
+    </p:tnLst>
+  </p:timing>
 </p:sld>
 </file>
 
@@ -5303,7 +7554,7 @@
           <p:cNvPr id="2" name="Title 1">
             <a:extLst>
               <a:ext uri="{FF2B5EF4-FFF2-40B4-BE49-F238E27FC236}">
-                <a16:creationId xmlns:a16="http://schemas.microsoft.com/office/drawing/2014/main" id="{8B727EFE-188B-4507-A443-2E46CBE4214C}"/>
+                <a16:creationId xmlns:a16="http://schemas.microsoft.com/office/drawing/2014/main" xmlns="" id="{27D9740F-53F1-42CE-9C22-88BD7A3FB608}"/>
               </a:ext>
             </a:extLst>
           </p:cNvPr>
@@ -5321,7 +7572,7 @@
           <a:p>
             <a:r>
               <a:rPr lang="en-GB" dirty="0"/>
-              <a:t>Teleportation of Entanglement</a:t>
+              <a:t>Genuine Multipartite Entanglement</a:t>
             </a:r>
           </a:p>
         </p:txBody>
@@ -5331,7 +7582,7 @@
           <p:cNvPr id="3" name="Content Placeholder 2">
             <a:extLst>
               <a:ext uri="{FF2B5EF4-FFF2-40B4-BE49-F238E27FC236}">
-                <a16:creationId xmlns:a16="http://schemas.microsoft.com/office/drawing/2014/main" id="{49380588-840E-485D-AE9F-050768AD69DB}"/>
+                <a16:creationId xmlns:a16="http://schemas.microsoft.com/office/drawing/2014/main" xmlns="" id="{884DFFA4-656D-4548-938E-88E94329A996}"/>
               </a:ext>
             </a:extLst>
           </p:cNvPr>
@@ -5356,7 +7607,7 @@
           <p:cNvPr id="4" name="Date Placeholder 3">
             <a:extLst>
               <a:ext uri="{FF2B5EF4-FFF2-40B4-BE49-F238E27FC236}">
-                <a16:creationId xmlns:a16="http://schemas.microsoft.com/office/drawing/2014/main" id="{B96ABCE9-7003-4162-A0E6-72FBEFF3469A}"/>
+                <a16:creationId xmlns:a16="http://schemas.microsoft.com/office/drawing/2014/main" xmlns="" id="{6557802A-E2AB-42E0-87FA-EC3CA24E93C3}"/>
               </a:ext>
             </a:extLst>
           </p:cNvPr>
@@ -5384,7 +7635,7 @@
           <p:cNvPr id="5" name="Footer Placeholder 4">
             <a:extLst>
               <a:ext uri="{FF2B5EF4-FFF2-40B4-BE49-F238E27FC236}">
-                <a16:creationId xmlns:a16="http://schemas.microsoft.com/office/drawing/2014/main" id="{FB20059C-2A68-41A5-A732-34F25E6BDE23}"/>
+                <a16:creationId xmlns:a16="http://schemas.microsoft.com/office/drawing/2014/main" xmlns="" id="{B7DE347E-0519-4F36-B8DC-2FED6348814C}"/>
               </a:ext>
             </a:extLst>
           </p:cNvPr>
@@ -5412,7 +7663,7 @@
           <p:cNvPr id="6" name="Slide Number Placeholder 5">
             <a:extLst>
               <a:ext uri="{FF2B5EF4-FFF2-40B4-BE49-F238E27FC236}">
-                <a16:creationId xmlns:a16="http://schemas.microsoft.com/office/drawing/2014/main" id="{25BB28ED-30D5-42BB-B89E-D45D2E39E0DB}"/>
+                <a16:creationId xmlns:a16="http://schemas.microsoft.com/office/drawing/2014/main" xmlns="" id="{6A84C597-C7EB-4E36-A28A-D2E502A63EF9}"/>
               </a:ext>
             </a:extLst>
           </p:cNvPr>
@@ -5439,13 +7690,20 @@
     </p:spTree>
     <p:extLst>
       <p:ext uri="{BB962C8B-B14F-4D97-AF65-F5344CB8AC3E}">
-        <p14:creationId xmlns:p14="http://schemas.microsoft.com/office/powerpoint/2010/main" val="746968592"/>
+        <p14:creationId xmlns:p14="http://schemas.microsoft.com/office/powerpoint/2010/main" val="1937784935"/>
       </p:ext>
     </p:extLst>
   </p:cSld>
   <p:clrMapOvr>
     <a:masterClrMapping/>
   </p:clrMapOvr>
+  <p:timing>
+    <p:tnLst>
+      <p:par>
+        <p:cTn id="1" dur="indefinite" restart="never" nodeType="tmRoot"/>
+      </p:par>
+    </p:tnLst>
+  </p:timing>
 </p:sld>
 </file>
 
@@ -5471,7 +7729,7 @@
           <p:cNvPr id="2" name="Title 1">
             <a:extLst>
               <a:ext uri="{FF2B5EF4-FFF2-40B4-BE49-F238E27FC236}">
-                <a16:creationId xmlns:a16="http://schemas.microsoft.com/office/drawing/2014/main" id="{8E084B19-F9E8-4B24-AF50-875DDB114356}"/>
+                <a16:creationId xmlns:a16="http://schemas.microsoft.com/office/drawing/2014/main" xmlns="" id="{0137ED8F-287D-4DA9-A36E-701593310309}"/>
               </a:ext>
             </a:extLst>
           </p:cNvPr>
@@ -5489,7 +7747,7 @@
           <a:p>
             <a:r>
               <a:rPr lang="en-GB" dirty="0"/>
-              <a:t>Client-Server Secure Delegation</a:t>
+              <a:t>Link Layer Demonstration</a:t>
             </a:r>
           </a:p>
         </p:txBody>
@@ -5499,7 +7757,7 @@
           <p:cNvPr id="3" name="Content Placeholder 2">
             <a:extLst>
               <a:ext uri="{FF2B5EF4-FFF2-40B4-BE49-F238E27FC236}">
-                <a16:creationId xmlns:a16="http://schemas.microsoft.com/office/drawing/2014/main" id="{F5F9F6ED-1C73-4978-BD29-7983B514D9C7}"/>
+                <a16:creationId xmlns:a16="http://schemas.microsoft.com/office/drawing/2014/main" xmlns="" id="{FB02330F-BCF6-4141-870B-3423DB8E45B0}"/>
               </a:ext>
             </a:extLst>
           </p:cNvPr>
@@ -5524,7 +7782,7 @@
           <p:cNvPr id="4" name="Date Placeholder 3">
             <a:extLst>
               <a:ext uri="{FF2B5EF4-FFF2-40B4-BE49-F238E27FC236}">
-                <a16:creationId xmlns:a16="http://schemas.microsoft.com/office/drawing/2014/main" id="{0B33E9EF-2D87-4726-8B0B-6F169B3D247E}"/>
+                <a16:creationId xmlns:a16="http://schemas.microsoft.com/office/drawing/2014/main" xmlns="" id="{1BBF6F09-B8B1-4E8A-BA82-312944F799EC}"/>
               </a:ext>
             </a:extLst>
           </p:cNvPr>
@@ -5552,7 +7810,7 @@
           <p:cNvPr id="5" name="Footer Placeholder 4">
             <a:extLst>
               <a:ext uri="{FF2B5EF4-FFF2-40B4-BE49-F238E27FC236}">
-                <a16:creationId xmlns:a16="http://schemas.microsoft.com/office/drawing/2014/main" id="{B1F7E519-9E03-4E71-AF3E-6D802F8203DC}"/>
+                <a16:creationId xmlns:a16="http://schemas.microsoft.com/office/drawing/2014/main" xmlns="" id="{28E905E5-0815-42FD-811F-86A56C9859A4}"/>
               </a:ext>
             </a:extLst>
           </p:cNvPr>
@@ -5580,7 +7838,7 @@
           <p:cNvPr id="6" name="Slide Number Placeholder 5">
             <a:extLst>
               <a:ext uri="{FF2B5EF4-FFF2-40B4-BE49-F238E27FC236}">
-                <a16:creationId xmlns:a16="http://schemas.microsoft.com/office/drawing/2014/main" id="{4550C95E-E3CE-42EF-AA3F-2EDEB9EFF163}"/>
+                <a16:creationId xmlns:a16="http://schemas.microsoft.com/office/drawing/2014/main" xmlns="" id="{4C11457C-1FD4-41BE-AC65-AABF9856ABB1}"/>
               </a:ext>
             </a:extLst>
           </p:cNvPr>
@@ -5607,7 +7865,7 @@
     </p:spTree>
     <p:extLst>
       <p:ext uri="{BB962C8B-B14F-4D97-AF65-F5344CB8AC3E}">
-        <p14:creationId xmlns:p14="http://schemas.microsoft.com/office/powerpoint/2010/main" val="2191660528"/>
+        <p14:creationId xmlns:p14="http://schemas.microsoft.com/office/powerpoint/2010/main" val="4020699099"/>
       </p:ext>
     </p:extLst>
   </p:cSld>
@@ -5639,7 +7897,7 @@
           <p:cNvPr id="2" name="Title 1">
             <a:extLst>
               <a:ext uri="{FF2B5EF4-FFF2-40B4-BE49-F238E27FC236}">
-                <a16:creationId xmlns:a16="http://schemas.microsoft.com/office/drawing/2014/main" id="{43207510-8B83-4B00-AE79-AE0BE7790A83}"/>
+                <a16:creationId xmlns:a16="http://schemas.microsoft.com/office/drawing/2014/main" xmlns="" id="{8B727EFE-188B-4507-A443-2E46CBE4214C}"/>
               </a:ext>
             </a:extLst>
           </p:cNvPr>
@@ -5657,7 +7915,7 @@
           <a:p>
             <a:r>
               <a:rPr lang="en-GB" dirty="0"/>
-              <a:t>Proposed Ph.D. Timeline</a:t>
+              <a:t>Teleportation of Entanglement</a:t>
             </a:r>
           </a:p>
         </p:txBody>
@@ -5667,7 +7925,7 @@
           <p:cNvPr id="3" name="Content Placeholder 2">
             <a:extLst>
               <a:ext uri="{FF2B5EF4-FFF2-40B4-BE49-F238E27FC236}">
-                <a16:creationId xmlns:a16="http://schemas.microsoft.com/office/drawing/2014/main" id="{6B8EDEC2-1241-443F-BCEA-BB38519CC5CF}"/>
+                <a16:creationId xmlns:a16="http://schemas.microsoft.com/office/drawing/2014/main" xmlns="" id="{49380588-840E-485D-AE9F-050768AD69DB}"/>
               </a:ext>
             </a:extLst>
           </p:cNvPr>
@@ -5692,7 +7950,7 @@
           <p:cNvPr id="4" name="Date Placeholder 3">
             <a:extLst>
               <a:ext uri="{FF2B5EF4-FFF2-40B4-BE49-F238E27FC236}">
-                <a16:creationId xmlns:a16="http://schemas.microsoft.com/office/drawing/2014/main" id="{17EE6D29-EBFA-4A0B-BA80-EE253C453D1C}"/>
+                <a16:creationId xmlns:a16="http://schemas.microsoft.com/office/drawing/2014/main" xmlns="" id="{B96ABCE9-7003-4162-A0E6-72FBEFF3469A}"/>
               </a:ext>
             </a:extLst>
           </p:cNvPr>
@@ -5720,7 +7978,7 @@
           <p:cNvPr id="5" name="Footer Placeholder 4">
             <a:extLst>
               <a:ext uri="{FF2B5EF4-FFF2-40B4-BE49-F238E27FC236}">
-                <a16:creationId xmlns:a16="http://schemas.microsoft.com/office/drawing/2014/main" id="{83A0606B-6767-497E-8B54-AF5241A6062E}"/>
+                <a16:creationId xmlns:a16="http://schemas.microsoft.com/office/drawing/2014/main" xmlns="" id="{FB20059C-2A68-41A5-A732-34F25E6BDE23}"/>
               </a:ext>
             </a:extLst>
           </p:cNvPr>
@@ -5748,7 +8006,7 @@
           <p:cNvPr id="6" name="Slide Number Placeholder 5">
             <a:extLst>
               <a:ext uri="{FF2B5EF4-FFF2-40B4-BE49-F238E27FC236}">
-                <a16:creationId xmlns:a16="http://schemas.microsoft.com/office/drawing/2014/main" id="{1DDB5C26-A5C5-4B76-88DA-C7DF74D06D98}"/>
+                <a16:creationId xmlns:a16="http://schemas.microsoft.com/office/drawing/2014/main" xmlns="" id="{25BB28ED-30D5-42BB-B89E-D45D2E39E0DB}"/>
               </a:ext>
             </a:extLst>
           </p:cNvPr>
@@ -5772,40 +8030,10 @@
           </a:p>
         </p:txBody>
       </p:sp>
-      <p:pic>
-        <p:nvPicPr>
-          <p:cNvPr id="7" name="Picture 6">
-            <a:extLst>
-              <a:ext uri="{FF2B5EF4-FFF2-40B4-BE49-F238E27FC236}">
-                <a16:creationId xmlns:a16="http://schemas.microsoft.com/office/drawing/2014/main" id="{911898D0-9046-4A1F-8166-FF9EBC7AAD59}"/>
-              </a:ext>
-            </a:extLst>
-          </p:cNvPr>
-          <p:cNvPicPr>
-            <a:picLocks noChangeAspect="1"/>
-          </p:cNvPicPr>
-          <p:nvPr/>
-        </p:nvPicPr>
-        <p:blipFill>
-          <a:blip r:embed="rId2"/>
-          <a:stretch>
-            <a:fillRect/>
-          </a:stretch>
-        </p:blipFill>
-        <p:spPr>
-          <a:xfrm>
-            <a:off x="1319212" y="1946559"/>
-            <a:ext cx="9553575" cy="4109470"/>
-          </a:xfrm>
-          <a:prstGeom prst="rect">
-            <a:avLst/>
-          </a:prstGeom>
-        </p:spPr>
-      </p:pic>
     </p:spTree>
     <p:extLst>
       <p:ext uri="{BB962C8B-B14F-4D97-AF65-F5344CB8AC3E}">
-        <p14:creationId xmlns:p14="http://schemas.microsoft.com/office/powerpoint/2010/main" val="1703441167"/>
+        <p14:creationId xmlns:p14="http://schemas.microsoft.com/office/powerpoint/2010/main" val="746968592"/>
       </p:ext>
     </p:extLst>
   </p:cSld>
@@ -6010,7 +8238,7 @@
   <a:extraClrSchemeLst/>
   <a:extLst>
     <a:ext uri="{05A4C25C-085E-4340-85A3-A5531E510DB2}">
-      <thm15:themeFamily xmlns:thm15="http://schemas.microsoft.com/office/thememl/2012/main" name="Office Theme" id="{62F939B6-93AF-4DB8-9C6B-D6C7DFDC589F}" vid="{4A3C46E8-61CC-4603-A589-7422A47A8E4A}"/>
+      <thm15:themeFamily xmlns:thm15="http://schemas.microsoft.com/office/thememl/2012/main" xmlns="" name="Office Theme" id="{62F939B6-93AF-4DB8-9C6B-D6C7DFDC589F}" vid="{4A3C46E8-61CC-4603-A589-7422A47A8E4A}"/>
     </a:ext>
   </a:extLst>
 </a:theme>
@@ -6305,7 +8533,7 @@
   <a:extraClrSchemeLst/>
   <a:extLst>
     <a:ext uri="{05A4C25C-085E-4340-85A3-A5531E510DB2}">
-      <thm15:themeFamily xmlns:thm15="http://schemas.microsoft.com/office/thememl/2012/main" name="Office Theme" id="{62F939B6-93AF-4DB8-9C6B-D6C7DFDC589F}" vid="{4A3C46E8-61CC-4603-A589-7422A47A8E4A}"/>
+      <thm15:themeFamily xmlns:thm15="http://schemas.microsoft.com/office/thememl/2012/main" xmlns="" name="Office Theme" id="{62F939B6-93AF-4DB8-9C6B-D6C7DFDC589F}" vid="{4A3C46E8-61CC-4603-A589-7422A47A8E4A}"/>
     </a:ext>
   </a:extLst>
 </a:theme>

</xml_diff>